<commit_message>
Splitting the use cases
</commit_message>
<xml_diff>
--- a/2.use-cases/Use-cases.pptx
+++ b/2.use-cases/Use-cases.pptx
@@ -5,7 +5,10 @@
     <p:sldMasterId id="2147483648" r:id="rId1"/>
   </p:sldMasterIdLst>
   <p:sldIdLst>
-    <p:sldId id="256" r:id="rId2"/>
+    <p:sldId id="257" r:id="rId2"/>
+    <p:sldId id="256" r:id="rId3"/>
+    <p:sldId id="258" r:id="rId4"/>
+    <p:sldId id="259" r:id="rId5"/>
   </p:sldIdLst>
   <p:sldSz cx="12192000" cy="6858000"/>
   <p:notesSz cx="6858000" cy="9144000"/>
@@ -104,6 +107,11 @@
       </a:defRPr>
     </a:lvl9pPr>
   </p:defaultTextStyle>
+  <p:extLst>
+    <p:ext uri="{EFAFB233-063F-42B5-8137-9DF3F51BA10A}">
+      <p15:sldGuideLst xmlns:p15="http://schemas.microsoft.com/office/powerpoint/2012/main"/>
+    </p:ext>
+  </p:extLst>
 </p:presentation>
 </file>
 
@@ -238,7 +246,7 @@
           <a:p>
             <a:fld id="{AC90C461-D86D-4896-B3E9-555B9D58EEB6}" type="datetimeFigureOut">
               <a:rPr lang="en-IN" smtClean="0"/>
-              <a:t>03-08-2021</a:t>
+              <a:t>05-08-2021</a:t>
             </a:fld>
             <a:endParaRPr lang="en-IN"/>
           </a:p>
@@ -408,7 +416,7 @@
           <a:p>
             <a:fld id="{AC90C461-D86D-4896-B3E9-555B9D58EEB6}" type="datetimeFigureOut">
               <a:rPr lang="en-IN" smtClean="0"/>
-              <a:t>03-08-2021</a:t>
+              <a:t>05-08-2021</a:t>
             </a:fld>
             <a:endParaRPr lang="en-IN"/>
           </a:p>
@@ -588,7 +596,7 @@
           <a:p>
             <a:fld id="{AC90C461-D86D-4896-B3E9-555B9D58EEB6}" type="datetimeFigureOut">
               <a:rPr lang="en-IN" smtClean="0"/>
-              <a:t>03-08-2021</a:t>
+              <a:t>05-08-2021</a:t>
             </a:fld>
             <a:endParaRPr lang="en-IN"/>
           </a:p>
@@ -758,7 +766,7 @@
           <a:p>
             <a:fld id="{AC90C461-D86D-4896-B3E9-555B9D58EEB6}" type="datetimeFigureOut">
               <a:rPr lang="en-IN" smtClean="0"/>
-              <a:t>03-08-2021</a:t>
+              <a:t>05-08-2021</a:t>
             </a:fld>
             <a:endParaRPr lang="en-IN"/>
           </a:p>
@@ -1004,7 +1012,7 @@
           <a:p>
             <a:fld id="{AC90C461-D86D-4896-B3E9-555B9D58EEB6}" type="datetimeFigureOut">
               <a:rPr lang="en-IN" smtClean="0"/>
-              <a:t>03-08-2021</a:t>
+              <a:t>05-08-2021</a:t>
             </a:fld>
             <a:endParaRPr lang="en-IN"/>
           </a:p>
@@ -1236,7 +1244,7 @@
           <a:p>
             <a:fld id="{AC90C461-D86D-4896-B3E9-555B9D58EEB6}" type="datetimeFigureOut">
               <a:rPr lang="en-IN" smtClean="0"/>
-              <a:t>03-08-2021</a:t>
+              <a:t>05-08-2021</a:t>
             </a:fld>
             <a:endParaRPr lang="en-IN"/>
           </a:p>
@@ -1603,7 +1611,7 @@
           <a:p>
             <a:fld id="{AC90C461-D86D-4896-B3E9-555B9D58EEB6}" type="datetimeFigureOut">
               <a:rPr lang="en-IN" smtClean="0"/>
-              <a:t>03-08-2021</a:t>
+              <a:t>05-08-2021</a:t>
             </a:fld>
             <a:endParaRPr lang="en-IN"/>
           </a:p>
@@ -1721,7 +1729,7 @@
           <a:p>
             <a:fld id="{AC90C461-D86D-4896-B3E9-555B9D58EEB6}" type="datetimeFigureOut">
               <a:rPr lang="en-IN" smtClean="0"/>
-              <a:t>03-08-2021</a:t>
+              <a:t>05-08-2021</a:t>
             </a:fld>
             <a:endParaRPr lang="en-IN"/>
           </a:p>
@@ -1816,7 +1824,7 @@
           <a:p>
             <a:fld id="{AC90C461-D86D-4896-B3E9-555B9D58EEB6}" type="datetimeFigureOut">
               <a:rPr lang="en-IN" smtClean="0"/>
-              <a:t>03-08-2021</a:t>
+              <a:t>05-08-2021</a:t>
             </a:fld>
             <a:endParaRPr lang="en-IN"/>
           </a:p>
@@ -2093,7 +2101,7 @@
           <a:p>
             <a:fld id="{AC90C461-D86D-4896-B3E9-555B9D58EEB6}" type="datetimeFigureOut">
               <a:rPr lang="en-IN" smtClean="0"/>
-              <a:t>03-08-2021</a:t>
+              <a:t>05-08-2021</a:t>
             </a:fld>
             <a:endParaRPr lang="en-IN"/>
           </a:p>
@@ -2346,7 +2354,7 @@
           <a:p>
             <a:fld id="{AC90C461-D86D-4896-B3E9-555B9D58EEB6}" type="datetimeFigureOut">
               <a:rPr lang="en-IN" smtClean="0"/>
-              <a:t>03-08-2021</a:t>
+              <a:t>05-08-2021</a:t>
             </a:fld>
             <a:endParaRPr lang="en-IN"/>
           </a:p>
@@ -2559,7 +2567,7 @@
           <a:p>
             <a:fld id="{AC90C461-D86D-4896-B3E9-555B9D58EEB6}" type="datetimeFigureOut">
               <a:rPr lang="en-IN" smtClean="0"/>
-              <a:t>03-08-2021</a:t>
+              <a:t>05-08-2021</a:t>
             </a:fld>
             <a:endParaRPr lang="en-IN"/>
           </a:p>
@@ -2974,35 +2982,635 @@
             <p:ph type="ctrTitle"/>
           </p:nvPr>
         </p:nvSpPr>
-        <p:spPr/>
-        <p:txBody>
-          <a:bodyPr/>
-          <a:lstStyle/>
-          <a:p>
-            <a:r>
-              <a:rPr lang="en-IN" dirty="0" smtClean="0"/>
-              <a:t>Use-cases</a:t>
-            </a:r>
-            <a:endParaRPr lang="en-IN" dirty="0"/>
-          </a:p>
-        </p:txBody>
-      </p:sp>
-      <p:sp>
-        <p:nvSpPr>
-          <p:cNvPr id="3" name="Subtitle 2"/>
-          <p:cNvSpPr>
-            <a:spLocks noGrp="1"/>
-          </p:cNvSpPr>
-          <p:nvPr>
-            <p:ph type="subTitle" idx="1"/>
-          </p:nvPr>
-        </p:nvSpPr>
-        <p:spPr/>
-        <p:txBody>
-          <a:bodyPr/>
-          <a:lstStyle/>
-          <a:p>
-            <a:endParaRPr lang="en-IN"/>
+        <p:spPr>
+          <a:xfrm>
+            <a:off x="0" y="404602"/>
+            <a:ext cx="3447207" cy="663547"/>
+          </a:xfrm>
+        </p:spPr>
+        <p:txBody>
+          <a:bodyPr>
+            <a:normAutofit/>
+          </a:bodyPr>
+          <a:lstStyle/>
+          <a:p>
+            <a:r>
+              <a:rPr lang="en-IN" sz="4000" dirty="0" smtClean="0"/>
+              <a:t>Business scope</a:t>
+            </a:r>
+            <a:endParaRPr lang="en-IN" sz="4000" dirty="0"/>
+          </a:p>
+        </p:txBody>
+      </p:sp>
+      <p:sp>
+        <p:nvSpPr>
+          <p:cNvPr id="3" name="Rectangle 2"/>
+          <p:cNvSpPr/>
+          <p:nvPr/>
+        </p:nvSpPr>
+        <p:spPr>
+          <a:xfrm>
+            <a:off x="1035782" y="1447587"/>
+            <a:ext cx="10115043" cy="2141805"/>
+          </a:xfrm>
+          <a:prstGeom prst="rect">
+            <a:avLst/>
+          </a:prstGeom>
+        </p:spPr>
+        <p:txBody>
+          <a:bodyPr wrap="square">
+            <a:spAutoFit/>
+          </a:bodyPr>
+          <a:lstStyle/>
+          <a:p>
+            <a:pPr marL="742950" lvl="1" indent="-285750">
+              <a:lnSpc>
+                <a:spcPct val="107000"/>
+              </a:lnSpc>
+              <a:spcAft>
+                <a:spcPts val="0"/>
+              </a:spcAft>
+              <a:buFont typeface="Symbol" panose="05050102010706020507" pitchFamily="18" charset="2"/>
+              <a:buChar char=""/>
+            </a:pPr>
+            <a:r>
+              <a:rPr lang="en-IN" sz="1600" b="1" dirty="0">
+                <a:latin typeface="Calibri" panose="020F0502020204030204" pitchFamily="34" charset="0"/>
+                <a:ea typeface="Calibri" panose="020F0502020204030204" pitchFamily="34" charset="0"/>
+                <a:cs typeface="Times New Roman" panose="02020603050405020304" pitchFamily="18" charset="0"/>
+              </a:rPr>
+              <a:t>“Idea Genie”</a:t>
+            </a:r>
+            <a:r>
+              <a:rPr lang="en-IN" sz="1600" dirty="0">
+                <a:latin typeface="Calibri" panose="020F0502020204030204" pitchFamily="34" charset="0"/>
+                <a:ea typeface="Calibri" panose="020F0502020204030204" pitchFamily="34" charset="0"/>
+                <a:cs typeface="Times New Roman" panose="02020603050405020304" pitchFamily="18" charset="0"/>
+              </a:rPr>
+              <a:t> is a single stop solution which can be used for the following scenarios</a:t>
+            </a:r>
+            <a:r>
+              <a:rPr lang="en-IN" sz="1600" dirty="0" smtClean="0">
+                <a:latin typeface="Calibri" panose="020F0502020204030204" pitchFamily="34" charset="0"/>
+                <a:ea typeface="Calibri" panose="020F0502020204030204" pitchFamily="34" charset="0"/>
+                <a:cs typeface="Times New Roman" panose="02020603050405020304" pitchFamily="18" charset="0"/>
+              </a:rPr>
+              <a:t>.</a:t>
+            </a:r>
+          </a:p>
+          <a:p>
+            <a:pPr lvl="1">
+              <a:lnSpc>
+                <a:spcPct val="107000"/>
+              </a:lnSpc>
+              <a:spcAft>
+                <a:spcPts val="0"/>
+              </a:spcAft>
+            </a:pPr>
+            <a:endParaRPr lang="en-IN" sz="1600" dirty="0">
+              <a:latin typeface="Calibri" panose="020F0502020204030204" pitchFamily="34" charset="0"/>
+              <a:ea typeface="Calibri" panose="020F0502020204030204" pitchFamily="34" charset="0"/>
+              <a:cs typeface="Times New Roman" panose="02020603050405020304" pitchFamily="18" charset="0"/>
+            </a:endParaRPr>
+          </a:p>
+          <a:p>
+            <a:pPr marL="1143000" lvl="2" indent="-228600">
+              <a:lnSpc>
+                <a:spcPct val="107000"/>
+              </a:lnSpc>
+              <a:spcAft>
+                <a:spcPts val="0"/>
+              </a:spcAft>
+              <a:buFont typeface="+mj-lt"/>
+              <a:buAutoNum type="arabicPeriod"/>
+            </a:pPr>
+            <a:r>
+              <a:rPr lang="en-IN" sz="1600" dirty="0">
+                <a:latin typeface="Calibri" panose="020F0502020204030204" pitchFamily="34" charset="0"/>
+                <a:ea typeface="Calibri" panose="020F0502020204030204" pitchFamily="34" charset="0"/>
+                <a:cs typeface="Times New Roman" panose="02020603050405020304" pitchFamily="18" charset="0"/>
+              </a:rPr>
+              <a:t>Addressing new ideas which can be registered and converted into a </a:t>
+            </a:r>
+            <a:r>
+              <a:rPr lang="en-IN" sz="1600" dirty="0" smtClean="0">
+                <a:latin typeface="Calibri" panose="020F0502020204030204" pitchFamily="34" charset="0"/>
+                <a:ea typeface="Calibri" panose="020F0502020204030204" pitchFamily="34" charset="0"/>
+                <a:cs typeface="Times New Roman" panose="02020603050405020304" pitchFamily="18" charset="0"/>
+              </a:rPr>
+              <a:t>Product.</a:t>
+            </a:r>
+            <a:endParaRPr lang="en-IN" sz="1600" dirty="0">
+              <a:latin typeface="Calibri" panose="020F0502020204030204" pitchFamily="34" charset="0"/>
+              <a:ea typeface="Calibri" panose="020F0502020204030204" pitchFamily="34" charset="0"/>
+              <a:cs typeface="Times New Roman" panose="02020603050405020304" pitchFamily="18" charset="0"/>
+            </a:endParaRPr>
+          </a:p>
+          <a:p>
+            <a:pPr marL="1143000" lvl="2" indent="-228600">
+              <a:lnSpc>
+                <a:spcPct val="107000"/>
+              </a:lnSpc>
+              <a:spcAft>
+                <a:spcPts val="0"/>
+              </a:spcAft>
+              <a:buFont typeface="+mj-lt"/>
+              <a:buAutoNum type="arabicPeriod"/>
+            </a:pPr>
+            <a:r>
+              <a:rPr lang="en-IN" sz="1600" dirty="0">
+                <a:latin typeface="Calibri" panose="020F0502020204030204" pitchFamily="34" charset="0"/>
+                <a:ea typeface="Calibri" panose="020F0502020204030204" pitchFamily="34" charset="0"/>
+                <a:cs typeface="Times New Roman" panose="02020603050405020304" pitchFamily="18" charset="0"/>
+              </a:rPr>
+              <a:t>Registering </a:t>
+            </a:r>
+            <a:r>
+              <a:rPr lang="en-IN" sz="1600" dirty="0" smtClean="0">
+                <a:latin typeface="Calibri" panose="020F0502020204030204" pitchFamily="34" charset="0"/>
+                <a:ea typeface="Calibri" panose="020F0502020204030204" pitchFamily="34" charset="0"/>
+                <a:cs typeface="Times New Roman" panose="02020603050405020304" pitchFamily="18" charset="0"/>
+              </a:rPr>
+              <a:t>P.I.s/</a:t>
+            </a:r>
+            <a:r>
+              <a:rPr lang="en-IN" sz="1600" dirty="0" err="1" smtClean="0">
+                <a:latin typeface="Calibri" panose="020F0502020204030204" pitchFamily="34" charset="0"/>
+                <a:ea typeface="Calibri" panose="020F0502020204030204" pitchFamily="34" charset="0"/>
+                <a:cs typeface="Times New Roman" panose="02020603050405020304" pitchFamily="18" charset="0"/>
+              </a:rPr>
+              <a:t>P.o.V</a:t>
+            </a:r>
+            <a:r>
+              <a:rPr lang="en-IN" sz="1600" dirty="0" smtClean="0">
+                <a:latin typeface="Calibri" panose="020F0502020204030204" pitchFamily="34" charset="0"/>
+                <a:ea typeface="Calibri" panose="020F0502020204030204" pitchFamily="34" charset="0"/>
+                <a:cs typeface="Times New Roman" panose="02020603050405020304" pitchFamily="18" charset="0"/>
+              </a:rPr>
+              <a:t>/</a:t>
+            </a:r>
+            <a:r>
+              <a:rPr lang="en-IN" sz="1600" dirty="0" err="1" smtClean="0">
+                <a:latin typeface="Calibri" panose="020F0502020204030204" pitchFamily="34" charset="0"/>
+                <a:ea typeface="Calibri" panose="020F0502020204030204" pitchFamily="34" charset="0"/>
+                <a:cs typeface="Times New Roman" panose="02020603050405020304" pitchFamily="18" charset="0"/>
+              </a:rPr>
+              <a:t>P.o.C</a:t>
+            </a:r>
+            <a:r>
+              <a:rPr lang="en-IN" sz="1600" dirty="0" smtClean="0">
+                <a:latin typeface="Calibri" panose="020F0502020204030204" pitchFamily="34" charset="0"/>
+                <a:ea typeface="Calibri" panose="020F0502020204030204" pitchFamily="34" charset="0"/>
+                <a:cs typeface="Times New Roman" panose="02020603050405020304" pitchFamily="18" charset="0"/>
+              </a:rPr>
+              <a:t> </a:t>
+            </a:r>
+            <a:r>
+              <a:rPr lang="en-IN" sz="1600" dirty="0">
+                <a:latin typeface="Calibri" panose="020F0502020204030204" pitchFamily="34" charset="0"/>
+                <a:ea typeface="Calibri" panose="020F0502020204030204" pitchFamily="34" charset="0"/>
+                <a:cs typeface="Times New Roman" panose="02020603050405020304" pitchFamily="18" charset="0"/>
+              </a:rPr>
+              <a:t>from Projects/</a:t>
+            </a:r>
+            <a:r>
+              <a:rPr lang="en-IN" sz="1600" dirty="0" err="1">
+                <a:latin typeface="Calibri" panose="020F0502020204030204" pitchFamily="34" charset="0"/>
+                <a:ea typeface="Calibri" panose="020F0502020204030204" pitchFamily="34" charset="0"/>
+                <a:cs typeface="Times New Roman" panose="02020603050405020304" pitchFamily="18" charset="0"/>
+              </a:rPr>
+              <a:t>Hackathon</a:t>
+            </a:r>
+            <a:r>
+              <a:rPr lang="en-IN" sz="1600" dirty="0">
+                <a:latin typeface="Calibri" panose="020F0502020204030204" pitchFamily="34" charset="0"/>
+                <a:ea typeface="Calibri" panose="020F0502020204030204" pitchFamily="34" charset="0"/>
+                <a:cs typeface="Times New Roman" panose="02020603050405020304" pitchFamily="18" charset="0"/>
+              </a:rPr>
+              <a:t>/other events and is accessible for </a:t>
+            </a:r>
+            <a:r>
+              <a:rPr lang="en-IN" sz="1600" dirty="0" smtClean="0">
+                <a:latin typeface="Calibri" panose="020F0502020204030204" pitchFamily="34" charset="0"/>
+                <a:ea typeface="Calibri" panose="020F0502020204030204" pitchFamily="34" charset="0"/>
+                <a:cs typeface="Times New Roman" panose="02020603050405020304" pitchFamily="18" charset="0"/>
+              </a:rPr>
+              <a:t>reference.</a:t>
+            </a:r>
+            <a:endParaRPr lang="en-IN" sz="1600" dirty="0">
+              <a:latin typeface="Calibri" panose="020F0502020204030204" pitchFamily="34" charset="0"/>
+              <a:ea typeface="Calibri" panose="020F0502020204030204" pitchFamily="34" charset="0"/>
+              <a:cs typeface="Times New Roman" panose="02020603050405020304" pitchFamily="18" charset="0"/>
+            </a:endParaRPr>
+          </a:p>
+          <a:p>
+            <a:pPr marL="1143000" lvl="2" indent="-228600">
+              <a:lnSpc>
+                <a:spcPct val="107000"/>
+              </a:lnSpc>
+              <a:spcAft>
+                <a:spcPts val="800"/>
+              </a:spcAft>
+              <a:buFont typeface="+mj-lt"/>
+              <a:buAutoNum type="arabicPeriod"/>
+            </a:pPr>
+            <a:r>
+              <a:rPr lang="en-IN" sz="1600" dirty="0" err="1" smtClean="0">
+                <a:latin typeface="Calibri" panose="020F0502020204030204" pitchFamily="34" charset="0"/>
+                <a:ea typeface="Calibri" panose="020F0502020204030204" pitchFamily="34" charset="0"/>
+                <a:cs typeface="Times New Roman" panose="02020603050405020304" pitchFamily="18" charset="0"/>
+              </a:rPr>
+              <a:t>Ideathon</a:t>
+            </a:r>
+            <a:r>
+              <a:rPr lang="en-IN" sz="1600" dirty="0" smtClean="0">
+                <a:latin typeface="Calibri" panose="020F0502020204030204" pitchFamily="34" charset="0"/>
+                <a:ea typeface="Calibri" panose="020F0502020204030204" pitchFamily="34" charset="0"/>
+                <a:cs typeface="Times New Roman" panose="02020603050405020304" pitchFamily="18" charset="0"/>
+              </a:rPr>
+              <a:t>/</a:t>
+            </a:r>
+            <a:r>
+              <a:rPr lang="en-IN" sz="1600" dirty="0" err="1" smtClean="0">
+                <a:latin typeface="Calibri" panose="020F0502020204030204" pitchFamily="34" charset="0"/>
+                <a:ea typeface="Calibri" panose="020F0502020204030204" pitchFamily="34" charset="0"/>
+                <a:cs typeface="Times New Roman" panose="02020603050405020304" pitchFamily="18" charset="0"/>
+              </a:rPr>
+              <a:t>Hackathon</a:t>
+            </a:r>
+            <a:r>
+              <a:rPr lang="en-IN" sz="1600" dirty="0" smtClean="0">
+                <a:latin typeface="Calibri" panose="020F0502020204030204" pitchFamily="34" charset="0"/>
+                <a:ea typeface="Calibri" panose="020F0502020204030204" pitchFamily="34" charset="0"/>
+                <a:cs typeface="Times New Roman" panose="02020603050405020304" pitchFamily="18" charset="0"/>
+              </a:rPr>
+              <a:t> </a:t>
+            </a:r>
+            <a:r>
+              <a:rPr lang="en-IN" sz="1600" dirty="0">
+                <a:latin typeface="Calibri" panose="020F0502020204030204" pitchFamily="34" charset="0"/>
+                <a:ea typeface="Calibri" panose="020F0502020204030204" pitchFamily="34" charset="0"/>
+                <a:cs typeface="Times New Roman" panose="02020603050405020304" pitchFamily="18" charset="0"/>
+              </a:rPr>
+              <a:t>can be conducted with the help of the Portal and the inbuilt Framework </a:t>
+            </a:r>
+            <a:r>
+              <a:rPr lang="en-IN" sz="1600" dirty="0" smtClean="0">
+                <a:latin typeface="Calibri" panose="020F0502020204030204" pitchFamily="34" charset="0"/>
+                <a:ea typeface="Calibri" panose="020F0502020204030204" pitchFamily="34" charset="0"/>
+                <a:cs typeface="Times New Roman" panose="02020603050405020304" pitchFamily="18" charset="0"/>
+              </a:rPr>
+              <a:t>built.</a:t>
+            </a:r>
+          </a:p>
+          <a:p>
+            <a:pPr marL="1143000" lvl="2" indent="-228600">
+              <a:lnSpc>
+                <a:spcPct val="107000"/>
+              </a:lnSpc>
+              <a:spcAft>
+                <a:spcPts val="800"/>
+              </a:spcAft>
+              <a:buFont typeface="+mj-lt"/>
+              <a:buAutoNum type="arabicPeriod"/>
+            </a:pPr>
+            <a:endParaRPr lang="en-IN" sz="1600" dirty="0">
+              <a:effectLst/>
+              <a:latin typeface="Calibri" panose="020F0502020204030204" pitchFamily="34" charset="0"/>
+              <a:ea typeface="Calibri" panose="020F0502020204030204" pitchFamily="34" charset="0"/>
+              <a:cs typeface="Times New Roman" panose="02020603050405020304" pitchFamily="18" charset="0"/>
+            </a:endParaRPr>
+          </a:p>
+          <a:p>
+            <a:pPr lvl="2">
+              <a:lnSpc>
+                <a:spcPct val="107000"/>
+              </a:lnSpc>
+              <a:spcAft>
+                <a:spcPts val="800"/>
+              </a:spcAft>
+            </a:pPr>
+            <a:endParaRPr lang="en-IN" sz="1600" dirty="0">
+              <a:effectLst/>
+              <a:latin typeface="Calibri" panose="020F0502020204030204" pitchFamily="34" charset="0"/>
+              <a:ea typeface="Calibri" panose="020F0502020204030204" pitchFamily="34" charset="0"/>
+              <a:cs typeface="Times New Roman" panose="02020603050405020304" pitchFamily="18" charset="0"/>
+            </a:endParaRPr>
+          </a:p>
+        </p:txBody>
+      </p:sp>
+      <p:sp>
+        <p:nvSpPr>
+          <p:cNvPr id="4" name="TextBox 3"/>
+          <p:cNvSpPr txBox="1"/>
+          <p:nvPr/>
+        </p:nvSpPr>
+        <p:spPr>
+          <a:xfrm>
+            <a:off x="614995" y="3507913"/>
+            <a:ext cx="6129627" cy="2862322"/>
+          </a:xfrm>
+          <a:prstGeom prst="rect">
+            <a:avLst/>
+          </a:prstGeom>
+          <a:noFill/>
+        </p:spPr>
+        <p:txBody>
+          <a:bodyPr wrap="none" rtlCol="0">
+            <a:spAutoFit/>
+          </a:bodyPr>
+          <a:lstStyle/>
+          <a:p>
+            <a:r>
+              <a:rPr lang="en-IN" u="sng" dirty="0" smtClean="0"/>
+              <a:t>Functional scope for product:</a:t>
+            </a:r>
+          </a:p>
+          <a:p>
+            <a:endParaRPr lang="en-IN" u="sng" dirty="0" smtClean="0"/>
+          </a:p>
+          <a:p>
+            <a:pPr marL="742950" lvl="1" indent="-285750">
+              <a:buFont typeface="Arial" panose="020B0604020202020204" pitchFamily="34" charset="0"/>
+              <a:buChar char="•"/>
+            </a:pPr>
+            <a:r>
+              <a:rPr lang="en-IN" sz="1600" dirty="0" smtClean="0"/>
+              <a:t>Enrolment facility to be provided .</a:t>
+            </a:r>
+          </a:p>
+          <a:p>
+            <a:pPr marL="742950" lvl="1" indent="-285750">
+              <a:buFont typeface="Arial" panose="020B0604020202020204" pitchFamily="34" charset="0"/>
+              <a:buChar char="•"/>
+            </a:pPr>
+            <a:r>
+              <a:rPr lang="en-IN" sz="1600" dirty="0" smtClean="0"/>
+              <a:t>Data required during enrolment to be identified.</a:t>
+            </a:r>
+          </a:p>
+          <a:p>
+            <a:pPr marL="742950" lvl="1" indent="-285750">
+              <a:buFont typeface="Arial" panose="020B0604020202020204" pitchFamily="34" charset="0"/>
+              <a:buChar char="•"/>
+            </a:pPr>
+            <a:r>
+              <a:rPr lang="en-IN" sz="1600" dirty="0" smtClean="0"/>
+              <a:t>Authentication &amp; Role based access.</a:t>
+            </a:r>
+          </a:p>
+          <a:p>
+            <a:pPr marL="742950" lvl="1" indent="-285750">
+              <a:buFont typeface="Arial" panose="020B0604020202020204" pitchFamily="34" charset="0"/>
+              <a:buChar char="•"/>
+            </a:pPr>
+            <a:r>
+              <a:rPr lang="en-IN" sz="1600" dirty="0" smtClean="0"/>
+              <a:t>Users to be decided in an organisation and Hackathon context.</a:t>
+            </a:r>
+          </a:p>
+          <a:p>
+            <a:pPr marL="742950" lvl="1" indent="-285750">
+              <a:buFont typeface="Arial" panose="020B0604020202020204" pitchFamily="34" charset="0"/>
+              <a:buChar char="•"/>
+            </a:pPr>
+            <a:endParaRPr lang="en-IN" sz="1600" dirty="0" smtClean="0"/>
+          </a:p>
+          <a:p>
+            <a:pPr marL="742950" lvl="1" indent="-285750">
+              <a:buFont typeface="Arial" panose="020B0604020202020204" pitchFamily="34" charset="0"/>
+              <a:buChar char="•"/>
+            </a:pPr>
+            <a:endParaRPr lang="en-IN" sz="1600" dirty="0" smtClean="0"/>
+          </a:p>
+          <a:p>
+            <a:pPr marL="742950" lvl="1" indent="-285750">
+              <a:buFont typeface="Arial" panose="020B0604020202020204" pitchFamily="34" charset="0"/>
+              <a:buChar char="•"/>
+            </a:pPr>
+            <a:endParaRPr lang="en-IN" sz="1600" dirty="0" smtClean="0"/>
+          </a:p>
+          <a:p>
+            <a:pPr marL="742950" lvl="1" indent="-285750">
+              <a:buFont typeface="Arial" panose="020B0604020202020204" pitchFamily="34" charset="0"/>
+              <a:buChar char="•"/>
+            </a:pPr>
+            <a:endParaRPr lang="en-IN" sz="1600" dirty="0" smtClean="0"/>
+          </a:p>
+          <a:p>
+            <a:pPr marL="742950" lvl="1" indent="-285750">
+              <a:buFont typeface="Arial" panose="020B0604020202020204" pitchFamily="34" charset="0"/>
+              <a:buChar char="•"/>
+            </a:pPr>
+            <a:endParaRPr lang="en-IN" sz="1600" dirty="0"/>
+          </a:p>
+        </p:txBody>
+      </p:sp>
+    </p:spTree>
+    <p:extLst>
+      <p:ext uri="{BB962C8B-B14F-4D97-AF65-F5344CB8AC3E}">
+        <p14:creationId xmlns:p14="http://schemas.microsoft.com/office/powerpoint/2010/main" val="2684655476"/>
+      </p:ext>
+    </p:extLst>
+  </p:cSld>
+  <p:clrMapOvr>
+    <a:masterClrMapping/>
+  </p:clrMapOvr>
+</p:sld>
+</file>
+
+<file path=ppt/slides/slide2.xml><?xml version="1.0" encoding="utf-8"?>
+<p:sld xmlns:a="http://schemas.openxmlformats.org/drawingml/2006/main" xmlns:r="http://schemas.openxmlformats.org/officeDocument/2006/relationships" xmlns:p="http://schemas.openxmlformats.org/presentationml/2006/main">
+  <p:cSld>
+    <p:spTree>
+      <p:nvGrpSpPr>
+        <p:cNvPr id="1" name=""/>
+        <p:cNvGrpSpPr/>
+        <p:nvPr/>
+      </p:nvGrpSpPr>
+      <p:grpSpPr>
+        <a:xfrm>
+          <a:off x="0" y="0"/>
+          <a:ext cx="0" cy="0"/>
+          <a:chOff x="0" y="0"/>
+          <a:chExt cx="0" cy="0"/>
+        </a:xfrm>
+      </p:grpSpPr>
+      <p:sp>
+        <p:nvSpPr>
+          <p:cNvPr id="2" name="Title 1"/>
+          <p:cNvSpPr>
+            <a:spLocks noGrp="1"/>
+          </p:cNvSpPr>
+          <p:nvPr>
+            <p:ph type="ctrTitle"/>
+          </p:nvPr>
+        </p:nvSpPr>
+        <p:spPr>
+          <a:xfrm>
+            <a:off x="1451170" y="1238081"/>
+            <a:ext cx="9144000" cy="1343278"/>
+          </a:xfrm>
+        </p:spPr>
+        <p:txBody>
+          <a:bodyPr>
+            <a:normAutofit/>
+          </a:bodyPr>
+          <a:lstStyle/>
+          <a:p>
+            <a:r>
+              <a:rPr lang="en-IN" sz="1600" dirty="0"/>
+              <a:t>As an </a:t>
+            </a:r>
+            <a:r>
+              <a:rPr lang="en-IN" sz="1600" dirty="0" smtClean="0"/>
+              <a:t>user , </a:t>
+            </a:r>
+            <a:r>
+              <a:rPr lang="en-IN" sz="1600" dirty="0"/>
+              <a:t>I would like to share my ideas related to a new product/feature in an existing product/solution to an existing problem statement. I need my proposal to be evaluated, guided for the </a:t>
+            </a:r>
+            <a:r>
+              <a:rPr lang="en-IN" sz="1600" dirty="0" err="1"/>
+              <a:t>PoC</a:t>
+            </a:r>
+            <a:r>
+              <a:rPr lang="en-IN" sz="1600" dirty="0"/>
+              <a:t> and finally registered as a Product.</a:t>
+            </a:r>
+            <a:br>
+              <a:rPr lang="en-IN" sz="1600" dirty="0"/>
+            </a:br>
+            <a:endParaRPr lang="en-IN" sz="1600" dirty="0"/>
+          </a:p>
+        </p:txBody>
+      </p:sp>
+      <p:sp>
+        <p:nvSpPr>
+          <p:cNvPr id="4" name="Title 1"/>
+          <p:cNvSpPr txBox="1">
+            <a:spLocks/>
+          </p:cNvSpPr>
+          <p:nvPr/>
+        </p:nvSpPr>
+        <p:spPr>
+          <a:xfrm>
+            <a:off x="0" y="404602"/>
+            <a:ext cx="3447207" cy="663547"/>
+          </a:xfrm>
+          <a:prstGeom prst="rect">
+            <a:avLst/>
+          </a:prstGeom>
+        </p:spPr>
+        <p:txBody>
+          <a:bodyPr vert="horz" lIns="91440" tIns="45720" rIns="91440" bIns="45720" rtlCol="0" anchor="b">
+            <a:normAutofit/>
+          </a:bodyPr>
+          <a:lstStyle>
+            <a:lvl1pPr algn="ctr" defTabSz="914400" rtl="0" eaLnBrk="1" latinLnBrk="0" hangingPunct="1">
+              <a:lnSpc>
+                <a:spcPct val="90000"/>
+              </a:lnSpc>
+              <a:spcBef>
+                <a:spcPct val="0"/>
+              </a:spcBef>
+              <a:buNone/>
+              <a:defRPr sz="6000" kern="1200">
+                <a:solidFill>
+                  <a:schemeClr val="tx1"/>
+                </a:solidFill>
+                <a:latin typeface="+mj-lt"/>
+                <a:ea typeface="+mj-ea"/>
+                <a:cs typeface="+mj-cs"/>
+              </a:defRPr>
+            </a:lvl1pPr>
+          </a:lstStyle>
+          <a:p>
+            <a:r>
+              <a:rPr lang="en-IN" sz="4000" dirty="0" smtClean="0"/>
+              <a:t>Use-case 1:</a:t>
+            </a:r>
+            <a:endParaRPr lang="en-IN" sz="4000" dirty="0"/>
+          </a:p>
+        </p:txBody>
+      </p:sp>
+      <p:sp>
+        <p:nvSpPr>
+          <p:cNvPr id="5" name="TextBox 4"/>
+          <p:cNvSpPr txBox="1"/>
+          <p:nvPr/>
+        </p:nvSpPr>
+        <p:spPr>
+          <a:xfrm>
+            <a:off x="412694" y="2751291"/>
+            <a:ext cx="5551841" cy="2123658"/>
+          </a:xfrm>
+          <a:prstGeom prst="rect">
+            <a:avLst/>
+          </a:prstGeom>
+          <a:noFill/>
+        </p:spPr>
+        <p:txBody>
+          <a:bodyPr wrap="none" rtlCol="0">
+            <a:spAutoFit/>
+          </a:bodyPr>
+          <a:lstStyle/>
+          <a:p>
+            <a:r>
+              <a:rPr lang="en-IN" u="sng" dirty="0" smtClean="0"/>
+              <a:t>Functional scope:</a:t>
+            </a:r>
+          </a:p>
+          <a:p>
+            <a:endParaRPr lang="en-IN" u="sng" dirty="0" smtClean="0"/>
+          </a:p>
+          <a:p>
+            <a:pPr marL="742950" lvl="1" indent="-285750">
+              <a:buFont typeface="Arial" panose="020B0604020202020204" pitchFamily="34" charset="0"/>
+              <a:buChar char="•"/>
+            </a:pPr>
+            <a:r>
+              <a:rPr lang="en-IN" sz="1600" dirty="0"/>
+              <a:t>Idea life-cycle to be defined.</a:t>
+            </a:r>
+          </a:p>
+          <a:p>
+            <a:pPr marL="742950" lvl="1" indent="-285750">
+              <a:buFont typeface="Arial" panose="020B0604020202020204" pitchFamily="34" charset="0"/>
+              <a:buChar char="•"/>
+            </a:pPr>
+            <a:r>
+              <a:rPr lang="en-IN" sz="1600" dirty="0"/>
+              <a:t>Contents to be collected as a part of idea to be defined.</a:t>
+            </a:r>
+          </a:p>
+          <a:p>
+            <a:pPr lvl="1"/>
+            <a:r>
+              <a:rPr lang="en-IN" sz="1600" dirty="0" smtClean="0"/>
+              <a:t>.</a:t>
+            </a:r>
+          </a:p>
+          <a:p>
+            <a:pPr marL="742950" lvl="1" indent="-285750">
+              <a:buFont typeface="Arial" panose="020B0604020202020204" pitchFamily="34" charset="0"/>
+              <a:buChar char="•"/>
+            </a:pPr>
+            <a:endParaRPr lang="en-IN" sz="1600" dirty="0" smtClean="0"/>
+          </a:p>
+          <a:p>
+            <a:pPr marL="742950" lvl="1" indent="-285750">
+              <a:buFont typeface="Arial" panose="020B0604020202020204" pitchFamily="34" charset="0"/>
+              <a:buChar char="•"/>
+            </a:pPr>
+            <a:endParaRPr lang="en-IN" sz="1600" dirty="0" smtClean="0"/>
+          </a:p>
+          <a:p>
+            <a:pPr marL="742950" lvl="1" indent="-285750">
+              <a:buFont typeface="Arial" panose="020B0604020202020204" pitchFamily="34" charset="0"/>
+              <a:buChar char="•"/>
+            </a:pPr>
+            <a:endParaRPr lang="en-IN" sz="1600" dirty="0"/>
           </a:p>
         </p:txBody>
       </p:sp>
@@ -3010,6 +3618,390 @@
     <p:extLst>
       <p:ext uri="{BB962C8B-B14F-4D97-AF65-F5344CB8AC3E}">
         <p14:creationId xmlns:p14="http://schemas.microsoft.com/office/powerpoint/2010/main" val="2468355235"/>
+      </p:ext>
+    </p:extLst>
+  </p:cSld>
+  <p:clrMapOvr>
+    <a:masterClrMapping/>
+  </p:clrMapOvr>
+</p:sld>
+</file>
+
+<file path=ppt/slides/slide3.xml><?xml version="1.0" encoding="utf-8"?>
+<p:sld xmlns:a="http://schemas.openxmlformats.org/drawingml/2006/main" xmlns:r="http://schemas.openxmlformats.org/officeDocument/2006/relationships" xmlns:p="http://schemas.openxmlformats.org/presentationml/2006/main">
+  <p:cSld>
+    <p:spTree>
+      <p:nvGrpSpPr>
+        <p:cNvPr id="1" name=""/>
+        <p:cNvGrpSpPr/>
+        <p:nvPr/>
+      </p:nvGrpSpPr>
+      <p:grpSpPr>
+        <a:xfrm>
+          <a:off x="0" y="0"/>
+          <a:ext cx="0" cy="0"/>
+          <a:chOff x="0" y="0"/>
+          <a:chExt cx="0" cy="0"/>
+        </a:xfrm>
+      </p:grpSpPr>
+      <p:sp>
+        <p:nvSpPr>
+          <p:cNvPr id="2" name="Title 1"/>
+          <p:cNvSpPr>
+            <a:spLocks noGrp="1"/>
+          </p:cNvSpPr>
+          <p:nvPr>
+            <p:ph type="ctrTitle"/>
+          </p:nvPr>
+        </p:nvSpPr>
+        <p:spPr>
+          <a:xfrm>
+            <a:off x="1839589" y="1162823"/>
+            <a:ext cx="9144000" cy="1183867"/>
+          </a:xfrm>
+        </p:spPr>
+        <p:txBody>
+          <a:bodyPr>
+            <a:noAutofit/>
+          </a:bodyPr>
+          <a:lstStyle/>
+          <a:p>
+            <a:r>
+              <a:rPr lang="en-IN" sz="2400" dirty="0"/>
+              <a:t>As </a:t>
+            </a:r>
+            <a:r>
+              <a:rPr lang="en-IN" sz="2400" dirty="0" smtClean="0"/>
+              <a:t>a user with innovation evangelist role, </a:t>
+            </a:r>
+            <a:r>
+              <a:rPr lang="en-IN" sz="2400" dirty="0"/>
+              <a:t>I would like to analyse and refer different </a:t>
+            </a:r>
+            <a:r>
+              <a:rPr lang="en-IN" sz="2400" dirty="0" err="1"/>
+              <a:t>PoV</a:t>
+            </a:r>
+            <a:r>
+              <a:rPr lang="en-IN" sz="2400" dirty="0"/>
+              <a:t>, </a:t>
+            </a:r>
+            <a:r>
+              <a:rPr lang="en-IN" sz="2400" dirty="0" err="1"/>
+              <a:t>PoC</a:t>
+            </a:r>
+            <a:r>
+              <a:rPr lang="en-IN" sz="2400" dirty="0"/>
+              <a:t> and ideas with respect to relevant industry for the proposals and solutions</a:t>
+            </a:r>
+          </a:p>
+        </p:txBody>
+      </p:sp>
+      <p:sp>
+        <p:nvSpPr>
+          <p:cNvPr id="3" name="Title 1"/>
+          <p:cNvSpPr txBox="1">
+            <a:spLocks/>
+          </p:cNvSpPr>
+          <p:nvPr/>
+        </p:nvSpPr>
+        <p:spPr>
+          <a:xfrm>
+            <a:off x="0" y="404602"/>
+            <a:ext cx="3447207" cy="663547"/>
+          </a:xfrm>
+          <a:prstGeom prst="rect">
+            <a:avLst/>
+          </a:prstGeom>
+        </p:spPr>
+        <p:txBody>
+          <a:bodyPr vert="horz" lIns="91440" tIns="45720" rIns="91440" bIns="45720" rtlCol="0" anchor="b">
+            <a:normAutofit/>
+          </a:bodyPr>
+          <a:lstStyle>
+            <a:lvl1pPr algn="ctr" defTabSz="914400" rtl="0" eaLnBrk="1" latinLnBrk="0" hangingPunct="1">
+              <a:lnSpc>
+                <a:spcPct val="90000"/>
+              </a:lnSpc>
+              <a:spcBef>
+                <a:spcPct val="0"/>
+              </a:spcBef>
+              <a:buNone/>
+              <a:defRPr sz="6000" kern="1200">
+                <a:solidFill>
+                  <a:schemeClr val="tx1"/>
+                </a:solidFill>
+                <a:latin typeface="+mj-lt"/>
+                <a:ea typeface="+mj-ea"/>
+                <a:cs typeface="+mj-cs"/>
+              </a:defRPr>
+            </a:lvl1pPr>
+          </a:lstStyle>
+          <a:p>
+            <a:r>
+              <a:rPr lang="en-IN" sz="4000" dirty="0" smtClean="0"/>
+              <a:t>Use-case 2:</a:t>
+            </a:r>
+            <a:endParaRPr lang="en-IN" sz="4000" dirty="0"/>
+          </a:p>
+        </p:txBody>
+      </p:sp>
+      <p:sp>
+        <p:nvSpPr>
+          <p:cNvPr id="4" name="TextBox 3"/>
+          <p:cNvSpPr txBox="1"/>
+          <p:nvPr/>
+        </p:nvSpPr>
+        <p:spPr>
+          <a:xfrm>
+            <a:off x="412694" y="2751291"/>
+            <a:ext cx="5771901" cy="1631216"/>
+          </a:xfrm>
+          <a:prstGeom prst="rect">
+            <a:avLst/>
+          </a:prstGeom>
+          <a:noFill/>
+        </p:spPr>
+        <p:txBody>
+          <a:bodyPr wrap="none" rtlCol="0">
+            <a:spAutoFit/>
+          </a:bodyPr>
+          <a:lstStyle/>
+          <a:p>
+            <a:r>
+              <a:rPr lang="en-IN" u="sng" dirty="0" smtClean="0"/>
+              <a:t>Functional scope:</a:t>
+            </a:r>
+          </a:p>
+          <a:p>
+            <a:endParaRPr lang="en-IN" u="sng" dirty="0" smtClean="0"/>
+          </a:p>
+          <a:p>
+            <a:pPr marL="742950" lvl="1" indent="-285750">
+              <a:buFont typeface="Arial" panose="020B0604020202020204" pitchFamily="34" charset="0"/>
+              <a:buChar char="•"/>
+            </a:pPr>
+            <a:r>
+              <a:rPr lang="en-IN" sz="1600" dirty="0" smtClean="0"/>
+              <a:t>Role tagging for a registered user as innovation evangelist.</a:t>
+            </a:r>
+            <a:endParaRPr lang="en-IN" sz="1600" dirty="0" smtClean="0"/>
+          </a:p>
+          <a:p>
+            <a:pPr marL="742950" lvl="1" indent="-285750">
+              <a:buFont typeface="Arial" panose="020B0604020202020204" pitchFamily="34" charset="0"/>
+              <a:buChar char="•"/>
+            </a:pPr>
+            <a:endParaRPr lang="en-IN" sz="1600" dirty="0" smtClean="0"/>
+          </a:p>
+          <a:p>
+            <a:pPr marL="742950" lvl="1" indent="-285750">
+              <a:buFont typeface="Arial" panose="020B0604020202020204" pitchFamily="34" charset="0"/>
+              <a:buChar char="•"/>
+            </a:pPr>
+            <a:endParaRPr lang="en-IN" sz="1600" dirty="0" smtClean="0"/>
+          </a:p>
+          <a:p>
+            <a:pPr marL="742950" lvl="1" indent="-285750">
+              <a:buFont typeface="Arial" panose="020B0604020202020204" pitchFamily="34" charset="0"/>
+              <a:buChar char="•"/>
+            </a:pPr>
+            <a:endParaRPr lang="en-IN" sz="1600" dirty="0"/>
+          </a:p>
+        </p:txBody>
+      </p:sp>
+    </p:spTree>
+    <p:extLst>
+      <p:ext uri="{BB962C8B-B14F-4D97-AF65-F5344CB8AC3E}">
+        <p14:creationId xmlns:p14="http://schemas.microsoft.com/office/powerpoint/2010/main" val="4050091143"/>
+      </p:ext>
+    </p:extLst>
+  </p:cSld>
+  <p:clrMapOvr>
+    <a:masterClrMapping/>
+  </p:clrMapOvr>
+</p:sld>
+</file>
+
+<file path=ppt/slides/slide4.xml><?xml version="1.0" encoding="utf-8"?>
+<p:sld xmlns:a="http://schemas.openxmlformats.org/drawingml/2006/main" xmlns:r="http://schemas.openxmlformats.org/officeDocument/2006/relationships" xmlns:p="http://schemas.openxmlformats.org/presentationml/2006/main">
+  <p:cSld>
+    <p:spTree>
+      <p:nvGrpSpPr>
+        <p:cNvPr id="1" name=""/>
+        <p:cNvGrpSpPr/>
+        <p:nvPr/>
+      </p:nvGrpSpPr>
+      <p:grpSpPr>
+        <a:xfrm>
+          <a:off x="0" y="0"/>
+          <a:ext cx="0" cy="0"/>
+          <a:chOff x="0" y="0"/>
+          <a:chExt cx="0" cy="0"/>
+        </a:xfrm>
+      </p:grpSpPr>
+      <p:sp>
+        <p:nvSpPr>
+          <p:cNvPr id="2" name="Title 1"/>
+          <p:cNvSpPr>
+            <a:spLocks noGrp="1"/>
+          </p:cNvSpPr>
+          <p:nvPr>
+            <p:ph type="ctrTitle"/>
+          </p:nvPr>
+        </p:nvSpPr>
+        <p:spPr>
+          <a:xfrm>
+            <a:off x="1443079" y="1389400"/>
+            <a:ext cx="9144000" cy="860186"/>
+          </a:xfrm>
+        </p:spPr>
+        <p:txBody>
+          <a:bodyPr>
+            <a:noAutofit/>
+          </a:bodyPr>
+          <a:lstStyle/>
+          <a:p>
+            <a:r>
+              <a:rPr lang="en-IN" sz="2000" dirty="0"/>
+              <a:t>As an Innovation event coordinators/promoters, I would like to conduct the </a:t>
+            </a:r>
+            <a:r>
+              <a:rPr lang="en-IN" sz="2000" dirty="0" err="1"/>
+              <a:t>Ideathon</a:t>
+            </a:r>
+            <a:r>
+              <a:rPr lang="en-IN" sz="2000" dirty="0"/>
+              <a:t>/</a:t>
+            </a:r>
+            <a:r>
+              <a:rPr lang="en-IN" sz="2000" dirty="0" err="1"/>
+              <a:t>Hackathon</a:t>
+            </a:r>
+            <a:r>
+              <a:rPr lang="en-IN" sz="2000" dirty="0"/>
+              <a:t> events.</a:t>
+            </a:r>
+          </a:p>
+        </p:txBody>
+      </p:sp>
+      <p:sp>
+        <p:nvSpPr>
+          <p:cNvPr id="3" name="Title 1"/>
+          <p:cNvSpPr txBox="1">
+            <a:spLocks/>
+          </p:cNvSpPr>
+          <p:nvPr/>
+        </p:nvSpPr>
+        <p:spPr>
+          <a:xfrm>
+            <a:off x="0" y="404602"/>
+            <a:ext cx="3447207" cy="663547"/>
+          </a:xfrm>
+          <a:prstGeom prst="rect">
+            <a:avLst/>
+          </a:prstGeom>
+        </p:spPr>
+        <p:txBody>
+          <a:bodyPr vert="horz" lIns="91440" tIns="45720" rIns="91440" bIns="45720" rtlCol="0" anchor="b">
+            <a:normAutofit/>
+          </a:bodyPr>
+          <a:lstStyle>
+            <a:lvl1pPr algn="ctr" defTabSz="914400" rtl="0" eaLnBrk="1" latinLnBrk="0" hangingPunct="1">
+              <a:lnSpc>
+                <a:spcPct val="90000"/>
+              </a:lnSpc>
+              <a:spcBef>
+                <a:spcPct val="0"/>
+              </a:spcBef>
+              <a:buNone/>
+              <a:defRPr sz="6000" kern="1200">
+                <a:solidFill>
+                  <a:schemeClr val="tx1"/>
+                </a:solidFill>
+                <a:latin typeface="+mj-lt"/>
+                <a:ea typeface="+mj-ea"/>
+                <a:cs typeface="+mj-cs"/>
+              </a:defRPr>
+            </a:lvl1pPr>
+          </a:lstStyle>
+          <a:p>
+            <a:r>
+              <a:rPr lang="en-IN" sz="4000" dirty="0" smtClean="0"/>
+              <a:t>Use-case 3:</a:t>
+            </a:r>
+            <a:endParaRPr lang="en-IN" sz="4000" dirty="0"/>
+          </a:p>
+        </p:txBody>
+      </p:sp>
+      <p:sp>
+        <p:nvSpPr>
+          <p:cNvPr id="4" name="TextBox 3"/>
+          <p:cNvSpPr txBox="1"/>
+          <p:nvPr/>
+        </p:nvSpPr>
+        <p:spPr>
+          <a:xfrm>
+            <a:off x="412694" y="2751291"/>
+            <a:ext cx="3992118" cy="1631216"/>
+          </a:xfrm>
+          <a:prstGeom prst="rect">
+            <a:avLst/>
+          </a:prstGeom>
+          <a:noFill/>
+        </p:spPr>
+        <p:txBody>
+          <a:bodyPr wrap="none" rtlCol="0">
+            <a:spAutoFit/>
+          </a:bodyPr>
+          <a:lstStyle/>
+          <a:p>
+            <a:r>
+              <a:rPr lang="en-IN" u="sng" dirty="0" smtClean="0"/>
+              <a:t>Functional scope:</a:t>
+            </a:r>
+          </a:p>
+          <a:p>
+            <a:endParaRPr lang="en-IN" u="sng" dirty="0" smtClean="0"/>
+          </a:p>
+          <a:p>
+            <a:pPr marL="742950" lvl="1" indent="-285750">
+              <a:buFont typeface="Arial" panose="020B0604020202020204" pitchFamily="34" charset="0"/>
+              <a:buChar char="•"/>
+            </a:pPr>
+            <a:r>
+              <a:rPr lang="en-IN" sz="1600" dirty="0" smtClean="0"/>
+              <a:t>On-boarding or registration process .</a:t>
+            </a:r>
+            <a:endParaRPr lang="en-IN" sz="1600" dirty="0" smtClean="0"/>
+          </a:p>
+          <a:p>
+            <a:pPr marL="742950" lvl="1" indent="-285750">
+              <a:buFont typeface="Arial" panose="020B0604020202020204" pitchFamily="34" charset="0"/>
+              <a:buChar char="•"/>
+            </a:pPr>
+            <a:endParaRPr lang="en-IN" sz="1600" dirty="0" smtClean="0"/>
+          </a:p>
+          <a:p>
+            <a:pPr marL="742950" lvl="1" indent="-285750">
+              <a:buFont typeface="Arial" panose="020B0604020202020204" pitchFamily="34" charset="0"/>
+              <a:buChar char="•"/>
+            </a:pPr>
+            <a:endParaRPr lang="en-IN" sz="1600" dirty="0" smtClean="0"/>
+          </a:p>
+          <a:p>
+            <a:pPr marL="742950" lvl="1" indent="-285750">
+              <a:buFont typeface="Arial" panose="020B0604020202020204" pitchFamily="34" charset="0"/>
+              <a:buChar char="•"/>
+            </a:pPr>
+            <a:endParaRPr lang="en-IN" sz="1600" dirty="0"/>
+          </a:p>
+        </p:txBody>
+      </p:sp>
+    </p:spTree>
+    <p:extLst>
+      <p:ext uri="{BB962C8B-B14F-4D97-AF65-F5344CB8AC3E}">
+        <p14:creationId xmlns:p14="http://schemas.microsoft.com/office/powerpoint/2010/main" val="1445020954"/>
       </p:ext>
     </p:extLst>
   </p:cSld>

</xml_diff>

<commit_message>
Functional scope added on use-cases
</commit_message>
<xml_diff>
--- a/2.use-cases/Use-cases.pptx
+++ b/2.use-cases/Use-cases.pptx
@@ -2984,7 +2984,7 @@
         </p:nvSpPr>
         <p:spPr>
           <a:xfrm>
-            <a:off x="0" y="404602"/>
+            <a:off x="0" y="0"/>
             <a:ext cx="3447207" cy="663547"/>
           </a:xfrm>
         </p:spPr>
@@ -2996,7 +2996,7 @@
           <a:p>
             <a:r>
               <a:rPr lang="en-IN" sz="4000" dirty="0" smtClean="0"/>
-              <a:t>Business scope</a:t>
+              <a:t>Product scope</a:t>
             </a:r>
             <a:endParaRPr lang="en-IN" sz="4000" dirty="0"/>
           </a:p>
@@ -3010,8 +3010,8 @@
         </p:nvSpPr>
         <p:spPr>
           <a:xfrm>
-            <a:off x="1035782" y="1447587"/>
-            <a:ext cx="10115043" cy="2141805"/>
+            <a:off x="752560" y="816409"/>
+            <a:ext cx="10115043" cy="2393540"/>
           </a:xfrm>
           <a:prstGeom prst="rect">
             <a:avLst/>
@@ -3047,7 +3047,7 @@
                 <a:ea typeface="Calibri" panose="020F0502020204030204" pitchFamily="34" charset="0"/>
                 <a:cs typeface="Times New Roman" panose="02020603050405020304" pitchFamily="18" charset="0"/>
               </a:rPr>
-              <a:t> is a single stop solution which can be used for the following scenarios</a:t>
+              <a:t> is </a:t>
             </a:r>
             <a:r>
               <a:rPr lang="en-IN" sz="1600" dirty="0" smtClean="0">
@@ -3055,8 +3055,29 @@
                 <a:ea typeface="Calibri" panose="020F0502020204030204" pitchFamily="34" charset="0"/>
                 <a:cs typeface="Times New Roman" panose="02020603050405020304" pitchFamily="18" charset="0"/>
               </a:rPr>
-              <a:t>.</a:t>
-            </a:r>
+              <a:t>an one stop </a:t>
+            </a:r>
+            <a:r>
+              <a:rPr lang="en-IN" sz="1600" dirty="0">
+                <a:latin typeface="Calibri" panose="020F0502020204030204" pitchFamily="34" charset="0"/>
+                <a:ea typeface="Calibri" panose="020F0502020204030204" pitchFamily="34" charset="0"/>
+                <a:cs typeface="Times New Roman" panose="02020603050405020304" pitchFamily="18" charset="0"/>
+              </a:rPr>
+              <a:t>solution </a:t>
+            </a:r>
+            <a:r>
+              <a:rPr lang="en-IN" sz="1600" dirty="0" smtClean="0">
+                <a:latin typeface="Calibri" panose="020F0502020204030204" pitchFamily="34" charset="0"/>
+                <a:ea typeface="Calibri" panose="020F0502020204030204" pitchFamily="34" charset="0"/>
+                <a:cs typeface="Times New Roman" panose="02020603050405020304" pitchFamily="18" charset="0"/>
+              </a:rPr>
+              <a:t>for fostering creativity and managing innovation with in an organisation.</a:t>
+            </a:r>
+            <a:endParaRPr lang="en-IN" sz="1600" dirty="0" smtClean="0">
+              <a:latin typeface="Calibri" panose="020F0502020204030204" pitchFamily="34" charset="0"/>
+              <a:ea typeface="Calibri" panose="020F0502020204030204" pitchFamily="34" charset="0"/>
+              <a:cs typeface="Times New Roman" panose="02020603050405020304" pitchFamily="18" charset="0"/>
+            </a:endParaRPr>
           </a:p>
           <a:p>
             <a:pPr lvl="1">
@@ -3067,20 +3088,48 @@
                 <a:spcPts val="0"/>
               </a:spcAft>
             </a:pPr>
-            <a:endParaRPr lang="en-IN" sz="1600" dirty="0">
+            <a:endParaRPr lang="en-IN" sz="1600" dirty="0" smtClean="0">
               <a:latin typeface="Calibri" panose="020F0502020204030204" pitchFamily="34" charset="0"/>
               <a:ea typeface="Calibri" panose="020F0502020204030204" pitchFamily="34" charset="0"/>
               <a:cs typeface="Times New Roman" panose="02020603050405020304" pitchFamily="18" charset="0"/>
             </a:endParaRPr>
           </a:p>
           <a:p>
-            <a:pPr marL="1143000" lvl="2" indent="-228600">
+            <a:pPr lvl="1">
               <a:lnSpc>
                 <a:spcPct val="107000"/>
               </a:lnSpc>
               <a:spcAft>
                 <a:spcPts val="0"/>
               </a:spcAft>
+            </a:pPr>
+            <a:r>
+              <a:rPr lang="en-IN" sz="1600" b="1" dirty="0" smtClean="0">
+                <a:latin typeface="Calibri" panose="020F0502020204030204" pitchFamily="34" charset="0"/>
+                <a:ea typeface="Calibri" panose="020F0502020204030204" pitchFamily="34" charset="0"/>
+                <a:cs typeface="Times New Roman" panose="02020603050405020304" pitchFamily="18" charset="0"/>
+              </a:rPr>
+              <a:t>            </a:t>
+            </a:r>
+            <a:r>
+              <a:rPr lang="en-IN" sz="1600" b="1" u="sng" dirty="0" smtClean="0">
+                <a:latin typeface="Calibri" panose="020F0502020204030204" pitchFamily="34" charset="0"/>
+                <a:ea typeface="Calibri" panose="020F0502020204030204" pitchFamily="34" charset="0"/>
+                <a:cs typeface="Times New Roman" panose="02020603050405020304" pitchFamily="18" charset="0"/>
+              </a:rPr>
+              <a:t>MVP :</a:t>
+            </a:r>
+            <a:endParaRPr lang="en-IN" sz="1600" b="1" u="sng" dirty="0">
+              <a:latin typeface="Calibri" panose="020F0502020204030204" pitchFamily="34" charset="0"/>
+              <a:ea typeface="Calibri" panose="020F0502020204030204" pitchFamily="34" charset="0"/>
+              <a:cs typeface="Times New Roman" panose="02020603050405020304" pitchFamily="18" charset="0"/>
+            </a:endParaRPr>
+          </a:p>
+          <a:p>
+            <a:pPr marL="1600200" lvl="3" indent="-228600">
+              <a:lnSpc>
+                <a:spcPct val="107000"/>
+              </a:lnSpc>
               <a:buFont typeface="+mj-lt"/>
               <a:buAutoNum type="arabicPeriod"/>
             </a:pPr>
@@ -3107,13 +3156,10 @@
             </a:endParaRPr>
           </a:p>
           <a:p>
-            <a:pPr marL="1143000" lvl="2" indent="-228600">
+            <a:pPr marL="1600200" lvl="3" indent="-228600">
               <a:lnSpc>
                 <a:spcPct val="107000"/>
               </a:lnSpc>
-              <a:spcAft>
-                <a:spcPts val="0"/>
-              </a:spcAft>
               <a:buFont typeface="+mj-lt"/>
               <a:buAutoNum type="arabicPeriod"/>
             </a:pPr>
@@ -3202,6 +3248,66 @@
               <a:ea typeface="Calibri" panose="020F0502020204030204" pitchFamily="34" charset="0"/>
               <a:cs typeface="Times New Roman" panose="02020603050405020304" pitchFamily="18" charset="0"/>
             </a:endParaRPr>
+          </a:p>
+          <a:p>
+            <a:pPr marL="1600200" lvl="3" indent="-228600">
+              <a:lnSpc>
+                <a:spcPct val="107000"/>
+              </a:lnSpc>
+              <a:spcAft>
+                <a:spcPts val="800"/>
+              </a:spcAft>
+              <a:buFont typeface="+mj-lt"/>
+              <a:buAutoNum type="arabicPeriod"/>
+            </a:pPr>
+            <a:r>
+              <a:rPr lang="en-IN" sz="1600" dirty="0" err="1" smtClean="0">
+                <a:latin typeface="Calibri" panose="020F0502020204030204" pitchFamily="34" charset="0"/>
+                <a:ea typeface="Calibri" panose="020F0502020204030204" pitchFamily="34" charset="0"/>
+                <a:cs typeface="Times New Roman" panose="02020603050405020304" pitchFamily="18" charset="0"/>
+              </a:rPr>
+              <a:t>Ideathon</a:t>
+            </a:r>
+            <a:r>
+              <a:rPr lang="en-IN" sz="1600" dirty="0" smtClean="0">
+                <a:latin typeface="Calibri" panose="020F0502020204030204" pitchFamily="34" charset="0"/>
+                <a:ea typeface="Calibri" panose="020F0502020204030204" pitchFamily="34" charset="0"/>
+                <a:cs typeface="Times New Roman" panose="02020603050405020304" pitchFamily="18" charset="0"/>
+              </a:rPr>
+              <a:t>/</a:t>
+            </a:r>
+            <a:r>
+              <a:rPr lang="en-IN" sz="1600" dirty="0" err="1" smtClean="0">
+                <a:latin typeface="Calibri" panose="020F0502020204030204" pitchFamily="34" charset="0"/>
+                <a:ea typeface="Calibri" panose="020F0502020204030204" pitchFamily="34" charset="0"/>
+                <a:cs typeface="Times New Roman" panose="02020603050405020304" pitchFamily="18" charset="0"/>
+              </a:rPr>
+              <a:t>Hackathon</a:t>
+            </a:r>
+            <a:r>
+              <a:rPr lang="en-IN" sz="1600" dirty="0" smtClean="0">
+                <a:latin typeface="Calibri" panose="020F0502020204030204" pitchFamily="34" charset="0"/>
+                <a:ea typeface="Calibri" panose="020F0502020204030204" pitchFamily="34" charset="0"/>
+                <a:cs typeface="Times New Roman" panose="02020603050405020304" pitchFamily="18" charset="0"/>
+              </a:rPr>
+              <a:t> </a:t>
+            </a:r>
+            <a:r>
+              <a:rPr lang="en-IN" sz="1600" dirty="0">
+                <a:latin typeface="Calibri" panose="020F0502020204030204" pitchFamily="34" charset="0"/>
+                <a:ea typeface="Calibri" panose="020F0502020204030204" pitchFamily="34" charset="0"/>
+                <a:cs typeface="Times New Roman" panose="02020603050405020304" pitchFamily="18" charset="0"/>
+              </a:rPr>
+              <a:t>can be conducted with the help of the Portal and the inbuilt Framework </a:t>
+            </a:r>
+            <a:r>
+              <a:rPr lang="en-IN" sz="1600" dirty="0" smtClean="0">
+                <a:latin typeface="Calibri" panose="020F0502020204030204" pitchFamily="34" charset="0"/>
+                <a:ea typeface="Calibri" panose="020F0502020204030204" pitchFamily="34" charset="0"/>
+                <a:cs typeface="Times New Roman" panose="02020603050405020304" pitchFamily="18" charset="0"/>
+              </a:rPr>
+              <a:t>built.</a:t>
+            </a:r>
           </a:p>
           <a:p>
             <a:pPr marL="1143000" lvl="2" indent="-228600">
@@ -3214,66 +3320,6 @@
               <a:buFont typeface="+mj-lt"/>
               <a:buAutoNum type="arabicPeriod"/>
             </a:pPr>
-            <a:r>
-              <a:rPr lang="en-IN" sz="1600" dirty="0" err="1" smtClean="0">
-                <a:latin typeface="Calibri" panose="020F0502020204030204" pitchFamily="34" charset="0"/>
-                <a:ea typeface="Calibri" panose="020F0502020204030204" pitchFamily="34" charset="0"/>
-                <a:cs typeface="Times New Roman" panose="02020603050405020304" pitchFamily="18" charset="0"/>
-              </a:rPr>
-              <a:t>Ideathon</a:t>
-            </a:r>
-            <a:r>
-              <a:rPr lang="en-IN" sz="1600" dirty="0" smtClean="0">
-                <a:latin typeface="Calibri" panose="020F0502020204030204" pitchFamily="34" charset="0"/>
-                <a:ea typeface="Calibri" panose="020F0502020204030204" pitchFamily="34" charset="0"/>
-                <a:cs typeface="Times New Roman" panose="02020603050405020304" pitchFamily="18" charset="0"/>
-              </a:rPr>
-              <a:t>/</a:t>
-            </a:r>
-            <a:r>
-              <a:rPr lang="en-IN" sz="1600" dirty="0" err="1" smtClean="0">
-                <a:latin typeface="Calibri" panose="020F0502020204030204" pitchFamily="34" charset="0"/>
-                <a:ea typeface="Calibri" panose="020F0502020204030204" pitchFamily="34" charset="0"/>
-                <a:cs typeface="Times New Roman" panose="02020603050405020304" pitchFamily="18" charset="0"/>
-              </a:rPr>
-              <a:t>Hackathon</a:t>
-            </a:r>
-            <a:r>
-              <a:rPr lang="en-IN" sz="1600" dirty="0" smtClean="0">
-                <a:latin typeface="Calibri" panose="020F0502020204030204" pitchFamily="34" charset="0"/>
-                <a:ea typeface="Calibri" panose="020F0502020204030204" pitchFamily="34" charset="0"/>
-                <a:cs typeface="Times New Roman" panose="02020603050405020304" pitchFamily="18" charset="0"/>
-              </a:rPr>
-              <a:t> </a:t>
-            </a:r>
-            <a:r>
-              <a:rPr lang="en-IN" sz="1600" dirty="0">
-                <a:latin typeface="Calibri" panose="020F0502020204030204" pitchFamily="34" charset="0"/>
-                <a:ea typeface="Calibri" panose="020F0502020204030204" pitchFamily="34" charset="0"/>
-                <a:cs typeface="Times New Roman" panose="02020603050405020304" pitchFamily="18" charset="0"/>
-              </a:rPr>
-              <a:t>can be conducted with the help of the Portal and the inbuilt Framework </a:t>
-            </a:r>
-            <a:r>
-              <a:rPr lang="en-IN" sz="1600" dirty="0" smtClean="0">
-                <a:latin typeface="Calibri" panose="020F0502020204030204" pitchFamily="34" charset="0"/>
-                <a:ea typeface="Calibri" panose="020F0502020204030204" pitchFamily="34" charset="0"/>
-                <a:cs typeface="Times New Roman" panose="02020603050405020304" pitchFamily="18" charset="0"/>
-              </a:rPr>
-              <a:t>built.</a:t>
-            </a:r>
-          </a:p>
-          <a:p>
-            <a:pPr marL="1143000" lvl="2" indent="-228600">
-              <a:lnSpc>
-                <a:spcPct val="107000"/>
-              </a:lnSpc>
-              <a:spcAft>
-                <a:spcPts val="800"/>
-              </a:spcAft>
-              <a:buFont typeface="+mj-lt"/>
-              <a:buAutoNum type="arabicPeriod"/>
-            </a:pPr>
             <a:endParaRPr lang="en-IN" sz="1600" dirty="0">
               <a:effectLst/>
               <a:latin typeface="Calibri" panose="020F0502020204030204" pitchFamily="34" charset="0"/>
@@ -3307,8 +3353,8 @@
         </p:nvSpPr>
         <p:spPr>
           <a:xfrm>
-            <a:off x="614995" y="3507913"/>
-            <a:ext cx="6129627" cy="2862322"/>
+            <a:off x="305750" y="3068608"/>
+            <a:ext cx="8917698" cy="4339650"/>
           </a:xfrm>
           <a:prstGeom prst="rect">
             <a:avLst/>
@@ -3336,8 +3382,9 @@
             </a:pPr>
             <a:r>
               <a:rPr lang="en-IN" sz="1600" dirty="0" smtClean="0"/>
-              <a:t>Enrolment facility to be provided .</a:t>
-            </a:r>
+              <a:t>Registration facility for user</a:t>
+            </a:r>
+            <a:endParaRPr lang="en-IN" sz="1600" dirty="0" smtClean="0"/>
           </a:p>
           <a:p>
             <a:pPr marL="742950" lvl="1" indent="-285750">
@@ -3346,7 +3393,11 @@
             </a:pPr>
             <a:r>
               <a:rPr lang="en-IN" sz="1600" dirty="0" smtClean="0"/>
-              <a:t>Data required during enrolment to be identified.</a:t>
+              <a:t>Authentication </a:t>
+            </a:r>
+            <a:r>
+              <a:rPr lang="en-IN" sz="1600" dirty="0" smtClean="0"/>
+              <a:t>&amp; Role based access.</a:t>
             </a:r>
           </a:p>
           <a:p>
@@ -3356,7 +3407,27 @@
             </a:pPr>
             <a:r>
               <a:rPr lang="en-IN" sz="1600" dirty="0" smtClean="0"/>
-              <a:t>Authentication &amp; Role based access.</a:t>
+              <a:t>Users to be </a:t>
+            </a:r>
+            <a:r>
+              <a:rPr lang="en-IN" sz="1600" dirty="0" smtClean="0"/>
+              <a:t>categorised in </a:t>
+            </a:r>
+            <a:r>
+              <a:rPr lang="en-IN" sz="1600" dirty="0" smtClean="0"/>
+              <a:t>an </a:t>
+            </a:r>
+            <a:r>
+              <a:rPr lang="en-IN" sz="1600" dirty="0" smtClean="0"/>
+              <a:t>organisational context/</a:t>
+            </a:r>
+            <a:r>
+              <a:rPr lang="en-IN" sz="1600" dirty="0" err="1" smtClean="0"/>
+              <a:t>Hackathon</a:t>
+            </a:r>
+            <a:r>
+              <a:rPr lang="en-IN" sz="1600" dirty="0" smtClean="0"/>
+              <a:t>.</a:t>
             </a:r>
           </a:p>
           <a:p>
@@ -3366,7 +3437,7 @@
             </a:pPr>
             <a:r>
               <a:rPr lang="en-IN" sz="1600" dirty="0" smtClean="0"/>
-              <a:t>Users to be decided in an organisation and Hackathon context.</a:t>
+              <a:t>Tool should intake ideas ,link categorise and classify them appropriately .</a:t>
             </a:r>
           </a:p>
           <a:p>
@@ -3374,35 +3445,95 @@
               <a:buFont typeface="Arial" panose="020B0604020202020204" pitchFamily="34" charset="0"/>
               <a:buChar char="•"/>
             </a:pPr>
-            <a:endParaRPr lang="en-IN" sz="1600" dirty="0" smtClean="0"/>
+            <a:r>
+              <a:rPr lang="en-IN" sz="1600" dirty="0" smtClean="0"/>
+              <a:t>Tool should assign and idea to an innovation evangelist of that </a:t>
+            </a:r>
+            <a:r>
+              <a:rPr lang="en-IN" sz="1600" b="1" dirty="0" smtClean="0"/>
+              <a:t>domain </a:t>
+            </a:r>
+            <a:r>
+              <a:rPr lang="en-IN" sz="1600" dirty="0" smtClean="0"/>
+              <a:t>for evaluation.</a:t>
+            </a:r>
           </a:p>
           <a:p>
             <a:pPr marL="742950" lvl="1" indent="-285750">
               <a:buFont typeface="Arial" panose="020B0604020202020204" pitchFamily="34" charset="0"/>
               <a:buChar char="•"/>
             </a:pPr>
-            <a:endParaRPr lang="en-IN" sz="1600" dirty="0" smtClean="0"/>
+            <a:r>
+              <a:rPr lang="en-IN" sz="1600" dirty="0" smtClean="0"/>
+              <a:t>Tool should inform the user about status on approval and with whom it’s pending .</a:t>
+            </a:r>
           </a:p>
           <a:p>
             <a:pPr marL="742950" lvl="1" indent="-285750">
               <a:buFont typeface="Arial" panose="020B0604020202020204" pitchFamily="34" charset="0"/>
               <a:buChar char="•"/>
             </a:pPr>
-            <a:endParaRPr lang="en-IN" sz="1600" dirty="0" smtClean="0"/>
+            <a:r>
+              <a:rPr lang="en-IN" sz="1600" dirty="0"/>
+              <a:t>Send alerts or notifications to users </a:t>
+            </a:r>
+            <a:r>
+              <a:rPr lang="en-IN" sz="1600" dirty="0" smtClean="0"/>
+              <a:t>about assignment / feedback .</a:t>
+            </a:r>
           </a:p>
           <a:p>
             <a:pPr marL="742950" lvl="1" indent="-285750">
               <a:buFont typeface="Arial" panose="020B0604020202020204" pitchFamily="34" charset="0"/>
               <a:buChar char="•"/>
             </a:pPr>
+            <a:r>
+              <a:rPr lang="en-IN" sz="1600" dirty="0"/>
+              <a:t>For an approved idea , Team formation facility from the tool using the available registered users.</a:t>
+            </a:r>
+          </a:p>
+          <a:p>
+            <a:pPr lvl="1"/>
             <a:endParaRPr lang="en-IN" sz="1600" dirty="0" smtClean="0"/>
+          </a:p>
+          <a:p>
+            <a:pPr lvl="1"/>
+            <a:endParaRPr lang="en-IN" sz="1600" dirty="0"/>
           </a:p>
           <a:p>
             <a:pPr marL="742950" lvl="1" indent="-285750">
               <a:buFont typeface="Arial" panose="020B0604020202020204" pitchFamily="34" charset="0"/>
               <a:buChar char="•"/>
             </a:pPr>
-            <a:endParaRPr lang="en-IN" sz="1600" dirty="0"/>
+            <a:endParaRPr lang="en-IN" sz="1600" dirty="0" smtClean="0"/>
+          </a:p>
+          <a:p>
+            <a:pPr marL="742950" lvl="1" indent="-285750">
+              <a:buFont typeface="Arial" panose="020B0604020202020204" pitchFamily="34" charset="0"/>
+              <a:buChar char="•"/>
+            </a:pPr>
+            <a:endParaRPr lang="en-IN" sz="1600" dirty="0" smtClean="0"/>
+          </a:p>
+          <a:p>
+            <a:pPr marL="742950" lvl="1" indent="-285750">
+              <a:buFont typeface="Arial" panose="020B0604020202020204" pitchFamily="34" charset="0"/>
+              <a:buChar char="•"/>
+            </a:pPr>
+            <a:endParaRPr lang="en-IN" sz="1600" dirty="0" smtClean="0"/>
+          </a:p>
+          <a:p>
+            <a:pPr marL="742950" lvl="1" indent="-285750">
+              <a:buFont typeface="Arial" panose="020B0604020202020204" pitchFamily="34" charset="0"/>
+              <a:buChar char="•"/>
+            </a:pPr>
+            <a:endParaRPr lang="en-IN" sz="1600" dirty="0" smtClean="0"/>
+          </a:p>
+          <a:p>
+            <a:pPr marL="742950" lvl="1" indent="-285750">
+              <a:buFont typeface="Arial" panose="020B0604020202020204" pitchFamily="34" charset="0"/>
+              <a:buChar char="•"/>
+            </a:pPr>
+            <a:endParaRPr lang="en-IN" sz="1600" dirty="0" smtClean="0"/>
           </a:p>
         </p:txBody>
       </p:sp>
@@ -3468,7 +3599,23 @@
             </a:r>
             <a:r>
               <a:rPr lang="en-IN" sz="1600" dirty="0"/>
-              <a:t>I would like to share my ideas related to a new product/feature in an existing product/solution to an existing problem statement. I need my proposal to be evaluated, guided for the </a:t>
+              <a:t>I would like to share my </a:t>
+            </a:r>
+            <a:r>
+              <a:rPr lang="en-IN" sz="1600" dirty="0" smtClean="0"/>
+              <a:t>ideas , P.I’s, P.O.C’s , P.O.V’s,  </a:t>
+            </a:r>
+            <a:r>
+              <a:rPr lang="en-IN" sz="1600" dirty="0"/>
+              <a:t>related to a new </a:t>
+            </a:r>
+            <a:r>
+              <a:rPr lang="en-IN" sz="1600" dirty="0" smtClean="0"/>
+              <a:t>product/feature in </a:t>
+            </a:r>
+            <a:r>
+              <a:rPr lang="en-IN" sz="1600" dirty="0"/>
+              <a:t>an existing product/solution to an existing problem statement. I need my proposal to be evaluated, guided for the </a:t>
             </a:r>
             <a:r>
               <a:rPr lang="en-IN" sz="1600" dirty="0" err="1"/>
@@ -3542,8 +3689,8 @@
         </p:nvSpPr>
         <p:spPr>
           <a:xfrm>
-            <a:off x="412694" y="2751291"/>
-            <a:ext cx="5551841" cy="2123658"/>
+            <a:off x="1545580" y="2670371"/>
+            <a:ext cx="8448084" cy="4339650"/>
           </a:xfrm>
           <a:prstGeom prst="rect">
             <a:avLst/>
@@ -3551,7 +3698,7 @@
           <a:noFill/>
         </p:spPr>
         <p:txBody>
-          <a:bodyPr wrap="none" rtlCol="0">
+          <a:bodyPr wrap="square" rtlCol="0">
             <a:spAutoFit/>
           </a:bodyPr>
           <a:lstStyle/>
@@ -3571,7 +3718,11 @@
             </a:pPr>
             <a:r>
               <a:rPr lang="en-IN" sz="1600" dirty="0"/>
-              <a:t>Idea life-cycle to be defined.</a:t>
+              <a:t>Idea life-cycle to be defined</a:t>
+            </a:r>
+            <a:r>
+              <a:rPr lang="en-IN" sz="1600" dirty="0" smtClean="0"/>
+              <a:t>.</a:t>
             </a:r>
           </a:p>
           <a:p>
@@ -3580,16 +3731,99 @@
               <a:buChar char="•"/>
             </a:pPr>
             <a:r>
+              <a:rPr lang="en-IN" sz="1600" dirty="0" smtClean="0"/>
+              <a:t>Classification of ideas during on-boarding either as enhancement or new product.  </a:t>
+            </a:r>
+            <a:endParaRPr lang="en-IN" sz="1600" dirty="0"/>
+          </a:p>
+          <a:p>
+            <a:pPr marL="742950" lvl="1" indent="-285750">
+              <a:buFont typeface="Arial" panose="020B0604020202020204" pitchFamily="34" charset="0"/>
+              <a:buChar char="•"/>
+            </a:pPr>
+            <a:r>
               <a:rPr lang="en-IN" sz="1600" dirty="0"/>
-              <a:t>Contents to be collected as a part of idea to be defined.</a:t>
-            </a:r>
-          </a:p>
-          <a:p>
-            <a:pPr lvl="1"/>
+              <a:t>Contents to be collected as a part of idea to be defined</a:t>
+            </a:r>
             <a:r>
               <a:rPr lang="en-IN" sz="1600" dirty="0" smtClean="0"/>
               <a:t>.</a:t>
             </a:r>
+          </a:p>
+          <a:p>
+            <a:pPr marL="742950" lvl="1" indent="-285750">
+              <a:buFont typeface="Arial" panose="020B0604020202020204" pitchFamily="34" charset="0"/>
+              <a:buChar char="•"/>
+            </a:pPr>
+            <a:r>
+              <a:rPr lang="en-IN" sz="1600" dirty="0" smtClean="0"/>
+              <a:t>Differences in P.O.V or P.O.C’s and P.I’s during data intake.</a:t>
+            </a:r>
+            <a:endParaRPr lang="en-IN" sz="1600" dirty="0" smtClean="0"/>
+          </a:p>
+          <a:p>
+            <a:pPr marL="742950" lvl="1" indent="-285750">
+              <a:buFont typeface="Arial" panose="020B0604020202020204" pitchFamily="34" charset="0"/>
+              <a:buChar char="•"/>
+            </a:pPr>
+            <a:r>
+              <a:rPr lang="en-IN" sz="1600" dirty="0" smtClean="0"/>
+              <a:t>View of the feedback received </a:t>
+            </a:r>
+          </a:p>
+          <a:p>
+            <a:pPr marL="742950" lvl="1" indent="-285750">
+              <a:buFont typeface="Arial" panose="020B0604020202020204" pitchFamily="34" charset="0"/>
+              <a:buChar char="•"/>
+            </a:pPr>
+            <a:r>
+              <a:rPr lang="en-IN" sz="1600" dirty="0" smtClean="0"/>
+              <a:t>Status on assignment and approval.</a:t>
+            </a:r>
+          </a:p>
+          <a:p>
+            <a:pPr marL="742950" lvl="1" indent="-285750">
+              <a:buFont typeface="Arial" panose="020B0604020202020204" pitchFamily="34" charset="0"/>
+              <a:buChar char="•"/>
+            </a:pPr>
+            <a:r>
+              <a:rPr lang="en-IN" sz="1600" dirty="0"/>
+              <a:t>Approval functionality to be defined </a:t>
+            </a:r>
+            <a:r>
+              <a:rPr lang="en-IN" sz="1600" dirty="0" smtClean="0"/>
+              <a:t>.</a:t>
+            </a:r>
+            <a:endParaRPr lang="en-IN" sz="1600" dirty="0" smtClean="0"/>
+          </a:p>
+          <a:p>
+            <a:pPr marL="742950" lvl="1" indent="-285750">
+              <a:buFont typeface="Arial" panose="020B0604020202020204" pitchFamily="34" charset="0"/>
+              <a:buChar char="•"/>
+            </a:pPr>
+            <a:r>
+              <a:rPr lang="en-IN" sz="1600" dirty="0" smtClean="0"/>
+              <a:t>Approved ideas storage and view facility to be defined.</a:t>
+            </a:r>
+          </a:p>
+          <a:p>
+            <a:pPr lvl="1"/>
+            <a:endParaRPr lang="en-IN" sz="1600" dirty="0" smtClean="0"/>
+          </a:p>
+          <a:p>
+            <a:pPr marL="742950" lvl="1" indent="-285750">
+              <a:buFont typeface="Arial" panose="020B0604020202020204" pitchFamily="34" charset="0"/>
+              <a:buChar char="•"/>
+            </a:pPr>
+            <a:endParaRPr lang="en-IN" sz="1600" dirty="0" smtClean="0"/>
+          </a:p>
+          <a:p>
+            <a:pPr lvl="1"/>
+            <a:endParaRPr lang="en-IN" sz="1600" dirty="0"/>
+          </a:p>
+          <a:p>
+            <a:pPr lvl="1"/>
+            <a:endParaRPr lang="en-IN" sz="1600" dirty="0" smtClean="0"/>
           </a:p>
           <a:p>
             <a:pPr marL="742950" lvl="1" indent="-285750">
@@ -3755,7 +3989,7 @@
         <p:spPr>
           <a:xfrm>
             <a:off x="412694" y="2751291"/>
-            <a:ext cx="5771901" cy="1631216"/>
+            <a:ext cx="9030711" cy="3354765"/>
           </a:xfrm>
           <a:prstGeom prst="rect">
             <a:avLst/>
@@ -3763,7 +3997,7 @@
           <a:noFill/>
         </p:spPr>
         <p:txBody>
-          <a:bodyPr wrap="none" rtlCol="0">
+          <a:bodyPr wrap="square" rtlCol="0">
             <a:spAutoFit/>
           </a:bodyPr>
           <a:lstStyle/>
@@ -3783,8 +4017,79 @@
             </a:pPr>
             <a:r>
               <a:rPr lang="en-IN" sz="1600" dirty="0" smtClean="0"/>
-              <a:t>Role tagging for a registered user as innovation evangelist.</a:t>
-            </a:r>
+              <a:t>Role tagging for a registered user as innovation evangelist</a:t>
+            </a:r>
+            <a:r>
+              <a:rPr lang="en-IN" sz="1600" dirty="0" smtClean="0"/>
+              <a:t>.</a:t>
+            </a:r>
+          </a:p>
+          <a:p>
+            <a:pPr marL="742950" lvl="1" indent="-285750">
+              <a:buFont typeface="Arial" panose="020B0604020202020204" pitchFamily="34" charset="0"/>
+              <a:buChar char="•"/>
+            </a:pPr>
+            <a:r>
+              <a:rPr lang="en-IN" sz="1600" dirty="0" smtClean="0"/>
+              <a:t>An innovation evangelist should be tagged to a domain.</a:t>
+            </a:r>
+          </a:p>
+          <a:p>
+            <a:pPr marL="742950" lvl="1" indent="-285750">
+              <a:buFont typeface="Arial" panose="020B0604020202020204" pitchFamily="34" charset="0"/>
+              <a:buChar char="•"/>
+            </a:pPr>
+            <a:r>
+              <a:rPr lang="en-IN" sz="1600" dirty="0" smtClean="0"/>
+              <a:t>A P.I. or P.O.V or P.O.C can be assigned to an innovation evangelist of the domain of that idea.</a:t>
+            </a:r>
+          </a:p>
+          <a:p>
+            <a:pPr marL="742950" lvl="1" indent="-285750">
+              <a:buFont typeface="Arial" panose="020B0604020202020204" pitchFamily="34" charset="0"/>
+              <a:buChar char="•"/>
+            </a:pPr>
+            <a:r>
+              <a:rPr lang="en-IN" sz="1600" dirty="0" smtClean="0"/>
+              <a:t>Feedback provisioning facility for an innovation evangelist with a rejection .</a:t>
+            </a:r>
+          </a:p>
+          <a:p>
+            <a:pPr marL="742950" lvl="1" indent="-285750">
+              <a:buFont typeface="Arial" panose="020B0604020202020204" pitchFamily="34" charset="0"/>
+              <a:buChar char="•"/>
+            </a:pPr>
+            <a:r>
+              <a:rPr lang="en-IN" sz="1600" dirty="0" smtClean="0"/>
+              <a:t>Feedback provisioning facility for an innovation evangelist citing an approva</a:t>
+            </a:r>
+            <a:r>
+              <a:rPr lang="en-IN" sz="1600" dirty="0" smtClean="0"/>
+              <a:t>l.</a:t>
+            </a:r>
+          </a:p>
+          <a:p>
+            <a:pPr marL="742950" lvl="1" indent="-285750">
+              <a:buFont typeface="Arial" panose="020B0604020202020204" pitchFamily="34" charset="0"/>
+              <a:buChar char="•"/>
+            </a:pPr>
+            <a:r>
+              <a:rPr lang="en-IN" sz="1600" dirty="0" smtClean="0"/>
+              <a:t>View for all the ideas assigned , facility to filter upon approved and rejected ideas.</a:t>
+            </a:r>
+          </a:p>
+          <a:p>
+            <a:pPr marL="742950" lvl="1" indent="-285750">
+              <a:buFont typeface="Arial" panose="020B0604020202020204" pitchFamily="34" charset="0"/>
+              <a:buChar char="•"/>
+            </a:pPr>
+            <a:endParaRPr lang="en-IN" sz="1600" dirty="0" smtClean="0"/>
+          </a:p>
+          <a:p>
+            <a:pPr marL="742950" lvl="1" indent="-285750">
+              <a:buFont typeface="Arial" panose="020B0604020202020204" pitchFamily="34" charset="0"/>
+              <a:buChar char="•"/>
+            </a:pPr>
             <a:endParaRPr lang="en-IN" sz="1600" dirty="0" smtClean="0"/>
           </a:p>
           <a:p>
@@ -3943,7 +4248,7 @@
         <p:spPr>
           <a:xfrm>
             <a:off x="412694" y="2751291"/>
-            <a:ext cx="3992118" cy="1631216"/>
+            <a:ext cx="9474389" cy="3354765"/>
           </a:xfrm>
           <a:prstGeom prst="rect">
             <a:avLst/>
@@ -3973,13 +4278,98 @@
               <a:rPr lang="en-IN" sz="1600" dirty="0" smtClean="0"/>
               <a:t>On-boarding or registration process .</a:t>
             </a:r>
-            <a:endParaRPr lang="en-IN" sz="1600" dirty="0" smtClean="0"/>
           </a:p>
           <a:p>
             <a:pPr marL="742950" lvl="1" indent="-285750">
               <a:buFont typeface="Arial" panose="020B0604020202020204" pitchFamily="34" charset="0"/>
               <a:buChar char="•"/>
             </a:pPr>
+            <a:r>
+              <a:rPr lang="en-IN" sz="1600" dirty="0" smtClean="0"/>
+              <a:t>Selection of the role to play during the event.</a:t>
+            </a:r>
+          </a:p>
+          <a:p>
+            <a:pPr marL="742950" lvl="1" indent="-285750">
+              <a:buFont typeface="Arial" panose="020B0604020202020204" pitchFamily="34" charset="0"/>
+              <a:buChar char="•"/>
+            </a:pPr>
+            <a:r>
+              <a:rPr lang="en-IN" sz="1600" dirty="0" smtClean="0"/>
+              <a:t>Product owners can share the ideas.</a:t>
+            </a:r>
+          </a:p>
+          <a:p>
+            <a:pPr marL="742950" lvl="1" indent="-285750">
+              <a:buFont typeface="Arial" panose="020B0604020202020204" pitchFamily="34" charset="0"/>
+              <a:buChar char="•"/>
+            </a:pPr>
+            <a:r>
+              <a:rPr lang="en-IN" sz="1600" dirty="0" smtClean="0"/>
+              <a:t>Scrum master</a:t>
+            </a:r>
+            <a:r>
+              <a:rPr lang="en-IN" sz="1600" dirty="0" smtClean="0"/>
+              <a:t> provisioning for the ideas.</a:t>
+            </a:r>
+          </a:p>
+          <a:p>
+            <a:pPr marL="742950" lvl="1" indent="-285750">
+              <a:buFont typeface="Arial" panose="020B0604020202020204" pitchFamily="34" charset="0"/>
+              <a:buChar char="•"/>
+            </a:pPr>
+            <a:r>
+              <a:rPr lang="en-IN" sz="1600" dirty="0" smtClean="0"/>
+              <a:t>Product owner &amp; scru</a:t>
+            </a:r>
+            <a:r>
+              <a:rPr lang="en-IN" sz="1600" dirty="0" smtClean="0"/>
+              <a:t>m master can provide the skill set required.</a:t>
+            </a:r>
+          </a:p>
+          <a:p>
+            <a:pPr marL="742950" lvl="1" indent="-285750">
+              <a:buFont typeface="Arial" panose="020B0604020202020204" pitchFamily="34" charset="0"/>
+              <a:buChar char="•"/>
+            </a:pPr>
+            <a:r>
+              <a:rPr lang="en-IN" sz="1600" dirty="0" smtClean="0"/>
+              <a:t>Tool can assign a team basing on skill set .</a:t>
+            </a:r>
+          </a:p>
+          <a:p>
+            <a:pPr marL="742950" lvl="1" indent="-285750">
+              <a:buFont typeface="Arial" panose="020B0604020202020204" pitchFamily="34" charset="0"/>
+              <a:buChar char="•"/>
+            </a:pPr>
+            <a:r>
+              <a:rPr lang="en-IN" sz="1600" dirty="0" smtClean="0"/>
+              <a:t>Team uploads a P.O.V or P.O.C template based at the end of the event.</a:t>
+            </a:r>
+          </a:p>
+          <a:p>
+            <a:pPr marL="742950" lvl="1" indent="-285750">
+              <a:buFont typeface="Arial" panose="020B0604020202020204" pitchFamily="34" charset="0"/>
+              <a:buChar char="•"/>
+            </a:pPr>
+            <a:r>
+              <a:rPr lang="en-IN" sz="1600" dirty="0" smtClean="0"/>
+              <a:t>Submitted ideas will be archived</a:t>
+            </a:r>
+            <a:r>
+              <a:rPr lang="en-IN" sz="1600" dirty="0" smtClean="0"/>
+              <a:t> and people registered with role of innovation evangelist/co-ordinator .</a:t>
+            </a:r>
+          </a:p>
+          <a:p>
+            <a:pPr marL="742950" lvl="1" indent="-285750">
+              <a:buFont typeface="Arial" panose="020B0604020202020204" pitchFamily="34" charset="0"/>
+              <a:buChar char="•"/>
+            </a:pPr>
+            <a:r>
+              <a:rPr lang="en-IN" sz="1600" dirty="0" smtClean="0"/>
+              <a:t> can view the submitted ideas for that event.</a:t>
+            </a:r>
             <a:endParaRPr lang="en-IN" sz="1600" dirty="0" smtClean="0"/>
           </a:p>
           <a:p>

</xml_diff>

<commit_message>
Topics for ideation are highlighted in red
</commit_message>
<xml_diff>
--- a/2.use-cases/Use-cases.pptx
+++ b/2.use-cases/Use-cases.pptx
@@ -246,7 +246,7 @@
           <a:p>
             <a:fld id="{AC90C461-D86D-4896-B3E9-555B9D58EEB6}" type="datetimeFigureOut">
               <a:rPr lang="en-IN" smtClean="0"/>
-              <a:t>05-08-2021</a:t>
+              <a:t>06-08-2021</a:t>
             </a:fld>
             <a:endParaRPr lang="en-IN"/>
           </a:p>
@@ -416,7 +416,7 @@
           <a:p>
             <a:fld id="{AC90C461-D86D-4896-B3E9-555B9D58EEB6}" type="datetimeFigureOut">
               <a:rPr lang="en-IN" smtClean="0"/>
-              <a:t>05-08-2021</a:t>
+              <a:t>06-08-2021</a:t>
             </a:fld>
             <a:endParaRPr lang="en-IN"/>
           </a:p>
@@ -596,7 +596,7 @@
           <a:p>
             <a:fld id="{AC90C461-D86D-4896-B3E9-555B9D58EEB6}" type="datetimeFigureOut">
               <a:rPr lang="en-IN" smtClean="0"/>
-              <a:t>05-08-2021</a:t>
+              <a:t>06-08-2021</a:t>
             </a:fld>
             <a:endParaRPr lang="en-IN"/>
           </a:p>
@@ -766,7 +766,7 @@
           <a:p>
             <a:fld id="{AC90C461-D86D-4896-B3E9-555B9D58EEB6}" type="datetimeFigureOut">
               <a:rPr lang="en-IN" smtClean="0"/>
-              <a:t>05-08-2021</a:t>
+              <a:t>06-08-2021</a:t>
             </a:fld>
             <a:endParaRPr lang="en-IN"/>
           </a:p>
@@ -1012,7 +1012,7 @@
           <a:p>
             <a:fld id="{AC90C461-D86D-4896-B3E9-555B9D58EEB6}" type="datetimeFigureOut">
               <a:rPr lang="en-IN" smtClean="0"/>
-              <a:t>05-08-2021</a:t>
+              <a:t>06-08-2021</a:t>
             </a:fld>
             <a:endParaRPr lang="en-IN"/>
           </a:p>
@@ -1244,7 +1244,7 @@
           <a:p>
             <a:fld id="{AC90C461-D86D-4896-B3E9-555B9D58EEB6}" type="datetimeFigureOut">
               <a:rPr lang="en-IN" smtClean="0"/>
-              <a:t>05-08-2021</a:t>
+              <a:t>06-08-2021</a:t>
             </a:fld>
             <a:endParaRPr lang="en-IN"/>
           </a:p>
@@ -1611,7 +1611,7 @@
           <a:p>
             <a:fld id="{AC90C461-D86D-4896-B3E9-555B9D58EEB6}" type="datetimeFigureOut">
               <a:rPr lang="en-IN" smtClean="0"/>
-              <a:t>05-08-2021</a:t>
+              <a:t>06-08-2021</a:t>
             </a:fld>
             <a:endParaRPr lang="en-IN"/>
           </a:p>
@@ -1729,7 +1729,7 @@
           <a:p>
             <a:fld id="{AC90C461-D86D-4896-B3E9-555B9D58EEB6}" type="datetimeFigureOut">
               <a:rPr lang="en-IN" smtClean="0"/>
-              <a:t>05-08-2021</a:t>
+              <a:t>06-08-2021</a:t>
             </a:fld>
             <a:endParaRPr lang="en-IN"/>
           </a:p>
@@ -1824,7 +1824,7 @@
           <a:p>
             <a:fld id="{AC90C461-D86D-4896-B3E9-555B9D58EEB6}" type="datetimeFigureOut">
               <a:rPr lang="en-IN" smtClean="0"/>
-              <a:t>05-08-2021</a:t>
+              <a:t>06-08-2021</a:t>
             </a:fld>
             <a:endParaRPr lang="en-IN"/>
           </a:p>
@@ -2101,7 +2101,7 @@
           <a:p>
             <a:fld id="{AC90C461-D86D-4896-B3E9-555B9D58EEB6}" type="datetimeFigureOut">
               <a:rPr lang="en-IN" smtClean="0"/>
-              <a:t>05-08-2021</a:t>
+              <a:t>06-08-2021</a:t>
             </a:fld>
             <a:endParaRPr lang="en-IN"/>
           </a:p>
@@ -2354,7 +2354,7 @@
           <a:p>
             <a:fld id="{AC90C461-D86D-4896-B3E9-555B9D58EEB6}" type="datetimeFigureOut">
               <a:rPr lang="en-IN" smtClean="0"/>
-              <a:t>05-08-2021</a:t>
+              <a:t>06-08-2021</a:t>
             </a:fld>
             <a:endParaRPr lang="en-IN"/>
           </a:p>
@@ -2567,7 +2567,7 @@
           <a:p>
             <a:fld id="{AC90C461-D86D-4896-B3E9-555B9D58EEB6}" type="datetimeFigureOut">
               <a:rPr lang="en-IN" smtClean="0"/>
-              <a:t>05-08-2021</a:t>
+              <a:t>06-08-2021</a:t>
             </a:fld>
             <a:endParaRPr lang="en-IN"/>
           </a:p>
@@ -3073,11 +3073,6 @@
               </a:rPr>
               <a:t>for fostering creativity and managing innovation with in an organisation.</a:t>
             </a:r>
-            <a:endParaRPr lang="en-IN" sz="1600" dirty="0" smtClean="0">
-              <a:latin typeface="Calibri" panose="020F0502020204030204" pitchFamily="34" charset="0"/>
-              <a:ea typeface="Calibri" panose="020F0502020204030204" pitchFamily="34" charset="0"/>
-              <a:cs typeface="Times New Roman" panose="02020603050405020304" pitchFamily="18" charset="0"/>
-            </a:endParaRPr>
           </a:p>
           <a:p>
             <a:pPr lvl="1">
@@ -3353,8 +3348,8 @@
         </p:nvSpPr>
         <p:spPr>
           <a:xfrm>
-            <a:off x="305750" y="3068608"/>
-            <a:ext cx="8917698" cy="4339650"/>
+            <a:off x="305750" y="2631638"/>
+            <a:ext cx="10438948" cy="3847207"/>
           </a:xfrm>
           <a:prstGeom prst="rect">
             <a:avLst/>
@@ -3384,7 +3379,6 @@
               <a:rPr lang="en-IN" sz="1600" dirty="0" smtClean="0"/>
               <a:t>Registration facility for user</a:t>
             </a:r>
-            <a:endParaRPr lang="en-IN" sz="1600" dirty="0" smtClean="0"/>
           </a:p>
           <a:p>
             <a:pPr marL="742950" lvl="1" indent="-285750">
@@ -3393,11 +3387,19 @@
             </a:pPr>
             <a:r>
               <a:rPr lang="en-IN" sz="1600" dirty="0" smtClean="0"/>
-              <a:t>Authentication </a:t>
+              <a:t>Authentication &amp; </a:t>
+            </a:r>
+            <a:r>
+              <a:rPr lang="en-IN" sz="1600" dirty="0" smtClean="0">
+                <a:solidFill>
+                  <a:srgbClr val="FF0000"/>
+                </a:solidFill>
+              </a:rPr>
+              <a:t>Role based access</a:t>
             </a:r>
             <a:r>
               <a:rPr lang="en-IN" sz="1600" dirty="0" smtClean="0"/>
-              <a:t>&amp; Role based access.</a:t>
+              <a:t>.</a:t>
             </a:r>
           </a:p>
           <a:p>
@@ -3406,29 +3408,42 @@
               <a:buChar char="•"/>
             </a:pPr>
             <a:r>
-              <a:rPr lang="en-IN" sz="1600" dirty="0" smtClean="0"/>
-              <a:t>Users to be </a:t>
-            </a:r>
-            <a:r>
-              <a:rPr lang="en-IN" sz="1600" dirty="0" smtClean="0"/>
-              <a:t>categorised in </a:t>
-            </a:r>
-            <a:r>
-              <a:rPr lang="en-IN" sz="1600" dirty="0" smtClean="0"/>
-              <a:t>an </a:t>
-            </a:r>
-            <a:r>
-              <a:rPr lang="en-IN" sz="1600" dirty="0" smtClean="0"/>
-              <a:t>organisational context/</a:t>
-            </a:r>
-            <a:r>
-              <a:rPr lang="en-IN" sz="1600" dirty="0" err="1" smtClean="0"/>
-              <a:t>Hackathon</a:t>
-            </a:r>
-            <a:r>
-              <a:rPr lang="en-IN" sz="1600" dirty="0" smtClean="0"/>
-              <a:t>.</a:t>
-            </a:r>
+              <a:rPr lang="en-IN" sz="1600" dirty="0" smtClean="0">
+                <a:solidFill>
+                  <a:srgbClr val="FF0000"/>
+                </a:solidFill>
+              </a:rPr>
+              <a:t>Users to be categorised in an organisational </a:t>
+            </a:r>
+            <a:r>
+              <a:rPr lang="en-IN" sz="1600" dirty="0" smtClean="0">
+                <a:solidFill>
+                  <a:srgbClr val="FF0000"/>
+                </a:solidFill>
+              </a:rPr>
+              <a:t>context &amp; Hackathon</a:t>
+            </a:r>
+            <a:r>
+              <a:rPr lang="en-IN" sz="1600" dirty="0">
+                <a:solidFill>
+                  <a:srgbClr val="FF0000"/>
+                </a:solidFill>
+              </a:rPr>
+              <a:t> </a:t>
+            </a:r>
+            <a:r>
+              <a:rPr lang="en-IN" sz="1600" dirty="0" smtClean="0">
+                <a:solidFill>
+                  <a:srgbClr val="FF0000"/>
+                </a:solidFill>
+              </a:rPr>
+              <a:t>point of view .</a:t>
+            </a:r>
+            <a:endParaRPr lang="en-IN" sz="1600" dirty="0" smtClean="0">
+              <a:solidFill>
+                <a:srgbClr val="FF0000"/>
+              </a:solidFill>
+            </a:endParaRPr>
           </a:p>
           <a:p>
             <a:pPr marL="742950" lvl="1" indent="-285750">
@@ -3436,7 +3451,11 @@
               <a:buChar char="•"/>
             </a:pPr>
             <a:r>
-              <a:rPr lang="en-IN" sz="1600" dirty="0" smtClean="0"/>
+              <a:rPr lang="en-IN" sz="1600" dirty="0" smtClean="0">
+                <a:solidFill>
+                  <a:srgbClr val="FF0000"/>
+                </a:solidFill>
+              </a:rPr>
               <a:t>Tool should intake ideas ,link categorise and classify them appropriately .</a:t>
             </a:r>
           </a:p>
@@ -3450,11 +3469,19 @@
               <a:t>Tool should assign and idea to an innovation evangelist of that </a:t>
             </a:r>
             <a:r>
-              <a:rPr lang="en-IN" sz="1600" b="1" dirty="0" smtClean="0"/>
+              <a:rPr lang="en-IN" sz="1600" b="1" dirty="0" smtClean="0">
+                <a:solidFill>
+                  <a:srgbClr val="FF0000"/>
+                </a:solidFill>
+              </a:rPr>
               <a:t>domain </a:t>
             </a:r>
             <a:r>
-              <a:rPr lang="en-IN" sz="1600" dirty="0" smtClean="0"/>
+              <a:rPr lang="en-IN" sz="1600" dirty="0" smtClean="0">
+                <a:solidFill>
+                  <a:srgbClr val="FF0000"/>
+                </a:solidFill>
+              </a:rPr>
               <a:t>for evaluation.</a:t>
             </a:r>
           </a:p>
@@ -3475,12 +3502,29 @@
             </a:pPr>
             <a:r>
               <a:rPr lang="en-IN" sz="1600" dirty="0"/>
-              <a:t>Send alerts or notifications to users </a:t>
+              <a:t>Send </a:t>
+            </a:r>
+            <a:r>
+              <a:rPr lang="en-IN" sz="1600" dirty="0">
+                <a:solidFill>
+                  <a:srgbClr val="FF0000"/>
+                </a:solidFill>
+              </a:rPr>
+              <a:t>alerts or notifications to users </a:t>
+            </a:r>
+            <a:r>
+              <a:rPr lang="en-IN" sz="1600" dirty="0" smtClean="0">
+                <a:solidFill>
+                  <a:srgbClr val="FF0000"/>
+                </a:solidFill>
+              </a:rPr>
+              <a:t>about assignment / feedback </a:t>
             </a:r>
             <a:r>
               <a:rPr lang="en-IN" sz="1600" dirty="0" smtClean="0"/>
-              <a:t>about assignment / feedback .</a:t>
-            </a:r>
+              <a:t>.</a:t>
+            </a:r>
+            <a:endParaRPr lang="en-IN" sz="1600" dirty="0" smtClean="0"/>
           </a:p>
           <a:p>
             <a:pPr marL="742950" lvl="1" indent="-285750">
@@ -3488,23 +3532,23 @@
               <a:buChar char="•"/>
             </a:pPr>
             <a:r>
-              <a:rPr lang="en-IN" sz="1600" dirty="0"/>
-              <a:t>For an approved idea , Team formation facility from the tool using the available registered users.</a:t>
-            </a:r>
+              <a:rPr lang="en-IN" sz="1600" strike="sngStrike" dirty="0"/>
+              <a:t>For an approved idea , Team formation </a:t>
+            </a:r>
+            <a:r>
+              <a:rPr lang="en-IN" sz="1600" strike="sngStrike" dirty="0" smtClean="0"/>
+              <a:t>facility from the tool using the available registered users. </a:t>
+            </a:r>
+            <a:r>
+              <a:rPr lang="en-IN" sz="1600" strike="sngStrike" dirty="0" smtClean="0">
+                <a:sym typeface="Wingdings" panose="05000000000000000000" pitchFamily="2" charset="2"/>
+              </a:rPr>
+              <a:t> Extended MVP</a:t>
+            </a:r>
+            <a:endParaRPr lang="en-IN" sz="1600" strike="sngStrike" dirty="0" smtClean="0"/>
           </a:p>
           <a:p>
             <a:pPr lvl="1"/>
-            <a:endParaRPr lang="en-IN" sz="1600" dirty="0" smtClean="0"/>
-          </a:p>
-          <a:p>
-            <a:pPr lvl="1"/>
-            <a:endParaRPr lang="en-IN" sz="1600" dirty="0"/>
-          </a:p>
-          <a:p>
-            <a:pPr marL="742950" lvl="1" indent="-285750">
-              <a:buFont typeface="Arial" panose="020B0604020202020204" pitchFamily="34" charset="0"/>
-              <a:buChar char="•"/>
-            </a:pPr>
             <a:endParaRPr lang="en-IN" sz="1600" dirty="0" smtClean="0"/>
           </a:p>
           <a:p>
@@ -3717,11 +3761,19 @@
               <a:buChar char="•"/>
             </a:pPr>
             <a:r>
-              <a:rPr lang="en-IN" sz="1600" dirty="0"/>
+              <a:rPr lang="en-IN" sz="1600" dirty="0">
+                <a:solidFill>
+                  <a:srgbClr val="FF0000"/>
+                </a:solidFill>
+              </a:rPr>
               <a:t>Idea life-cycle to be defined</a:t>
             </a:r>
             <a:r>
-              <a:rPr lang="en-IN" sz="1600" dirty="0" smtClean="0"/>
+              <a:rPr lang="en-IN" sz="1600" dirty="0" smtClean="0">
+                <a:solidFill>
+                  <a:srgbClr val="FF0000"/>
+                </a:solidFill>
+              </a:rPr>
               <a:t>.</a:t>
             </a:r>
           </a:p>
@@ -3742,11 +3794,19 @@
               <a:buChar char="•"/>
             </a:pPr>
             <a:r>
-              <a:rPr lang="en-IN" sz="1600" dirty="0"/>
+              <a:rPr lang="en-IN" sz="1600" dirty="0">
+                <a:solidFill>
+                  <a:srgbClr val="FF0000"/>
+                </a:solidFill>
+              </a:rPr>
               <a:t>Contents to be collected as a part of idea to be defined</a:t>
             </a:r>
             <a:r>
-              <a:rPr lang="en-IN" sz="1600" dirty="0" smtClean="0"/>
+              <a:rPr lang="en-IN" sz="1600" dirty="0" smtClean="0">
+                <a:solidFill>
+                  <a:srgbClr val="FF0000"/>
+                </a:solidFill>
+              </a:rPr>
               <a:t>.</a:t>
             </a:r>
           </a:p>
@@ -3756,10 +3816,13 @@
               <a:buChar char="•"/>
             </a:pPr>
             <a:r>
-              <a:rPr lang="en-IN" sz="1600" dirty="0" smtClean="0"/>
+              <a:rPr lang="en-IN" sz="1600" dirty="0" smtClean="0">
+                <a:solidFill>
+                  <a:srgbClr val="FF0000"/>
+                </a:solidFill>
+              </a:rPr>
               <a:t>Differences in P.O.V or P.O.C’s and P.I’s during data intake.</a:t>
             </a:r>
-            <a:endParaRPr lang="en-IN" sz="1600" dirty="0" smtClean="0"/>
           </a:p>
           <a:p>
             <a:pPr marL="742950" lvl="1" indent="-285750">
@@ -3794,7 +3857,6 @@
               <a:rPr lang="en-IN" sz="1600" dirty="0" smtClean="0"/>
               <a:t>.</a:t>
             </a:r>
-            <a:endParaRPr lang="en-IN" sz="1600" dirty="0" smtClean="0"/>
           </a:p>
           <a:p>
             <a:pPr marL="742950" lvl="1" indent="-285750">
@@ -3803,7 +3865,15 @@
             </a:pPr>
             <a:r>
               <a:rPr lang="en-IN" sz="1600" dirty="0" smtClean="0"/>
-              <a:t>Approved ideas storage and view facility to be defined.</a:t>
+              <a:t>Approved </a:t>
+            </a:r>
+            <a:r>
+              <a:rPr lang="en-IN" sz="1600" b="1" dirty="0" smtClean="0">
+                <a:solidFill>
+                  <a:srgbClr val="FF0000"/>
+                </a:solidFill>
+              </a:rPr>
+              <a:t>ideas storage and view facility to be defined.</a:t>
             </a:r>
           </a:p>
           <a:p>
@@ -4017,11 +4087,15 @@
             </a:pPr>
             <a:r>
               <a:rPr lang="en-IN" sz="1600" dirty="0" smtClean="0"/>
-              <a:t>Role tagging for a registered user as innovation evangelist</a:t>
-            </a:r>
-            <a:r>
-              <a:rPr lang="en-IN" sz="1600" dirty="0" smtClean="0"/>
-              <a:t>.</a:t>
+              <a:t>Role tagging for a registered user as </a:t>
+            </a:r>
+            <a:r>
+              <a:rPr lang="en-IN" sz="1600" b="1" dirty="0" smtClean="0">
+                <a:solidFill>
+                  <a:srgbClr val="FF0000"/>
+                </a:solidFill>
+              </a:rPr>
+              <a:t>innovation evangelist.</a:t>
             </a:r>
           </a:p>
           <a:p>
@@ -4030,7 +4104,11 @@
               <a:buChar char="•"/>
             </a:pPr>
             <a:r>
-              <a:rPr lang="en-IN" sz="1600" dirty="0" smtClean="0"/>
+              <a:rPr lang="en-IN" sz="1600" dirty="0" smtClean="0">
+                <a:solidFill>
+                  <a:srgbClr val="FF0000"/>
+                </a:solidFill>
+              </a:rPr>
               <a:t>An innovation evangelist should be tagged to a domain.</a:t>
             </a:r>
           </a:p>
@@ -4061,11 +4139,7 @@
             </a:pPr>
             <a:r>
               <a:rPr lang="en-IN" sz="1600" dirty="0" smtClean="0"/>
-              <a:t>Feedback provisioning facility for an innovation evangelist citing an approva</a:t>
-            </a:r>
-            <a:r>
-              <a:rPr lang="en-IN" sz="1600" dirty="0" smtClean="0"/>
-              <a:t>l.</a:t>
+              <a:t>Feedback provisioning facility for an innovation evangelist citing an approval.</a:t>
             </a:r>
           </a:p>
           <a:p>
@@ -4074,7 +4148,11 @@
               <a:buChar char="•"/>
             </a:pPr>
             <a:r>
-              <a:rPr lang="en-IN" sz="1600" dirty="0" smtClean="0"/>
+              <a:rPr lang="en-IN" sz="1600" dirty="0" smtClean="0">
+                <a:solidFill>
+                  <a:srgbClr val="FF0000"/>
+                </a:solidFill>
+              </a:rPr>
               <a:t>View for all the ideas assigned , facility to filter upon approved and rejected ideas.</a:t>
             </a:r>
           </a:p>
@@ -4247,8 +4325,8 @@
         </p:nvSpPr>
         <p:spPr>
           <a:xfrm>
-            <a:off x="412694" y="2751291"/>
-            <a:ext cx="9474389" cy="3354765"/>
+            <a:off x="412695" y="2751291"/>
+            <a:ext cx="6837770" cy="3600986"/>
           </a:xfrm>
           <a:prstGeom prst="rect">
             <a:avLst/>
@@ -4256,7 +4334,7 @@
           <a:noFill/>
         </p:spPr>
         <p:txBody>
-          <a:bodyPr wrap="none" rtlCol="0">
+          <a:bodyPr wrap="square" rtlCol="0">
             <a:spAutoFit/>
           </a:bodyPr>
           <a:lstStyle/>
@@ -4285,8 +4363,20 @@
               <a:buChar char="•"/>
             </a:pPr>
             <a:r>
-              <a:rPr lang="en-IN" sz="1600" dirty="0" smtClean="0"/>
-              <a:t>Selection of the role to play during the event.</a:t>
+              <a:rPr lang="en-IN" sz="1600" dirty="0" smtClean="0">
+                <a:solidFill>
+                  <a:srgbClr val="FF0000"/>
+                </a:solidFill>
+              </a:rPr>
+              <a:t>Selection of the role to play during the event</a:t>
+            </a:r>
+            <a:r>
+              <a:rPr lang="en-IN" sz="1600" dirty="0" smtClean="0">
+                <a:solidFill>
+                  <a:srgbClr val="FF0000"/>
+                </a:solidFill>
+              </a:rPr>
+              <a:t>.</a:t>
             </a:r>
           </a:p>
           <a:p>
@@ -4295,9 +4385,18 @@
               <a:buChar char="•"/>
             </a:pPr>
             <a:r>
-              <a:rPr lang="en-IN" sz="1600" dirty="0" smtClean="0"/>
-              <a:t>Product owners can share the ideas.</a:t>
-            </a:r>
+              <a:rPr lang="en-IN" sz="1600" dirty="0" smtClean="0">
+                <a:solidFill>
+                  <a:srgbClr val="FF0000"/>
+                </a:solidFill>
+              </a:rPr>
+              <a:t>Roles to be defined for the event</a:t>
+            </a:r>
+            <a:endParaRPr lang="en-IN" sz="1600" dirty="0" smtClean="0">
+              <a:solidFill>
+                <a:srgbClr val="FF0000"/>
+              </a:solidFill>
+            </a:endParaRPr>
           </a:p>
           <a:p>
             <a:pPr marL="742950" lvl="1" indent="-285750">
@@ -4305,12 +4404,12 @@
               <a:buChar char="•"/>
             </a:pPr>
             <a:r>
-              <a:rPr lang="en-IN" sz="1600" dirty="0" smtClean="0"/>
-              <a:t>Scrum master</a:t>
-            </a:r>
-            <a:r>
-              <a:rPr lang="en-IN" sz="1600" dirty="0" smtClean="0"/>
-              <a:t> provisioning for the ideas.</a:t>
+              <a:rPr lang="en-IN" sz="1600" dirty="0" smtClean="0">
+                <a:solidFill>
+                  <a:srgbClr val="FF0000"/>
+                </a:solidFill>
+              </a:rPr>
+              <a:t>Responsibility of roles to be defined</a:t>
             </a:r>
           </a:p>
           <a:p>
@@ -4319,12 +4418,20 @@
               <a:buChar char="•"/>
             </a:pPr>
             <a:r>
-              <a:rPr lang="en-IN" sz="1600" dirty="0" smtClean="0"/>
-              <a:t>Product owner &amp; scru</a:t>
-            </a:r>
-            <a:r>
-              <a:rPr lang="en-IN" sz="1600" dirty="0" smtClean="0"/>
-              <a:t>m master can provide the skill set required.</a:t>
+              <a:rPr lang="en-IN" sz="1600" dirty="0" smtClean="0">
+                <a:solidFill>
+                  <a:srgbClr val="FF0000"/>
+                </a:solidFill>
+              </a:rPr>
+              <a:t>Tool </a:t>
+            </a:r>
+            <a:r>
+              <a:rPr lang="en-IN" sz="1600" dirty="0" smtClean="0">
+                <a:solidFill>
+                  <a:srgbClr val="FF0000"/>
+                </a:solidFill>
+              </a:rPr>
+              <a:t>can assign a team basing on skill set .</a:t>
             </a:r>
           </a:p>
           <a:p>
@@ -4333,8 +4440,12 @@
               <a:buChar char="•"/>
             </a:pPr>
             <a:r>
-              <a:rPr lang="en-IN" sz="1600" dirty="0" smtClean="0"/>
-              <a:t>Tool can assign a team basing on skill set .</a:t>
+              <a:rPr lang="en-IN" sz="1600" dirty="0" smtClean="0">
+                <a:solidFill>
+                  <a:srgbClr val="FF0000"/>
+                </a:solidFill>
+              </a:rPr>
+              <a:t>Event management can be defined.</a:t>
             </a:r>
           </a:p>
           <a:p>
@@ -4343,8 +4454,20 @@
               <a:buChar char="•"/>
             </a:pPr>
             <a:r>
-              <a:rPr lang="en-IN" sz="1600" dirty="0" smtClean="0"/>
-              <a:t>Team uploads a P.O.V or P.O.C template based at the end of the event.</a:t>
+              <a:rPr lang="en-IN" sz="1600" dirty="0" smtClean="0">
+                <a:solidFill>
+                  <a:srgbClr val="FF0000"/>
+                </a:solidFill>
+              </a:rPr>
+              <a:t>Team </a:t>
+            </a:r>
+            <a:r>
+              <a:rPr lang="en-IN" sz="1600" dirty="0" smtClean="0">
+                <a:solidFill>
+                  <a:srgbClr val="FF0000"/>
+                </a:solidFill>
+              </a:rPr>
+              <a:t>uploads a P.O.V or P.O.C template based at the end of the event.</a:t>
             </a:r>
           </a:p>
           <a:p>
@@ -4354,29 +4477,23 @@
             </a:pPr>
             <a:r>
               <a:rPr lang="en-IN" sz="1600" dirty="0" smtClean="0"/>
-              <a:t>Submitted ideas will be archived</a:t>
+              <a:t>Submitted ideas will be archived and people registered with role of innovation evangelist/co-ordinator </a:t>
+            </a:r>
+            <a:r>
+              <a:rPr lang="en-IN" sz="1600" dirty="0"/>
+              <a:t>,</a:t>
             </a:r>
             <a:r>
               <a:rPr lang="en-IN" sz="1600" dirty="0" smtClean="0"/>
-              <a:t> and people registered with role of innovation evangelist/co-ordinator .</a:t>
-            </a:r>
-          </a:p>
-          <a:p>
-            <a:pPr marL="742950" lvl="1" indent="-285750">
-              <a:buFont typeface="Arial" panose="020B0604020202020204" pitchFamily="34" charset="0"/>
-              <a:buChar char="•"/>
-            </a:pPr>
+              <a:t>can </a:t>
+            </a:r>
             <a:r>
               <a:rPr lang="en-IN" sz="1600" dirty="0" smtClean="0"/>
-              <a:t> can view the submitted ideas for that event.</a:t>
-            </a:r>
-            <a:endParaRPr lang="en-IN" sz="1600" dirty="0" smtClean="0"/>
-          </a:p>
-          <a:p>
-            <a:pPr marL="742950" lvl="1" indent="-285750">
-              <a:buFont typeface="Arial" panose="020B0604020202020204" pitchFamily="34" charset="0"/>
-              <a:buChar char="•"/>
-            </a:pPr>
+              <a:t>view the submitted ideas for that event.</a:t>
+            </a:r>
+          </a:p>
+          <a:p>
+            <a:pPr lvl="1"/>
             <a:endParaRPr lang="en-IN" sz="1600" dirty="0" smtClean="0"/>
           </a:p>
           <a:p>

</xml_diff>

<commit_message>
updated the use cases
</commit_message>
<xml_diff>
--- a/2.use-cases/Use-cases.pptx
+++ b/2.use-cases/Use-cases.pptx
@@ -157,7 +157,7 @@
           </a:lstStyle>
           <a:p>
             <a:r>
-              <a:rPr lang="en-US" smtClean="0"/>
+              <a:rPr lang="en-US"/>
               <a:t>Click to edit Master title style</a:t>
             </a:r>
             <a:endParaRPr lang="en-IN"/>
@@ -222,7 +222,7 @@
           </a:lstStyle>
           <a:p>
             <a:r>
-              <a:rPr lang="en-US" smtClean="0"/>
+              <a:rPr lang="en-US"/>
               <a:t>Click to edit Master subtitle style</a:t>
             </a:r>
             <a:endParaRPr lang="en-IN"/>
@@ -340,7 +340,7 @@
           <a:lstStyle/>
           <a:p>
             <a:r>
-              <a:rPr lang="en-US" smtClean="0"/>
+              <a:rPr lang="en-US"/>
               <a:t>Click to edit Master title style</a:t>
             </a:r>
             <a:endParaRPr lang="en-IN"/>
@@ -364,35 +364,35 @@
           <a:p>
             <a:pPr lvl="0"/>
             <a:r>
-              <a:rPr lang="en-US" smtClean="0"/>
+              <a:rPr lang="en-US"/>
               <a:t>Click to edit Master text styles</a:t>
             </a:r>
           </a:p>
           <a:p>
             <a:pPr lvl="1"/>
             <a:r>
-              <a:rPr lang="en-US" smtClean="0"/>
+              <a:rPr lang="en-US"/>
               <a:t>Second level</a:t>
             </a:r>
           </a:p>
           <a:p>
             <a:pPr lvl="2"/>
             <a:r>
-              <a:rPr lang="en-US" smtClean="0"/>
+              <a:rPr lang="en-US"/>
               <a:t>Third level</a:t>
             </a:r>
           </a:p>
           <a:p>
             <a:pPr lvl="3"/>
             <a:r>
-              <a:rPr lang="en-US" smtClean="0"/>
+              <a:rPr lang="en-US"/>
               <a:t>Fourth level</a:t>
             </a:r>
           </a:p>
           <a:p>
             <a:pPr lvl="4"/>
             <a:r>
-              <a:rPr lang="en-US" smtClean="0"/>
+              <a:rPr lang="en-US"/>
               <a:t>Fifth level</a:t>
             </a:r>
             <a:endParaRPr lang="en-IN"/>
@@ -515,7 +515,7 @@
           <a:lstStyle/>
           <a:p>
             <a:r>
-              <a:rPr lang="en-US" smtClean="0"/>
+              <a:rPr lang="en-US"/>
               <a:t>Click to edit Master title style</a:t>
             </a:r>
             <a:endParaRPr lang="en-IN"/>
@@ -544,35 +544,35 @@
           <a:p>
             <a:pPr lvl="0"/>
             <a:r>
-              <a:rPr lang="en-US" smtClean="0"/>
+              <a:rPr lang="en-US"/>
               <a:t>Click to edit Master text styles</a:t>
             </a:r>
           </a:p>
           <a:p>
             <a:pPr lvl="1"/>
             <a:r>
-              <a:rPr lang="en-US" smtClean="0"/>
+              <a:rPr lang="en-US"/>
               <a:t>Second level</a:t>
             </a:r>
           </a:p>
           <a:p>
             <a:pPr lvl="2"/>
             <a:r>
-              <a:rPr lang="en-US" smtClean="0"/>
+              <a:rPr lang="en-US"/>
               <a:t>Third level</a:t>
             </a:r>
           </a:p>
           <a:p>
             <a:pPr lvl="3"/>
             <a:r>
-              <a:rPr lang="en-US" smtClean="0"/>
+              <a:rPr lang="en-US"/>
               <a:t>Fourth level</a:t>
             </a:r>
           </a:p>
           <a:p>
             <a:pPr lvl="4"/>
             <a:r>
-              <a:rPr lang="en-US" smtClean="0"/>
+              <a:rPr lang="en-US"/>
               <a:t>Fifth level</a:t>
             </a:r>
             <a:endParaRPr lang="en-IN"/>
@@ -690,7 +690,7 @@
           <a:lstStyle/>
           <a:p>
             <a:r>
-              <a:rPr lang="en-US" smtClean="0"/>
+              <a:rPr lang="en-US"/>
               <a:t>Click to edit Master title style</a:t>
             </a:r>
             <a:endParaRPr lang="en-IN"/>
@@ -714,35 +714,35 @@
           <a:p>
             <a:pPr lvl="0"/>
             <a:r>
-              <a:rPr lang="en-US" smtClean="0"/>
+              <a:rPr lang="en-US"/>
               <a:t>Click to edit Master text styles</a:t>
             </a:r>
           </a:p>
           <a:p>
             <a:pPr lvl="1"/>
             <a:r>
-              <a:rPr lang="en-US" smtClean="0"/>
+              <a:rPr lang="en-US"/>
               <a:t>Second level</a:t>
             </a:r>
           </a:p>
           <a:p>
             <a:pPr lvl="2"/>
             <a:r>
-              <a:rPr lang="en-US" smtClean="0"/>
+              <a:rPr lang="en-US"/>
               <a:t>Third level</a:t>
             </a:r>
           </a:p>
           <a:p>
             <a:pPr lvl="3"/>
             <a:r>
-              <a:rPr lang="en-US" smtClean="0"/>
+              <a:rPr lang="en-US"/>
               <a:t>Fourth level</a:t>
             </a:r>
           </a:p>
           <a:p>
             <a:pPr lvl="4"/>
             <a:r>
-              <a:rPr lang="en-US" smtClean="0"/>
+              <a:rPr lang="en-US"/>
               <a:t>Fifth level</a:t>
             </a:r>
             <a:endParaRPr lang="en-IN"/>
@@ -869,7 +869,7 @@
           </a:lstStyle>
           <a:p>
             <a:r>
-              <a:rPr lang="en-US" smtClean="0"/>
+              <a:rPr lang="en-US"/>
               <a:t>Click to edit Master title style</a:t>
             </a:r>
             <a:endParaRPr lang="en-IN"/>
@@ -989,7 +989,7 @@
           <a:p>
             <a:pPr lvl="0"/>
             <a:r>
-              <a:rPr lang="en-US" smtClean="0"/>
+              <a:rPr lang="en-US"/>
               <a:t>Click to edit Master text styles</a:t>
             </a:r>
           </a:p>
@@ -1106,7 +1106,7 @@
           <a:lstStyle/>
           <a:p>
             <a:r>
-              <a:rPr lang="en-US" smtClean="0"/>
+              <a:rPr lang="en-US"/>
               <a:t>Click to edit Master title style</a:t>
             </a:r>
             <a:endParaRPr lang="en-IN"/>
@@ -1135,35 +1135,35 @@
           <a:p>
             <a:pPr lvl="0"/>
             <a:r>
-              <a:rPr lang="en-US" smtClean="0"/>
+              <a:rPr lang="en-US"/>
               <a:t>Click to edit Master text styles</a:t>
             </a:r>
           </a:p>
           <a:p>
             <a:pPr lvl="1"/>
             <a:r>
-              <a:rPr lang="en-US" smtClean="0"/>
+              <a:rPr lang="en-US"/>
               <a:t>Second level</a:t>
             </a:r>
           </a:p>
           <a:p>
             <a:pPr lvl="2"/>
             <a:r>
-              <a:rPr lang="en-US" smtClean="0"/>
+              <a:rPr lang="en-US"/>
               <a:t>Third level</a:t>
             </a:r>
           </a:p>
           <a:p>
             <a:pPr lvl="3"/>
             <a:r>
-              <a:rPr lang="en-US" smtClean="0"/>
+              <a:rPr lang="en-US"/>
               <a:t>Fourth level</a:t>
             </a:r>
           </a:p>
           <a:p>
             <a:pPr lvl="4"/>
             <a:r>
-              <a:rPr lang="en-US" smtClean="0"/>
+              <a:rPr lang="en-US"/>
               <a:t>Fifth level</a:t>
             </a:r>
             <a:endParaRPr lang="en-IN"/>
@@ -1192,35 +1192,35 @@
           <a:p>
             <a:pPr lvl="0"/>
             <a:r>
-              <a:rPr lang="en-US" smtClean="0"/>
+              <a:rPr lang="en-US"/>
               <a:t>Click to edit Master text styles</a:t>
             </a:r>
           </a:p>
           <a:p>
             <a:pPr lvl="1"/>
             <a:r>
-              <a:rPr lang="en-US" smtClean="0"/>
+              <a:rPr lang="en-US"/>
               <a:t>Second level</a:t>
             </a:r>
           </a:p>
           <a:p>
             <a:pPr lvl="2"/>
             <a:r>
-              <a:rPr lang="en-US" smtClean="0"/>
+              <a:rPr lang="en-US"/>
               <a:t>Third level</a:t>
             </a:r>
           </a:p>
           <a:p>
             <a:pPr lvl="3"/>
             <a:r>
-              <a:rPr lang="en-US" smtClean="0"/>
+              <a:rPr lang="en-US"/>
               <a:t>Fourth level</a:t>
             </a:r>
           </a:p>
           <a:p>
             <a:pPr lvl="4"/>
             <a:r>
-              <a:rPr lang="en-US" smtClean="0"/>
+              <a:rPr lang="en-US"/>
               <a:t>Fifth level</a:t>
             </a:r>
             <a:endParaRPr lang="en-IN"/>
@@ -1343,7 +1343,7 @@
           <a:lstStyle/>
           <a:p>
             <a:r>
-              <a:rPr lang="en-US" smtClean="0"/>
+              <a:rPr lang="en-US"/>
               <a:t>Click to edit Master title style</a:t>
             </a:r>
             <a:endParaRPr lang="en-IN"/>
@@ -1409,7 +1409,7 @@
           <a:p>
             <a:pPr lvl="0"/>
             <a:r>
-              <a:rPr lang="en-US" smtClean="0"/>
+              <a:rPr lang="en-US"/>
               <a:t>Click to edit Master text styles</a:t>
             </a:r>
           </a:p>
@@ -1437,35 +1437,35 @@
           <a:p>
             <a:pPr lvl="0"/>
             <a:r>
-              <a:rPr lang="en-US" smtClean="0"/>
+              <a:rPr lang="en-US"/>
               <a:t>Click to edit Master text styles</a:t>
             </a:r>
           </a:p>
           <a:p>
             <a:pPr lvl="1"/>
             <a:r>
-              <a:rPr lang="en-US" smtClean="0"/>
+              <a:rPr lang="en-US"/>
               <a:t>Second level</a:t>
             </a:r>
           </a:p>
           <a:p>
             <a:pPr lvl="2"/>
             <a:r>
-              <a:rPr lang="en-US" smtClean="0"/>
+              <a:rPr lang="en-US"/>
               <a:t>Third level</a:t>
             </a:r>
           </a:p>
           <a:p>
             <a:pPr lvl="3"/>
             <a:r>
-              <a:rPr lang="en-US" smtClean="0"/>
+              <a:rPr lang="en-US"/>
               <a:t>Fourth level</a:t>
             </a:r>
           </a:p>
           <a:p>
             <a:pPr lvl="4"/>
             <a:r>
-              <a:rPr lang="en-US" smtClean="0"/>
+              <a:rPr lang="en-US"/>
               <a:t>Fifth level</a:t>
             </a:r>
             <a:endParaRPr lang="en-IN"/>
@@ -1531,7 +1531,7 @@
           <a:p>
             <a:pPr lvl="0"/>
             <a:r>
-              <a:rPr lang="en-US" smtClean="0"/>
+              <a:rPr lang="en-US"/>
               <a:t>Click to edit Master text styles</a:t>
             </a:r>
           </a:p>
@@ -1559,35 +1559,35 @@
           <a:p>
             <a:pPr lvl="0"/>
             <a:r>
-              <a:rPr lang="en-US" smtClean="0"/>
+              <a:rPr lang="en-US"/>
               <a:t>Click to edit Master text styles</a:t>
             </a:r>
           </a:p>
           <a:p>
             <a:pPr lvl="1"/>
             <a:r>
-              <a:rPr lang="en-US" smtClean="0"/>
+              <a:rPr lang="en-US"/>
               <a:t>Second level</a:t>
             </a:r>
           </a:p>
           <a:p>
             <a:pPr lvl="2"/>
             <a:r>
-              <a:rPr lang="en-US" smtClean="0"/>
+              <a:rPr lang="en-US"/>
               <a:t>Third level</a:t>
             </a:r>
           </a:p>
           <a:p>
             <a:pPr lvl="3"/>
             <a:r>
-              <a:rPr lang="en-US" smtClean="0"/>
+              <a:rPr lang="en-US"/>
               <a:t>Fourth level</a:t>
             </a:r>
           </a:p>
           <a:p>
             <a:pPr lvl="4"/>
             <a:r>
-              <a:rPr lang="en-US" smtClean="0"/>
+              <a:rPr lang="en-US"/>
               <a:t>Fifth level</a:t>
             </a:r>
             <a:endParaRPr lang="en-IN"/>
@@ -1705,7 +1705,7 @@
           <a:lstStyle/>
           <a:p>
             <a:r>
-              <a:rPr lang="en-US" smtClean="0"/>
+              <a:rPr lang="en-US"/>
               <a:t>Click to edit Master title style</a:t>
             </a:r>
             <a:endParaRPr lang="en-IN"/>
@@ -1927,7 +1927,7 @@
           </a:lstStyle>
           <a:p>
             <a:r>
-              <a:rPr lang="en-US" smtClean="0"/>
+              <a:rPr lang="en-US"/>
               <a:t>Click to edit Master title style</a:t>
             </a:r>
             <a:endParaRPr lang="en-IN"/>
@@ -1984,35 +1984,35 @@
           <a:p>
             <a:pPr lvl="0"/>
             <a:r>
-              <a:rPr lang="en-US" smtClean="0"/>
+              <a:rPr lang="en-US"/>
               <a:t>Click to edit Master text styles</a:t>
             </a:r>
           </a:p>
           <a:p>
             <a:pPr lvl="1"/>
             <a:r>
-              <a:rPr lang="en-US" smtClean="0"/>
+              <a:rPr lang="en-US"/>
               <a:t>Second level</a:t>
             </a:r>
           </a:p>
           <a:p>
             <a:pPr lvl="2"/>
             <a:r>
-              <a:rPr lang="en-US" smtClean="0"/>
+              <a:rPr lang="en-US"/>
               <a:t>Third level</a:t>
             </a:r>
           </a:p>
           <a:p>
             <a:pPr lvl="3"/>
             <a:r>
-              <a:rPr lang="en-US" smtClean="0"/>
+              <a:rPr lang="en-US"/>
               <a:t>Fourth level</a:t>
             </a:r>
           </a:p>
           <a:p>
             <a:pPr lvl="4"/>
             <a:r>
-              <a:rPr lang="en-US" smtClean="0"/>
+              <a:rPr lang="en-US"/>
               <a:t>Fifth level</a:t>
             </a:r>
             <a:endParaRPr lang="en-IN"/>
@@ -2078,7 +2078,7 @@
           <a:p>
             <a:pPr lvl="0"/>
             <a:r>
-              <a:rPr lang="en-US" smtClean="0"/>
+              <a:rPr lang="en-US"/>
               <a:t>Click to edit Master text styles</a:t>
             </a:r>
           </a:p>
@@ -2204,7 +2204,7 @@
           </a:lstStyle>
           <a:p>
             <a:r>
-              <a:rPr lang="en-US" smtClean="0"/>
+              <a:rPr lang="en-US"/>
               <a:t>Click to edit Master title style</a:t>
             </a:r>
             <a:endParaRPr lang="en-IN"/>
@@ -2331,7 +2331,7 @@
           <a:p>
             <a:pPr lvl="0"/>
             <a:r>
-              <a:rPr lang="en-US" smtClean="0"/>
+              <a:rPr lang="en-US"/>
               <a:t>Click to edit Master text styles</a:t>
             </a:r>
           </a:p>
@@ -2463,7 +2463,7 @@
           <a:lstStyle/>
           <a:p>
             <a:r>
-              <a:rPr lang="en-US" smtClean="0"/>
+              <a:rPr lang="en-US"/>
               <a:t>Click to edit Master title style</a:t>
             </a:r>
             <a:endParaRPr lang="en-IN"/>
@@ -2497,35 +2497,35 @@
           <a:p>
             <a:pPr lvl="0"/>
             <a:r>
-              <a:rPr lang="en-US" smtClean="0"/>
+              <a:rPr lang="en-US"/>
               <a:t>Click to edit Master text styles</a:t>
             </a:r>
           </a:p>
           <a:p>
             <a:pPr lvl="1"/>
             <a:r>
-              <a:rPr lang="en-US" smtClean="0"/>
+              <a:rPr lang="en-US"/>
               <a:t>Second level</a:t>
             </a:r>
           </a:p>
           <a:p>
             <a:pPr lvl="2"/>
             <a:r>
-              <a:rPr lang="en-US" smtClean="0"/>
+              <a:rPr lang="en-US"/>
               <a:t>Third level</a:t>
             </a:r>
           </a:p>
           <a:p>
             <a:pPr lvl="3"/>
             <a:r>
-              <a:rPr lang="en-US" smtClean="0"/>
+              <a:rPr lang="en-US"/>
               <a:t>Fourth level</a:t>
             </a:r>
           </a:p>
           <a:p>
             <a:pPr lvl="4"/>
             <a:r>
-              <a:rPr lang="en-US" smtClean="0"/>
+              <a:rPr lang="en-US"/>
               <a:t>Fifth level</a:t>
             </a:r>
             <a:endParaRPr lang="en-IN"/>
@@ -2995,10 +2995,9 @@
           <a:lstStyle/>
           <a:p>
             <a:r>
-              <a:rPr lang="en-IN" sz="4000" dirty="0" smtClean="0"/>
+              <a:rPr lang="en-IN" sz="4000" dirty="0"/>
               <a:t>Product scope</a:t>
             </a:r>
-            <a:endParaRPr lang="en-IN" sz="4000" dirty="0"/>
           </a:p>
         </p:txBody>
       </p:sp>
@@ -3047,31 +3046,7 @@
                 <a:ea typeface="Calibri" panose="020F0502020204030204" pitchFamily="34" charset="0"/>
                 <a:cs typeface="Times New Roman" panose="02020603050405020304" pitchFamily="18" charset="0"/>
               </a:rPr>
-              <a:t> is </a:t>
-            </a:r>
-            <a:r>
-              <a:rPr lang="en-IN" sz="1600" dirty="0" smtClean="0">
-                <a:latin typeface="Calibri" panose="020F0502020204030204" pitchFamily="34" charset="0"/>
-                <a:ea typeface="Calibri" panose="020F0502020204030204" pitchFamily="34" charset="0"/>
-                <a:cs typeface="Times New Roman" panose="02020603050405020304" pitchFamily="18" charset="0"/>
-              </a:rPr>
-              <a:t>an one stop </a:t>
-            </a:r>
-            <a:r>
-              <a:rPr lang="en-IN" sz="1600" dirty="0">
-                <a:latin typeface="Calibri" panose="020F0502020204030204" pitchFamily="34" charset="0"/>
-                <a:ea typeface="Calibri" panose="020F0502020204030204" pitchFamily="34" charset="0"/>
-                <a:cs typeface="Times New Roman" panose="02020603050405020304" pitchFamily="18" charset="0"/>
-              </a:rPr>
-              <a:t>solution </a:t>
-            </a:r>
-            <a:r>
-              <a:rPr lang="en-IN" sz="1600" dirty="0" smtClean="0">
-                <a:latin typeface="Calibri" panose="020F0502020204030204" pitchFamily="34" charset="0"/>
-                <a:ea typeface="Calibri" panose="020F0502020204030204" pitchFamily="34" charset="0"/>
-                <a:cs typeface="Times New Roman" panose="02020603050405020304" pitchFamily="18" charset="0"/>
-              </a:rPr>
-              <a:t>for fostering creativity and managing innovation with in an organisation.</a:t>
+              <a:t> is an one stop solution for fostering creativity and managing innovation with in an organisation.</a:t>
             </a:r>
           </a:p>
           <a:p>
@@ -3083,7 +3058,7 @@
                 <a:spcPts val="0"/>
               </a:spcAft>
             </a:pPr>
-            <a:endParaRPr lang="en-IN" sz="1600" dirty="0" smtClean="0">
+            <a:endParaRPr lang="en-IN" sz="1600" dirty="0">
               <a:latin typeface="Calibri" panose="020F0502020204030204" pitchFamily="34" charset="0"/>
               <a:ea typeface="Calibri" panose="020F0502020204030204" pitchFamily="34" charset="0"/>
               <a:cs typeface="Times New Roman" panose="02020603050405020304" pitchFamily="18" charset="0"/>
@@ -3099,7 +3074,7 @@
               </a:spcAft>
             </a:pPr>
             <a:r>
-              <a:rPr lang="en-IN" sz="1600" b="1" dirty="0" smtClean="0">
+              <a:rPr lang="en-IN" sz="1600" b="1" dirty="0">
                 <a:latin typeface="Calibri" panose="020F0502020204030204" pitchFamily="34" charset="0"/>
                 <a:ea typeface="Calibri" panose="020F0502020204030204" pitchFamily="34" charset="0"/>
                 <a:cs typeface="Times New Roman" panose="02020603050405020304" pitchFamily="18" charset="0"/>
@@ -3107,18 +3082,13 @@
               <a:t>            </a:t>
             </a:r>
             <a:r>
-              <a:rPr lang="en-IN" sz="1600" b="1" u="sng" dirty="0" smtClean="0">
+              <a:rPr lang="en-IN" sz="1600" b="1" u="sng" dirty="0">
                 <a:latin typeface="Calibri" panose="020F0502020204030204" pitchFamily="34" charset="0"/>
                 <a:ea typeface="Calibri" panose="020F0502020204030204" pitchFamily="34" charset="0"/>
                 <a:cs typeface="Times New Roman" panose="02020603050405020304" pitchFamily="18" charset="0"/>
               </a:rPr>
               <a:t>MVP :</a:t>
             </a:r>
-            <a:endParaRPr lang="en-IN" sz="1600" b="1" u="sng" dirty="0">
-              <a:latin typeface="Calibri" panose="020F0502020204030204" pitchFamily="34" charset="0"/>
-              <a:ea typeface="Calibri" panose="020F0502020204030204" pitchFamily="34" charset="0"/>
-              <a:cs typeface="Times New Roman" panose="02020603050405020304" pitchFamily="18" charset="0"/>
-            </a:endParaRPr>
           </a:p>
           <a:p>
             <a:pPr marL="1600200" lvl="3" indent="-228600">
@@ -3134,21 +3104,8 @@
                 <a:ea typeface="Calibri" panose="020F0502020204030204" pitchFamily="34" charset="0"/>
                 <a:cs typeface="Times New Roman" panose="02020603050405020304" pitchFamily="18" charset="0"/>
               </a:rPr>
-              <a:t>Addressing new ideas which can be registered and converted into a </a:t>
-            </a:r>
-            <a:r>
-              <a:rPr lang="en-IN" sz="1600" dirty="0" smtClean="0">
-                <a:latin typeface="Calibri" panose="020F0502020204030204" pitchFamily="34" charset="0"/>
-                <a:ea typeface="Calibri" panose="020F0502020204030204" pitchFamily="34" charset="0"/>
-                <a:cs typeface="Times New Roman" panose="02020603050405020304" pitchFamily="18" charset="0"/>
-              </a:rPr>
-              <a:t>Product.</a:t>
-            </a:r>
-            <a:endParaRPr lang="en-IN" sz="1600" dirty="0">
-              <a:latin typeface="Calibri" panose="020F0502020204030204" pitchFamily="34" charset="0"/>
-              <a:ea typeface="Calibri" panose="020F0502020204030204" pitchFamily="34" charset="0"/>
-              <a:cs typeface="Times New Roman" panose="02020603050405020304" pitchFamily="18" charset="0"/>
-            </a:endParaRPr>
+              <a:t>Addressing new ideas which can be registered and converted into a Product.</a:t>
+            </a:r>
           </a:p>
           <a:p>
             <a:pPr marL="1600200" lvl="3" indent="-228600">
@@ -3164,47 +3121,15 @@
                 <a:ea typeface="Calibri" panose="020F0502020204030204" pitchFamily="34" charset="0"/>
                 <a:cs typeface="Times New Roman" panose="02020603050405020304" pitchFamily="18" charset="0"/>
               </a:rPr>
-              <a:t>Registering </a:t>
-            </a:r>
-            <a:r>
-              <a:rPr lang="en-IN" sz="1600" dirty="0" smtClean="0">
+              <a:t>Registering P.I.s/</a:t>
+            </a:r>
+            <a:r>
+              <a:rPr lang="en-IN" sz="1600" dirty="0" err="1">
                 <a:latin typeface="Calibri" panose="020F0502020204030204" pitchFamily="34" charset="0"/>
                 <a:ea typeface="Calibri" panose="020F0502020204030204" pitchFamily="34" charset="0"/>
                 <a:cs typeface="Times New Roman" panose="02020603050405020304" pitchFamily="18" charset="0"/>
               </a:rPr>
-              <a:t>P.I.s/</a:t>
-            </a:r>
-            <a:r>
-              <a:rPr lang="en-IN" sz="1600" dirty="0" err="1" smtClean="0">
-                <a:latin typeface="Calibri" panose="020F0502020204030204" pitchFamily="34" charset="0"/>
-                <a:ea typeface="Calibri" panose="020F0502020204030204" pitchFamily="34" charset="0"/>
-                <a:cs typeface="Times New Roman" panose="02020603050405020304" pitchFamily="18" charset="0"/>
-              </a:rPr>
               <a:t>P.o.V</a:t>
-            </a:r>
-            <a:r>
-              <a:rPr lang="en-IN" sz="1600" dirty="0" smtClean="0">
-                <a:latin typeface="Calibri" panose="020F0502020204030204" pitchFamily="34" charset="0"/>
-                <a:ea typeface="Calibri" panose="020F0502020204030204" pitchFamily="34" charset="0"/>
-                <a:cs typeface="Times New Roman" panose="02020603050405020304" pitchFamily="18" charset="0"/>
-              </a:rPr>
-              <a:t>/</a:t>
-            </a:r>
-            <a:r>
-              <a:rPr lang="en-IN" sz="1600" dirty="0" err="1" smtClean="0">
-                <a:latin typeface="Calibri" panose="020F0502020204030204" pitchFamily="34" charset="0"/>
-                <a:ea typeface="Calibri" panose="020F0502020204030204" pitchFamily="34" charset="0"/>
-                <a:cs typeface="Times New Roman" panose="02020603050405020304" pitchFamily="18" charset="0"/>
-              </a:rPr>
-              <a:t>P.o.C</a:t>
-            </a:r>
-            <a:r>
-              <a:rPr lang="en-IN" sz="1600" dirty="0" smtClean="0">
-                <a:latin typeface="Calibri" panose="020F0502020204030204" pitchFamily="34" charset="0"/>
-                <a:ea typeface="Calibri" panose="020F0502020204030204" pitchFamily="34" charset="0"/>
-                <a:cs typeface="Times New Roman" panose="02020603050405020304" pitchFamily="18" charset="0"/>
-              </a:rPr>
-              <a:t> </a:t>
             </a:r>
             <a:r>
               <a:rPr lang="en-IN" sz="1600" dirty="0">
@@ -3212,7 +3137,7 @@
                 <a:ea typeface="Calibri" panose="020F0502020204030204" pitchFamily="34" charset="0"/>
                 <a:cs typeface="Times New Roman" panose="02020603050405020304" pitchFamily="18" charset="0"/>
               </a:rPr>
-              <a:t>from Projects/</a:t>
+              <a:t>/</a:t>
             </a:r>
             <a:r>
               <a:rPr lang="en-IN" sz="1600" dirty="0" err="1">
@@ -3220,7 +3145,7 @@
                 <a:ea typeface="Calibri" panose="020F0502020204030204" pitchFamily="34" charset="0"/>
                 <a:cs typeface="Times New Roman" panose="02020603050405020304" pitchFamily="18" charset="0"/>
               </a:rPr>
-              <a:t>Hackathon</a:t>
+              <a:t>P.o.C</a:t>
             </a:r>
             <a:r>
               <a:rPr lang="en-IN" sz="1600" dirty="0">
@@ -3228,21 +3153,24 @@
                 <a:ea typeface="Calibri" panose="020F0502020204030204" pitchFamily="34" charset="0"/>
                 <a:cs typeface="Times New Roman" panose="02020603050405020304" pitchFamily="18" charset="0"/>
               </a:rPr>
-              <a:t>/other events and is accessible for </a:t>
-            </a:r>
-            <a:r>
-              <a:rPr lang="en-IN" sz="1600" dirty="0" smtClean="0">
+              <a:t> from Projects/</a:t>
+            </a:r>
+            <a:r>
+              <a:rPr lang="en-IN" sz="1600" dirty="0" err="1">
                 <a:latin typeface="Calibri" panose="020F0502020204030204" pitchFamily="34" charset="0"/>
                 <a:ea typeface="Calibri" panose="020F0502020204030204" pitchFamily="34" charset="0"/>
                 <a:cs typeface="Times New Roman" panose="02020603050405020304" pitchFamily="18" charset="0"/>
               </a:rPr>
-              <a:t>reference.</a:t>
-            </a:r>
-            <a:endParaRPr lang="en-IN" sz="1600" dirty="0">
-              <a:latin typeface="Calibri" panose="020F0502020204030204" pitchFamily="34" charset="0"/>
-              <a:ea typeface="Calibri" panose="020F0502020204030204" pitchFamily="34" charset="0"/>
-              <a:cs typeface="Times New Roman" panose="02020603050405020304" pitchFamily="18" charset="0"/>
-            </a:endParaRPr>
+              <a:t>Hackathon</a:t>
+            </a:r>
+            <a:r>
+              <a:rPr lang="en-IN" sz="1600" dirty="0">
+                <a:latin typeface="Calibri" panose="020F0502020204030204" pitchFamily="34" charset="0"/>
+                <a:ea typeface="Calibri" panose="020F0502020204030204" pitchFamily="34" charset="0"/>
+                <a:cs typeface="Times New Roman" panose="02020603050405020304" pitchFamily="18" charset="0"/>
+              </a:rPr>
+              <a:t>/other events and is accessible for reference.</a:t>
+            </a:r>
           </a:p>
           <a:p>
             <a:pPr marL="1600200" lvl="3" indent="-228600">
@@ -3256,36 +3184,12 @@
               <a:buAutoNum type="arabicPeriod"/>
             </a:pPr>
             <a:r>
-              <a:rPr lang="en-IN" sz="1600" dirty="0" err="1" smtClean="0">
+              <a:rPr lang="en-IN" sz="1600" dirty="0" err="1">
                 <a:latin typeface="Calibri" panose="020F0502020204030204" pitchFamily="34" charset="0"/>
                 <a:ea typeface="Calibri" panose="020F0502020204030204" pitchFamily="34" charset="0"/>
                 <a:cs typeface="Times New Roman" panose="02020603050405020304" pitchFamily="18" charset="0"/>
               </a:rPr>
               <a:t>Ideathon</a:t>
-            </a:r>
-            <a:r>
-              <a:rPr lang="en-IN" sz="1600" dirty="0" smtClean="0">
-                <a:latin typeface="Calibri" panose="020F0502020204030204" pitchFamily="34" charset="0"/>
-                <a:ea typeface="Calibri" panose="020F0502020204030204" pitchFamily="34" charset="0"/>
-                <a:cs typeface="Times New Roman" panose="02020603050405020304" pitchFamily="18" charset="0"/>
-              </a:rPr>
-              <a:t>/</a:t>
-            </a:r>
-            <a:r>
-              <a:rPr lang="en-IN" sz="1600" dirty="0" err="1" smtClean="0">
-                <a:latin typeface="Calibri" panose="020F0502020204030204" pitchFamily="34" charset="0"/>
-                <a:ea typeface="Calibri" panose="020F0502020204030204" pitchFamily="34" charset="0"/>
-                <a:cs typeface="Times New Roman" panose="02020603050405020304" pitchFamily="18" charset="0"/>
-              </a:rPr>
-              <a:t>Hackathon</a:t>
-            </a:r>
-            <a:r>
-              <a:rPr lang="en-IN" sz="1600" dirty="0" smtClean="0">
-                <a:latin typeface="Calibri" panose="020F0502020204030204" pitchFamily="34" charset="0"/>
-                <a:ea typeface="Calibri" panose="020F0502020204030204" pitchFamily="34" charset="0"/>
-                <a:cs typeface="Times New Roman" panose="02020603050405020304" pitchFamily="18" charset="0"/>
-              </a:rPr>
-              <a:t> </a:t>
             </a:r>
             <a:r>
               <a:rPr lang="en-IN" sz="1600" dirty="0">
@@ -3293,15 +3197,23 @@
                 <a:ea typeface="Calibri" panose="020F0502020204030204" pitchFamily="34" charset="0"/>
                 <a:cs typeface="Times New Roman" panose="02020603050405020304" pitchFamily="18" charset="0"/>
               </a:rPr>
-              <a:t>can be conducted with the help of the Portal and the inbuilt Framework </a:t>
-            </a:r>
-            <a:r>
-              <a:rPr lang="en-IN" sz="1600" dirty="0" smtClean="0">
+              <a:t>/</a:t>
+            </a:r>
+            <a:r>
+              <a:rPr lang="en-IN" sz="1600" dirty="0" err="1">
                 <a:latin typeface="Calibri" panose="020F0502020204030204" pitchFamily="34" charset="0"/>
                 <a:ea typeface="Calibri" panose="020F0502020204030204" pitchFamily="34" charset="0"/>
                 <a:cs typeface="Times New Roman" panose="02020603050405020304" pitchFamily="18" charset="0"/>
               </a:rPr>
-              <a:t>built.</a:t>
+              <a:t>Hackathon</a:t>
+            </a:r>
+            <a:r>
+              <a:rPr lang="en-IN" sz="1600" dirty="0">
+                <a:latin typeface="Calibri" panose="020F0502020204030204" pitchFamily="34" charset="0"/>
+                <a:ea typeface="Calibri" panose="020F0502020204030204" pitchFamily="34" charset="0"/>
+                <a:cs typeface="Times New Roman" panose="02020603050405020304" pitchFamily="18" charset="0"/>
+              </a:rPr>
+              <a:t> can be conducted with the help of the Portal and the inbuilt Framework built.</a:t>
             </a:r>
           </a:p>
           <a:p>
@@ -3349,7 +3261,7 @@
         <p:spPr>
           <a:xfrm>
             <a:off x="305750" y="2631638"/>
-            <a:ext cx="10505055" cy="3847207"/>
+            <a:ext cx="12721944" cy="7540526"/>
           </a:xfrm>
           <a:prstGeom prst="rect">
             <a:avLst/>
@@ -3363,20 +3275,20 @@
           <a:lstStyle/>
           <a:p>
             <a:r>
-              <a:rPr lang="en-IN" u="sng" dirty="0" smtClean="0"/>
+              <a:rPr lang="en-IN" u="sng" dirty="0"/>
               <a:t>Functional scope for product:</a:t>
             </a:r>
           </a:p>
           <a:p>
-            <a:endParaRPr lang="en-IN" u="sng" dirty="0" smtClean="0"/>
-          </a:p>
-          <a:p>
-            <a:pPr marL="742950" lvl="1" indent="-285750">
-              <a:buFont typeface="Arial" panose="020B0604020202020204" pitchFamily="34" charset="0"/>
-              <a:buChar char="•"/>
-            </a:pPr>
-            <a:r>
-              <a:rPr lang="en-IN" sz="1600" dirty="0" smtClean="0"/>
+            <a:endParaRPr lang="en-IN" u="sng" dirty="0"/>
+          </a:p>
+          <a:p>
+            <a:pPr marL="742950" lvl="1" indent="-285750">
+              <a:buFont typeface="Arial" panose="020B0604020202020204" pitchFamily="34" charset="0"/>
+              <a:buChar char="•"/>
+            </a:pPr>
+            <a:r>
+              <a:rPr lang="en-IN" sz="1600" dirty="0"/>
               <a:t>Registration facility for user</a:t>
             </a:r>
           </a:p>
@@ -3386,11 +3298,11 @@
               <a:buChar char="•"/>
             </a:pPr>
             <a:r>
-              <a:rPr lang="en-IN" sz="1600" dirty="0" smtClean="0"/>
+              <a:rPr lang="en-IN" sz="1600" dirty="0"/>
               <a:t>Authentication &amp; </a:t>
             </a:r>
             <a:r>
-              <a:rPr lang="en-IN" sz="1600" dirty="0" smtClean="0">
+              <a:rPr lang="en-IN" sz="1600" dirty="0">
                 <a:solidFill>
                   <a:srgbClr val="FF0000"/>
                 </a:solidFill>
@@ -3398,7 +3310,7 @@
               <a:t>Role based access</a:t>
             </a:r>
             <a:r>
-              <a:rPr lang="en-IN" sz="1600" dirty="0" smtClean="0"/>
+              <a:rPr lang="en-IN" sz="1600" dirty="0"/>
               <a:t>.</a:t>
             </a:r>
             <a:r>
@@ -3408,75 +3320,33 @@
                 </a:solidFill>
                 <a:sym typeface="Wingdings" panose="05000000000000000000" pitchFamily="2" charset="2"/>
               </a:rPr>
-              <a:t> (Page created for ideation</a:t>
-            </a:r>
-            <a:r>
-              <a:rPr lang="en-IN" sz="1600" dirty="0" smtClean="0">
+              <a:t> (Page created for ideation)</a:t>
+            </a:r>
+            <a:endParaRPr lang="en-IN" sz="1600" dirty="0"/>
+          </a:p>
+          <a:p>
+            <a:pPr marL="742950" lvl="1" indent="-285750">
+              <a:buFont typeface="Arial" panose="020B0604020202020204" pitchFamily="34" charset="0"/>
+              <a:buChar char="•"/>
+            </a:pPr>
+            <a:r>
+              <a:rPr lang="en-IN" sz="1600" dirty="0">
+                <a:solidFill>
+                  <a:srgbClr val="FF0000"/>
+                </a:solidFill>
+              </a:rPr>
+              <a:t>Users to be categorised in an organisational context &amp; Hackathon point of view .</a:t>
+            </a:r>
+            <a:r>
+              <a:rPr lang="en-IN" sz="1600" dirty="0">
                 <a:solidFill>
                   <a:srgbClr val="92D050"/>
                 </a:solidFill>
                 <a:sym typeface="Wingdings" panose="05000000000000000000" pitchFamily="2" charset="2"/>
               </a:rPr>
-              <a:t>)</a:t>
-            </a:r>
-            <a:endParaRPr lang="en-IN" sz="1600" dirty="0" smtClean="0"/>
-          </a:p>
-          <a:p>
-            <a:pPr marL="742950" lvl="1" indent="-285750">
-              <a:buFont typeface="Arial" panose="020B0604020202020204" pitchFamily="34" charset="0"/>
-              <a:buChar char="•"/>
-            </a:pPr>
-            <a:r>
-              <a:rPr lang="en-IN" sz="1600" dirty="0" smtClean="0">
-                <a:solidFill>
-                  <a:srgbClr val="FF0000"/>
-                </a:solidFill>
-              </a:rPr>
-              <a:t>Users to be categorised in an organisational context &amp; Hackathon</a:t>
-            </a:r>
-            <a:r>
-              <a:rPr lang="en-IN" sz="1600" dirty="0">
-                <a:solidFill>
-                  <a:srgbClr val="FF0000"/>
-                </a:solidFill>
-              </a:rPr>
-              <a:t> </a:t>
-            </a:r>
-            <a:r>
-              <a:rPr lang="en-IN" sz="1600" dirty="0" smtClean="0">
-                <a:solidFill>
-                  <a:srgbClr val="FF0000"/>
-                </a:solidFill>
-              </a:rPr>
-              <a:t>point of view </a:t>
-            </a:r>
-            <a:r>
-              <a:rPr lang="en-IN" sz="1600" dirty="0" smtClean="0">
-                <a:solidFill>
-                  <a:srgbClr val="FF0000"/>
-                </a:solidFill>
-              </a:rPr>
-              <a:t>.</a:t>
-            </a:r>
-            <a:r>
-              <a:rPr lang="en-IN" sz="1600" dirty="0">
-                <a:solidFill>
-                  <a:srgbClr val="92D050"/>
-                </a:solidFill>
-                <a:sym typeface="Wingdings" panose="05000000000000000000" pitchFamily="2" charset="2"/>
-              </a:rPr>
-              <a:t> (Page created for ideation</a:t>
-            </a:r>
-            <a:r>
-              <a:rPr lang="en-IN" sz="1600" dirty="0" smtClean="0">
-                <a:solidFill>
-                  <a:srgbClr val="92D050"/>
-                </a:solidFill>
-                <a:sym typeface="Wingdings" panose="05000000000000000000" pitchFamily="2" charset="2"/>
-              </a:rPr>
-              <a:t>)</a:t>
-            </a:r>
-            <a:endParaRPr lang="en-IN" sz="1600" dirty="0" smtClean="0">
+              <a:t> (Page created for ideation)</a:t>
+            </a:r>
+            <a:endParaRPr lang="en-IN" sz="1600" dirty="0">
               <a:solidFill>
                 <a:srgbClr val="FF0000"/>
               </a:solidFill>
@@ -3488,23 +3358,15 @@
               <a:buChar char="•"/>
             </a:pPr>
             <a:r>
-              <a:rPr lang="en-IN" sz="1600" dirty="0" smtClean="0">
+              <a:rPr lang="en-IN" sz="1600" dirty="0">
                 <a:solidFill>
                   <a:srgbClr val="FF0000"/>
                 </a:solidFill>
               </a:rPr>
-              <a:t>Tool should intake ideas ,link categorise and classify them appropriately </a:t>
-            </a:r>
-            <a:r>
-              <a:rPr lang="en-IN" sz="1600" dirty="0" smtClean="0">
-                <a:solidFill>
-                  <a:srgbClr val="FF0000"/>
-                </a:solidFill>
-              </a:rPr>
-              <a:t>.</a:t>
-            </a:r>
-            <a:r>
-              <a:rPr lang="en-IN" sz="1600" dirty="0" smtClean="0">
+              <a:t>Tool should intake ideas ,link categorise and classify them appropriately .</a:t>
+            </a:r>
+            <a:r>
+              <a:rPr lang="en-IN" sz="1600" dirty="0">
                 <a:solidFill>
                   <a:srgbClr val="92D050"/>
                 </a:solidFill>
@@ -3512,7 +3374,7 @@
               </a:rPr>
               <a:t>(Page created for ideation)</a:t>
             </a:r>
-            <a:endParaRPr lang="en-IN" sz="1600" dirty="0" smtClean="0">
+            <a:endParaRPr lang="en-IN" sz="1600" dirty="0">
               <a:solidFill>
                 <a:srgbClr val="92D050"/>
               </a:solidFill>
@@ -3524,11 +3386,11 @@
               <a:buChar char="•"/>
             </a:pPr>
             <a:r>
-              <a:rPr lang="en-IN" sz="1600" dirty="0" smtClean="0"/>
+              <a:rPr lang="en-IN" sz="1600" dirty="0"/>
               <a:t>Tool should assign and idea to an innovation evangelist of that </a:t>
             </a:r>
             <a:r>
-              <a:rPr lang="en-IN" sz="1600" b="1" dirty="0" smtClean="0">
+              <a:rPr lang="en-IN" sz="1600" b="1" dirty="0">
                 <a:solidFill>
                   <a:srgbClr val="FF0000"/>
                 </a:solidFill>
@@ -3536,20 +3398,12 @@
               <a:t>domain </a:t>
             </a:r>
             <a:r>
-              <a:rPr lang="en-IN" sz="1600" dirty="0" smtClean="0">
+              <a:rPr lang="en-IN" sz="1600" dirty="0">
                 <a:solidFill>
                   <a:srgbClr val="FF0000"/>
                 </a:solidFill>
               </a:rPr>
-              <a:t>for evaluation</a:t>
-            </a:r>
-            <a:r>
-              <a:rPr lang="en-IN" sz="1600" dirty="0" smtClean="0">
-                <a:solidFill>
-                  <a:srgbClr val="FF0000"/>
-                </a:solidFill>
-              </a:rPr>
-              <a:t>. </a:t>
+              <a:t>for evaluation. </a:t>
             </a:r>
             <a:r>
               <a:rPr lang="en-IN" sz="1600" dirty="0">
@@ -3558,18 +3412,9 @@
                 </a:solidFill>
                 <a:sym typeface="Wingdings" panose="05000000000000000000" pitchFamily="2" charset="2"/>
               </a:rPr>
-              <a:t>(Page created for ideation</a:t>
-            </a:r>
-            <a:r>
-              <a:rPr lang="en-IN" sz="1600" dirty="0" smtClean="0">
-                <a:solidFill>
-                  <a:srgbClr val="92D050"/>
-                </a:solidFill>
-                <a:sym typeface="Wingdings" panose="05000000000000000000" pitchFamily="2" charset="2"/>
-              </a:rPr>
-              <a:t>)</a:t>
-            </a:r>
-            <a:endParaRPr lang="en-IN" sz="1600" dirty="0" smtClean="0">
+              <a:t>(Page created for ideation)</a:t>
+            </a:r>
+            <a:endParaRPr lang="en-IN" sz="1600" dirty="0">
               <a:solidFill>
                 <a:srgbClr val="FF0000"/>
               </a:solidFill>
@@ -3581,7 +3426,7 @@
               <a:buChar char="•"/>
             </a:pPr>
             <a:r>
-              <a:rPr lang="en-IN" sz="1600" dirty="0" smtClean="0"/>
+              <a:rPr lang="en-IN" sz="1600" dirty="0"/>
               <a:t>Tool should inform the user about status on approval and with whom it’s pending .</a:t>
             </a:r>
           </a:p>
@@ -3600,18 +3445,10 @@
                   <a:srgbClr val="FF0000"/>
                 </a:solidFill>
               </a:rPr>
-              <a:t>alerts or notifications to users </a:t>
-            </a:r>
-            <a:r>
-              <a:rPr lang="en-IN" sz="1600" dirty="0" smtClean="0">
-                <a:solidFill>
-                  <a:srgbClr val="FF0000"/>
-                </a:solidFill>
-              </a:rPr>
-              <a:t>about assignment / feedback </a:t>
-            </a:r>
-            <a:r>
-              <a:rPr lang="en-IN" sz="1600" dirty="0" smtClean="0"/>
+              <a:t>alerts or notifications to users about assignment / feedback </a:t>
+            </a:r>
+            <a:r>
+              <a:rPr lang="en-IN" sz="1600" dirty="0"/>
               <a:t>.</a:t>
             </a:r>
           </a:p>
@@ -3622,51 +3459,263 @@
             </a:pPr>
             <a:r>
               <a:rPr lang="en-IN" sz="1600" strike="sngStrike" dirty="0"/>
-              <a:t>For an approved idea , Team formation </a:t>
-            </a:r>
-            <a:r>
-              <a:rPr lang="en-IN" sz="1600" strike="sngStrike" dirty="0" smtClean="0"/>
-              <a:t>facility from the tool using the available registered users. </a:t>
-            </a:r>
-            <a:r>
-              <a:rPr lang="en-IN" sz="1600" strike="sngStrike" dirty="0" smtClean="0">
+              <a:t>For an approved idea , Team formation facility from the tool using the available registered users. </a:t>
+            </a:r>
+            <a:r>
+              <a:rPr lang="en-IN" sz="1600" strike="sngStrike" dirty="0">
                 <a:sym typeface="Wingdings" panose="05000000000000000000" pitchFamily="2" charset="2"/>
               </a:rPr>
               <a:t> Extended MVP</a:t>
             </a:r>
-            <a:endParaRPr lang="en-IN" sz="1600" strike="sngStrike" dirty="0" smtClean="0"/>
+          </a:p>
+          <a:p>
+            <a:pPr marL="742950" lvl="1" indent="-285750">
+              <a:buFont typeface="Arial" panose="020B0604020202020204" pitchFamily="34" charset="0"/>
+              <a:buChar char="•"/>
+            </a:pPr>
+            <a:r>
+              <a:rPr lang="en-IN" sz="1600" dirty="0">
+                <a:solidFill>
+                  <a:srgbClr val="00B0F0"/>
+                </a:solidFill>
+              </a:rPr>
+              <a:t>Tool Should list the most common domains/tools/technologies and if not in the list, user will provide and that should be added back to the list</a:t>
+            </a:r>
+          </a:p>
+          <a:p>
+            <a:pPr marL="742950" lvl="1" indent="-285750">
+              <a:buFont typeface="Arial" panose="020B0604020202020204" pitchFamily="34" charset="0"/>
+              <a:buChar char="•"/>
+            </a:pPr>
+            <a:r>
+              <a:rPr lang="en-IN" sz="1600" dirty="0">
+                <a:solidFill>
+                  <a:srgbClr val="00B0F0"/>
+                </a:solidFill>
+              </a:rPr>
+              <a:t>Allows the users to choose domain, tools and technologies for the idea by themselves</a:t>
+            </a:r>
+          </a:p>
+          <a:p>
+            <a:pPr marL="742950" lvl="1" indent="-285750">
+              <a:buFont typeface="Arial" panose="020B0604020202020204" pitchFamily="34" charset="0"/>
+              <a:buChar char="•"/>
+            </a:pPr>
+            <a:r>
+              <a:rPr lang="en-IN" sz="1600" dirty="0">
+                <a:solidFill>
+                  <a:srgbClr val="00B0F0"/>
+                </a:solidFill>
+              </a:rPr>
+              <a:t>User should be allowed to define brief goal/purpose/functionality/outcome of the idea</a:t>
+            </a:r>
+          </a:p>
+          <a:p>
+            <a:pPr marL="742950" lvl="1" indent="-285750">
+              <a:buFont typeface="Arial" panose="020B0604020202020204" pitchFamily="34" charset="0"/>
+              <a:buChar char="•"/>
+            </a:pPr>
+            <a:r>
+              <a:rPr lang="en-IN" sz="1600" dirty="0">
+                <a:solidFill>
+                  <a:srgbClr val="00B0F0"/>
+                </a:solidFill>
+              </a:rPr>
+              <a:t>Allows users to like/promote/vote or shows interests in other ideas</a:t>
+            </a:r>
+          </a:p>
+          <a:p>
+            <a:pPr marL="742950" lvl="1" indent="-285750">
+              <a:buFont typeface="Arial" panose="020B0604020202020204" pitchFamily="34" charset="0"/>
+              <a:buChar char="•"/>
+            </a:pPr>
+            <a:r>
+              <a:rPr lang="en-IN" sz="1600" dirty="0">
+                <a:solidFill>
+                  <a:srgbClr val="00B0F0"/>
+                </a:solidFill>
+              </a:rPr>
+              <a:t>Export an single idea to a pdf if possible share as pdf option</a:t>
+            </a:r>
+          </a:p>
+          <a:p>
+            <a:pPr marL="742950" lvl="1" indent="-285750">
+              <a:buFont typeface="Arial" panose="020B0604020202020204" pitchFamily="34" charset="0"/>
+              <a:buChar char="•"/>
+            </a:pPr>
+            <a:r>
+              <a:rPr lang="en-IN" sz="1600" dirty="0">
+                <a:solidFill>
+                  <a:srgbClr val="00B0F0"/>
+                </a:solidFill>
+              </a:rPr>
+              <a:t>Import/Export all ideas to </a:t>
+            </a:r>
+            <a:r>
+              <a:rPr lang="en-IN" sz="1600" dirty="0" err="1">
+                <a:solidFill>
+                  <a:srgbClr val="00B0F0"/>
+                </a:solidFill>
+              </a:rPr>
+              <a:t>xls</a:t>
+            </a:r>
+            <a:endParaRPr lang="en-IN" sz="1600" dirty="0">
+              <a:solidFill>
+                <a:srgbClr val="00B0F0"/>
+              </a:solidFill>
+            </a:endParaRPr>
+          </a:p>
+          <a:p>
+            <a:pPr marL="742950" lvl="1" indent="-285750">
+              <a:buFont typeface="Arial" panose="020B0604020202020204" pitchFamily="34" charset="0"/>
+              <a:buChar char="•"/>
+            </a:pPr>
+            <a:r>
+              <a:rPr lang="en-IN" sz="1600" dirty="0">
+                <a:solidFill>
+                  <a:srgbClr val="00B0F0"/>
+                </a:solidFill>
+              </a:rPr>
+              <a:t>Should support bulk uploads</a:t>
+            </a:r>
           </a:p>
           <a:p>
             <a:pPr lvl="1"/>
-            <a:endParaRPr lang="en-IN" sz="1600" dirty="0" smtClean="0"/>
-          </a:p>
-          <a:p>
-            <a:pPr marL="742950" lvl="1" indent="-285750">
-              <a:buFont typeface="Arial" panose="020B0604020202020204" pitchFamily="34" charset="0"/>
-              <a:buChar char="•"/>
-            </a:pPr>
-            <a:endParaRPr lang="en-IN" sz="1600" dirty="0" smtClean="0"/>
-          </a:p>
-          <a:p>
-            <a:pPr marL="742950" lvl="1" indent="-285750">
-              <a:buFont typeface="Arial" panose="020B0604020202020204" pitchFamily="34" charset="0"/>
-              <a:buChar char="•"/>
-            </a:pPr>
-            <a:endParaRPr lang="en-IN" sz="1600" dirty="0" smtClean="0"/>
-          </a:p>
-          <a:p>
-            <a:pPr marL="742950" lvl="1" indent="-285750">
-              <a:buFont typeface="Arial" panose="020B0604020202020204" pitchFamily="34" charset="0"/>
-              <a:buChar char="•"/>
-            </a:pPr>
-            <a:endParaRPr lang="en-IN" sz="1600" dirty="0" smtClean="0"/>
-          </a:p>
-          <a:p>
-            <a:pPr marL="742950" lvl="1" indent="-285750">
-              <a:buFont typeface="Arial" panose="020B0604020202020204" pitchFamily="34" charset="0"/>
-              <a:buChar char="•"/>
-            </a:pPr>
-            <a:endParaRPr lang="en-IN" sz="1600" dirty="0" smtClean="0"/>
+            <a:endParaRPr lang="en-IN" sz="1600" dirty="0">
+              <a:solidFill>
+                <a:srgbClr val="00B0F0"/>
+              </a:solidFill>
+            </a:endParaRPr>
+          </a:p>
+          <a:p>
+            <a:pPr lvl="1"/>
+            <a:r>
+              <a:rPr lang="en-IN" sz="1600" u="sng" dirty="0">
+                <a:solidFill>
+                  <a:srgbClr val="00B0F0"/>
+                </a:solidFill>
+              </a:rPr>
+              <a:t>Probable Users and their roles/access</a:t>
+            </a:r>
+          </a:p>
+          <a:p>
+            <a:pPr lvl="1"/>
+            <a:endParaRPr lang="en-IN" sz="1600" dirty="0">
+              <a:solidFill>
+                <a:srgbClr val="00B0F0"/>
+              </a:solidFill>
+            </a:endParaRPr>
+          </a:p>
+          <a:p>
+            <a:pPr rtl="0" fontAlgn="ctr">
+              <a:spcBef>
+                <a:spcPts val="0"/>
+              </a:spcBef>
+              <a:spcAft>
+                <a:spcPts val="0"/>
+              </a:spcAft>
+              <a:buFont typeface="+mj-lt"/>
+              <a:buAutoNum type="arabicPeriod"/>
+            </a:pPr>
+            <a:r>
+              <a:rPr lang="en-IN" sz="1600" dirty="0">
+                <a:solidFill>
+                  <a:srgbClr val="00B0F0"/>
+                </a:solidFill>
+              </a:rPr>
+              <a:t>Idea Contributor - Single idea upload/Bulk idea upload/Modify/Delete</a:t>
+            </a:r>
+          </a:p>
+          <a:p>
+            <a:pPr rtl="0" fontAlgn="ctr">
+              <a:spcBef>
+                <a:spcPts val="0"/>
+              </a:spcBef>
+              <a:spcAft>
+                <a:spcPts val="0"/>
+              </a:spcAft>
+              <a:buFont typeface="+mj-lt"/>
+              <a:buAutoNum type="arabicPeriod"/>
+            </a:pPr>
+            <a:r>
+              <a:rPr lang="en-IN" sz="1600" dirty="0">
+                <a:solidFill>
+                  <a:srgbClr val="00B0F0"/>
+                </a:solidFill>
+              </a:rPr>
+              <a:t>Idea Evaluator - Approve/Reject/Ask for clarification</a:t>
+            </a:r>
+          </a:p>
+          <a:p>
+            <a:pPr rtl="0" fontAlgn="ctr">
+              <a:spcBef>
+                <a:spcPts val="0"/>
+              </a:spcBef>
+              <a:spcAft>
+                <a:spcPts val="0"/>
+              </a:spcAft>
+              <a:buFont typeface="+mj-lt"/>
+              <a:buAutoNum type="arabicPeriod"/>
+            </a:pPr>
+            <a:r>
+              <a:rPr lang="en-IN" sz="1600" dirty="0">
+                <a:solidFill>
+                  <a:srgbClr val="00B0F0"/>
+                </a:solidFill>
+              </a:rPr>
+              <a:t>Portal Administrators - Create users and provides Authentication/Authorization/Conducts virtual event</a:t>
+            </a:r>
+          </a:p>
+          <a:p>
+            <a:pPr lvl="1"/>
+            <a:endParaRPr lang="en-IN" sz="1600" dirty="0">
+              <a:solidFill>
+                <a:srgbClr val="00B0F0"/>
+              </a:solidFill>
+            </a:endParaRPr>
+          </a:p>
+          <a:p>
+            <a:pPr marL="742950" lvl="1" indent="-285750">
+              <a:buFont typeface="Arial" panose="020B0604020202020204" pitchFamily="34" charset="0"/>
+              <a:buChar char="•"/>
+            </a:pPr>
+            <a:endParaRPr lang="en-IN" sz="1600" dirty="0">
+              <a:solidFill>
+                <a:srgbClr val="00B0F0"/>
+              </a:solidFill>
+            </a:endParaRPr>
+          </a:p>
+          <a:p>
+            <a:pPr lvl="1"/>
+            <a:endParaRPr lang="en-IN" sz="1600" dirty="0"/>
+          </a:p>
+          <a:p>
+            <a:pPr marL="742950" lvl="1" indent="-285750">
+              <a:buFont typeface="Arial" panose="020B0604020202020204" pitchFamily="34" charset="0"/>
+              <a:buChar char="•"/>
+            </a:pPr>
+            <a:endParaRPr lang="en-IN" sz="1600" dirty="0"/>
+          </a:p>
+          <a:p>
+            <a:pPr marL="742950" lvl="1" indent="-285750">
+              <a:buFont typeface="Arial" panose="020B0604020202020204" pitchFamily="34" charset="0"/>
+              <a:buChar char="•"/>
+            </a:pPr>
+            <a:endParaRPr lang="en-IN" sz="1600" dirty="0"/>
+          </a:p>
+          <a:p>
+            <a:pPr marL="742950" lvl="1" indent="-285750">
+              <a:buFont typeface="Arial" panose="020B0604020202020204" pitchFamily="34" charset="0"/>
+              <a:buChar char="•"/>
+            </a:pPr>
+            <a:endParaRPr lang="en-IN" sz="1600" dirty="0"/>
+          </a:p>
+          <a:p>
+            <a:pPr marL="742950" lvl="1" indent="-285750">
+              <a:buFont typeface="Arial" panose="020B0604020202020204" pitchFamily="34" charset="0"/>
+              <a:buChar char="•"/>
+            </a:pPr>
+            <a:endParaRPr lang="en-IN" sz="1600" dirty="0"/>
           </a:p>
         </p:txBody>
       </p:sp>
@@ -3724,31 +3773,7 @@
           <a:p>
             <a:r>
               <a:rPr lang="en-IN" sz="1600" dirty="0"/>
-              <a:t>As an </a:t>
-            </a:r>
-            <a:r>
-              <a:rPr lang="en-IN" sz="1600" dirty="0" smtClean="0"/>
-              <a:t>user , </a:t>
-            </a:r>
-            <a:r>
-              <a:rPr lang="en-IN" sz="1600" dirty="0"/>
-              <a:t>I would like to share my </a:t>
-            </a:r>
-            <a:r>
-              <a:rPr lang="en-IN" sz="1600" dirty="0" smtClean="0"/>
-              <a:t>ideas , P.I’s, P.O.C’s , P.O.V’s,  </a:t>
-            </a:r>
-            <a:r>
-              <a:rPr lang="en-IN" sz="1600" dirty="0"/>
-              <a:t>related to a new </a:t>
-            </a:r>
-            <a:r>
-              <a:rPr lang="en-IN" sz="1600" dirty="0" smtClean="0"/>
-              <a:t>product/feature in </a:t>
-            </a:r>
-            <a:r>
-              <a:rPr lang="en-IN" sz="1600" dirty="0"/>
-              <a:t>an existing product/solution to an existing problem statement. I need my proposal to be evaluated, guided for the </a:t>
+              <a:t>As an user , I would like to share my ideas , P.I’s, P.O.C’s , P.O.V’s,  related to a new product/feature in an existing product/solution to an existing problem statement. I need my proposal to be evaluated, guided for the </a:t>
             </a:r>
             <a:r>
               <a:rPr lang="en-IN" sz="1600" dirty="0" err="1"/>
@@ -3807,10 +3832,9 @@
           </a:lstStyle>
           <a:p>
             <a:r>
-              <a:rPr lang="en-IN" sz="4000" dirty="0" smtClean="0"/>
+              <a:rPr lang="en-IN" sz="4000" dirty="0"/>
               <a:t>Use-case 1:</a:t>
             </a:r>
-            <a:endParaRPr lang="en-IN" sz="4000" dirty="0"/>
           </a:p>
         </p:txBody>
       </p:sp>
@@ -3823,7 +3847,7 @@
         <p:spPr>
           <a:xfrm>
             <a:off x="1545580" y="2670371"/>
-            <a:ext cx="8448084" cy="4339650"/>
+            <a:ext cx="8448084" cy="6063198"/>
           </a:xfrm>
           <a:prstGeom prst="rect">
             <a:avLst/>
@@ -3837,12 +3861,12 @@
           <a:lstStyle/>
           <a:p>
             <a:r>
-              <a:rPr lang="en-IN" u="sng" dirty="0" smtClean="0"/>
+              <a:rPr lang="en-IN" u="sng" dirty="0"/>
               <a:t>Functional scope:</a:t>
             </a:r>
           </a:p>
           <a:p>
-            <a:endParaRPr lang="en-IN" u="sng" dirty="0" smtClean="0"/>
+            <a:endParaRPr lang="en-IN" u="sng" dirty="0"/>
           </a:p>
           <a:p>
             <a:pPr marL="742950" lvl="1" indent="-285750">
@@ -3855,27 +3879,32 @@
                   <a:srgbClr val="FF0000"/>
                 </a:solidFill>
               </a:rPr>
-              <a:t>Idea life-cycle to be defined</a:t>
-            </a:r>
-            <a:r>
-              <a:rPr lang="en-IN" sz="1600" dirty="0" smtClean="0">
+              <a:t>Idea life-cycle to be defined.</a:t>
+            </a:r>
+          </a:p>
+          <a:p>
+            <a:pPr marL="742950" lvl="1" indent="-285750">
+              <a:buFont typeface="Arial" panose="020B0604020202020204" pitchFamily="34" charset="0"/>
+              <a:buChar char="•"/>
+            </a:pPr>
+            <a:r>
+              <a:rPr lang="en-IN" sz="1600" dirty="0"/>
+              <a:t>Classification of ideas during on-boarding either as enhancement or new product.  </a:t>
+            </a:r>
+          </a:p>
+          <a:p>
+            <a:pPr marL="742950" lvl="1" indent="-285750">
+              <a:buFont typeface="Arial" panose="020B0604020202020204" pitchFamily="34" charset="0"/>
+              <a:buChar char="•"/>
+            </a:pPr>
+            <a:r>
+              <a:rPr lang="en-IN" sz="1600" dirty="0">
                 <a:solidFill>
                   <a:srgbClr val="FF0000"/>
                 </a:solidFill>
               </a:rPr>
-              <a:t>.</a:t>
-            </a:r>
-          </a:p>
-          <a:p>
-            <a:pPr marL="742950" lvl="1" indent="-285750">
-              <a:buFont typeface="Arial" panose="020B0604020202020204" pitchFamily="34" charset="0"/>
-              <a:buChar char="•"/>
-            </a:pPr>
-            <a:r>
-              <a:rPr lang="en-IN" sz="1600" dirty="0" smtClean="0"/>
-              <a:t>Classification of ideas during on-boarding either as enhancement or new product.  </a:t>
-            </a:r>
-            <a:endParaRPr lang="en-IN" sz="1600" dirty="0"/>
+              <a:t>Contents to be collected as a part of idea to be defined.</a:t>
+            </a:r>
           </a:p>
           <a:p>
             <a:pPr marL="742950" lvl="1" indent="-285750">
@@ -3888,115 +3917,189 @@
                   <a:srgbClr val="FF0000"/>
                 </a:solidFill>
               </a:rPr>
-              <a:t>Contents to be collected as a part of idea to be defined</a:t>
-            </a:r>
-            <a:r>
-              <a:rPr lang="en-IN" sz="1600" dirty="0" smtClean="0">
+              <a:t>Differences in P.O.V or P.O.C’s and P.I’s during data intake</a:t>
+            </a:r>
+            <a:r>
+              <a:rPr lang="en-IN" sz="1600" dirty="0">
+                <a:solidFill>
+                  <a:srgbClr val="00B0F0"/>
+                </a:solidFill>
+              </a:rPr>
+              <a:t>.(Does it really needed)</a:t>
+            </a:r>
+          </a:p>
+          <a:p>
+            <a:pPr marL="742950" lvl="1" indent="-285750">
+              <a:buFont typeface="Arial" panose="020B0604020202020204" pitchFamily="34" charset="0"/>
+              <a:buChar char="•"/>
+            </a:pPr>
+            <a:r>
+              <a:rPr lang="en-IN" sz="1600" dirty="0"/>
+              <a:t>View of the feedback received </a:t>
+            </a:r>
+          </a:p>
+          <a:p>
+            <a:pPr marL="742950" lvl="1" indent="-285750">
+              <a:buFont typeface="Arial" panose="020B0604020202020204" pitchFamily="34" charset="0"/>
+              <a:buChar char="•"/>
+            </a:pPr>
+            <a:r>
+              <a:rPr lang="en-IN" sz="1600" dirty="0"/>
+              <a:t>Status on assignment and approval.</a:t>
+            </a:r>
+          </a:p>
+          <a:p>
+            <a:pPr marL="742950" lvl="1" indent="-285750">
+              <a:buFont typeface="Arial" panose="020B0604020202020204" pitchFamily="34" charset="0"/>
+              <a:buChar char="•"/>
+            </a:pPr>
+            <a:r>
+              <a:rPr lang="en-IN" sz="1600" dirty="0"/>
+              <a:t>Approval functionality to be defined .</a:t>
+            </a:r>
+          </a:p>
+          <a:p>
+            <a:pPr marL="742950" lvl="1" indent="-285750">
+              <a:buFont typeface="Arial" panose="020B0604020202020204" pitchFamily="34" charset="0"/>
+              <a:buChar char="•"/>
+            </a:pPr>
+            <a:r>
+              <a:rPr lang="en-IN" sz="1600" dirty="0"/>
+              <a:t>Approved </a:t>
+            </a:r>
+            <a:r>
+              <a:rPr lang="en-IN" sz="1600" b="1" dirty="0">
                 <a:solidFill>
                   <a:srgbClr val="FF0000"/>
                 </a:solidFill>
               </a:rPr>
-              <a:t>.</a:t>
-            </a:r>
-          </a:p>
-          <a:p>
-            <a:pPr marL="742950" lvl="1" indent="-285750">
-              <a:buFont typeface="Arial" panose="020B0604020202020204" pitchFamily="34" charset="0"/>
-              <a:buChar char="•"/>
-            </a:pPr>
-            <a:r>
-              <a:rPr lang="en-IN" sz="1600" dirty="0" smtClean="0">
-                <a:solidFill>
-                  <a:srgbClr val="FF0000"/>
-                </a:solidFill>
-              </a:rPr>
-              <a:t>Differences in P.O.V or P.O.C’s and P.I’s during data intake.</a:t>
-            </a:r>
-          </a:p>
-          <a:p>
-            <a:pPr marL="742950" lvl="1" indent="-285750">
-              <a:buFont typeface="Arial" panose="020B0604020202020204" pitchFamily="34" charset="0"/>
-              <a:buChar char="•"/>
-            </a:pPr>
-            <a:r>
-              <a:rPr lang="en-IN" sz="1600" dirty="0" smtClean="0"/>
-              <a:t>View of the feedback received </a:t>
-            </a:r>
-          </a:p>
-          <a:p>
-            <a:pPr marL="742950" lvl="1" indent="-285750">
-              <a:buFont typeface="Arial" panose="020B0604020202020204" pitchFamily="34" charset="0"/>
-              <a:buChar char="•"/>
-            </a:pPr>
-            <a:r>
-              <a:rPr lang="en-IN" sz="1600" dirty="0" smtClean="0"/>
-              <a:t>Status on assignment and approval.</a:t>
-            </a:r>
-          </a:p>
-          <a:p>
-            <a:pPr marL="742950" lvl="1" indent="-285750">
-              <a:buFont typeface="Arial" panose="020B0604020202020204" pitchFamily="34" charset="0"/>
-              <a:buChar char="•"/>
-            </a:pPr>
-            <a:r>
-              <a:rPr lang="en-IN" sz="1600" dirty="0"/>
-              <a:t>Approval functionality to be defined </a:t>
-            </a:r>
-            <a:r>
-              <a:rPr lang="en-IN" sz="1600" dirty="0" smtClean="0"/>
-              <a:t>.</a:t>
-            </a:r>
-          </a:p>
-          <a:p>
-            <a:pPr marL="742950" lvl="1" indent="-285750">
-              <a:buFont typeface="Arial" panose="020B0604020202020204" pitchFamily="34" charset="0"/>
-              <a:buChar char="•"/>
-            </a:pPr>
-            <a:r>
-              <a:rPr lang="en-IN" sz="1600" dirty="0" smtClean="0"/>
-              <a:t>Approved </a:t>
-            </a:r>
-            <a:r>
-              <a:rPr lang="en-IN" sz="1600" b="1" dirty="0" smtClean="0">
-                <a:solidFill>
-                  <a:srgbClr val="FF0000"/>
-                </a:solidFill>
-              </a:rPr>
               <a:t>ideas storage and view facility to be defined.</a:t>
             </a:r>
           </a:p>
           <a:p>
-            <a:pPr lvl="1"/>
-            <a:endParaRPr lang="en-IN" sz="1600" dirty="0" smtClean="0"/>
-          </a:p>
-          <a:p>
-            <a:pPr marL="742950" lvl="1" indent="-285750">
-              <a:buFont typeface="Arial" panose="020B0604020202020204" pitchFamily="34" charset="0"/>
-              <a:buChar char="•"/>
-            </a:pPr>
-            <a:endParaRPr lang="en-IN" sz="1600" dirty="0" smtClean="0"/>
+            <a:pPr marL="742950" lvl="1" indent="-285750">
+              <a:buFont typeface="Arial" panose="020B0604020202020204" pitchFamily="34" charset="0"/>
+              <a:buChar char="•"/>
+            </a:pPr>
+            <a:r>
+              <a:rPr lang="en-IN" sz="1600" dirty="0">
+                <a:solidFill>
+                  <a:srgbClr val="00B0F0"/>
+                </a:solidFill>
+              </a:rPr>
+              <a:t>View the ideas shared by others and vote/like it</a:t>
+            </a:r>
+          </a:p>
+          <a:p>
+            <a:pPr marL="742950" lvl="1" indent="-285750">
+              <a:buFont typeface="Arial" panose="020B0604020202020204" pitchFamily="34" charset="0"/>
+              <a:buChar char="•"/>
+            </a:pPr>
+            <a:r>
+              <a:rPr lang="en-IN" sz="1600" dirty="0">
+                <a:solidFill>
+                  <a:srgbClr val="00B0F0"/>
+                </a:solidFill>
+              </a:rPr>
+              <a:t>Edit/Modify/Delete only their submitted ideas</a:t>
+            </a:r>
+          </a:p>
+          <a:p>
+            <a:pPr marL="742950" lvl="1" indent="-285750">
+              <a:buFont typeface="Arial" panose="020B0604020202020204" pitchFamily="34" charset="0"/>
+              <a:buChar char="•"/>
+            </a:pPr>
+            <a:r>
+              <a:rPr lang="en-IN" sz="1600" dirty="0">
+                <a:solidFill>
+                  <a:srgbClr val="00B0F0"/>
+                </a:solidFill>
+              </a:rPr>
+              <a:t>Rules and Handbook can be provided to users</a:t>
+            </a:r>
+          </a:p>
+          <a:p>
+            <a:pPr marL="742950" lvl="1" indent="-285750">
+              <a:buFont typeface="Arial" panose="020B0604020202020204" pitchFamily="34" charset="0"/>
+              <a:buChar char="•"/>
+            </a:pPr>
+            <a:r>
+              <a:rPr lang="en-IN" sz="1600" dirty="0">
+                <a:solidFill>
+                  <a:srgbClr val="00B0F0"/>
+                </a:solidFill>
+              </a:rPr>
+              <a:t>Should be able to receive feedback from the users</a:t>
+            </a:r>
+          </a:p>
+          <a:p>
+            <a:pPr marL="742950" lvl="1" indent="-285750">
+              <a:buFont typeface="Arial" panose="020B0604020202020204" pitchFamily="34" charset="0"/>
+              <a:buChar char="•"/>
+            </a:pPr>
+            <a:r>
+              <a:rPr lang="en-IN" sz="1600" dirty="0">
+                <a:solidFill>
+                  <a:srgbClr val="00B0F0"/>
+                </a:solidFill>
+              </a:rPr>
+              <a:t>Common template for uploading ideas</a:t>
+            </a:r>
+          </a:p>
+          <a:p>
+            <a:pPr marL="742950" lvl="1" indent="-285750">
+              <a:buFont typeface="Arial" panose="020B0604020202020204" pitchFamily="34" charset="0"/>
+              <a:buChar char="•"/>
+            </a:pPr>
+            <a:endParaRPr lang="en-IN" sz="1600" dirty="0">
+              <a:solidFill>
+                <a:srgbClr val="00B0F0"/>
+              </a:solidFill>
+            </a:endParaRPr>
+          </a:p>
+          <a:p>
+            <a:pPr marL="742950" lvl="1" indent="-285750">
+              <a:buFont typeface="Arial" panose="020B0604020202020204" pitchFamily="34" charset="0"/>
+              <a:buChar char="•"/>
+            </a:pPr>
+            <a:endParaRPr lang="en-IN" sz="1600" b="1" dirty="0">
+              <a:solidFill>
+                <a:srgbClr val="FF0000"/>
+              </a:solidFill>
+            </a:endParaRPr>
           </a:p>
           <a:p>
             <a:pPr lvl="1"/>
             <a:endParaRPr lang="en-IN" sz="1600" dirty="0"/>
           </a:p>
           <a:p>
+            <a:pPr marL="742950" lvl="1" indent="-285750">
+              <a:buFont typeface="Arial" panose="020B0604020202020204" pitchFamily="34" charset="0"/>
+              <a:buChar char="•"/>
+            </a:pPr>
+            <a:endParaRPr lang="en-IN" sz="1600" dirty="0"/>
+          </a:p>
+          <a:p>
             <a:pPr lvl="1"/>
-            <a:endParaRPr lang="en-IN" sz="1600" dirty="0" smtClean="0"/>
-          </a:p>
-          <a:p>
-            <a:pPr marL="742950" lvl="1" indent="-285750">
-              <a:buFont typeface="Arial" panose="020B0604020202020204" pitchFamily="34" charset="0"/>
-              <a:buChar char="•"/>
-            </a:pPr>
-            <a:endParaRPr lang="en-IN" sz="1600" dirty="0" smtClean="0"/>
-          </a:p>
-          <a:p>
-            <a:pPr marL="742950" lvl="1" indent="-285750">
-              <a:buFont typeface="Arial" panose="020B0604020202020204" pitchFamily="34" charset="0"/>
-              <a:buChar char="•"/>
-            </a:pPr>
-            <a:endParaRPr lang="en-IN" sz="1600" dirty="0" smtClean="0"/>
+            <a:endParaRPr lang="en-IN" sz="1600" dirty="0"/>
+          </a:p>
+          <a:p>
+            <a:pPr lvl="1"/>
+            <a:endParaRPr lang="en-IN" sz="1600" dirty="0"/>
+          </a:p>
+          <a:p>
+            <a:pPr marL="742950" lvl="1" indent="-285750">
+              <a:buFont typeface="Arial" panose="020B0604020202020204" pitchFamily="34" charset="0"/>
+              <a:buChar char="•"/>
+            </a:pPr>
+            <a:endParaRPr lang="en-IN" sz="1600" dirty="0"/>
+          </a:p>
+          <a:p>
+            <a:pPr marL="742950" lvl="1" indent="-285750">
+              <a:buFont typeface="Arial" panose="020B0604020202020204" pitchFamily="34" charset="0"/>
+              <a:buChar char="•"/>
+            </a:pPr>
+            <a:endParaRPr lang="en-IN" sz="1600" dirty="0"/>
           </a:p>
           <a:p>
             <a:pPr marL="742950" lvl="1" indent="-285750">
@@ -4061,15 +4164,7 @@
           <a:p>
             <a:r>
               <a:rPr lang="en-IN" sz="2400" dirty="0"/>
-              <a:t>As </a:t>
-            </a:r>
-            <a:r>
-              <a:rPr lang="en-IN" sz="2400" dirty="0" smtClean="0"/>
-              <a:t>a user with innovation evangelist role, </a:t>
-            </a:r>
-            <a:r>
-              <a:rPr lang="en-IN" sz="2400" dirty="0"/>
-              <a:t>I would like to analyse and refer different </a:t>
+              <a:t>As a user with innovation evangelist role, I would like to analyse and refer different </a:t>
             </a:r>
             <a:r>
               <a:rPr lang="en-IN" sz="2400" dirty="0" err="1"/>
@@ -4132,10 +4227,9 @@
           </a:lstStyle>
           <a:p>
             <a:r>
-              <a:rPr lang="en-IN" sz="4000" dirty="0" smtClean="0"/>
+              <a:rPr lang="en-IN" sz="4000" dirty="0"/>
               <a:t>Use-case 2:</a:t>
             </a:r>
-            <a:endParaRPr lang="en-IN" sz="4000" dirty="0"/>
           </a:p>
         </p:txBody>
       </p:sp>
@@ -4148,7 +4242,7 @@
         <p:spPr>
           <a:xfrm>
             <a:off x="412694" y="2751291"/>
-            <a:ext cx="9030711" cy="3354765"/>
+            <a:ext cx="9030711" cy="3600986"/>
           </a:xfrm>
           <a:prstGeom prst="rect">
             <a:avLst/>
@@ -4162,24 +4256,24 @@
           <a:lstStyle/>
           <a:p>
             <a:r>
-              <a:rPr lang="en-IN" u="sng" dirty="0" smtClean="0"/>
+              <a:rPr lang="en-IN" u="sng" dirty="0"/>
               <a:t>Functional scope:</a:t>
             </a:r>
           </a:p>
           <a:p>
-            <a:endParaRPr lang="en-IN" u="sng" dirty="0" smtClean="0"/>
-          </a:p>
-          <a:p>
-            <a:pPr marL="742950" lvl="1" indent="-285750">
-              <a:buFont typeface="Arial" panose="020B0604020202020204" pitchFamily="34" charset="0"/>
-              <a:buChar char="•"/>
-            </a:pPr>
-            <a:r>
-              <a:rPr lang="en-IN" sz="1600" dirty="0" smtClean="0"/>
+            <a:endParaRPr lang="en-IN" u="sng" dirty="0"/>
+          </a:p>
+          <a:p>
+            <a:pPr marL="742950" lvl="1" indent="-285750">
+              <a:buFont typeface="Arial" panose="020B0604020202020204" pitchFamily="34" charset="0"/>
+              <a:buChar char="•"/>
+            </a:pPr>
+            <a:r>
+              <a:rPr lang="en-IN" sz="1600" dirty="0"/>
               <a:t>Role tagging for a registered user as </a:t>
             </a:r>
             <a:r>
-              <a:rPr lang="en-IN" sz="1600" b="1" dirty="0" smtClean="0">
+              <a:rPr lang="en-IN" sz="1600" b="1" dirty="0">
                 <a:solidFill>
                   <a:srgbClr val="FF0000"/>
                 </a:solidFill>
@@ -4193,21 +4287,29 @@
               <a:buChar char="•"/>
             </a:pPr>
             <a:r>
-              <a:rPr lang="en-IN" sz="1600" dirty="0" smtClean="0">
+              <a:rPr lang="en-IN" sz="1600" dirty="0">
                 <a:solidFill>
                   <a:srgbClr val="FF0000"/>
                 </a:solidFill>
               </a:rPr>
-              <a:t>An innovation evangelist should be tagged to a domain.</a:t>
-            </a:r>
-          </a:p>
-          <a:p>
-            <a:pPr marL="742950" lvl="1" indent="-285750">
-              <a:buFont typeface="Arial" panose="020B0604020202020204" pitchFamily="34" charset="0"/>
-              <a:buChar char="•"/>
-            </a:pPr>
-            <a:r>
-              <a:rPr lang="en-IN" sz="1600" dirty="0" smtClean="0"/>
+              <a:t>An innovation evangelist should be tagged to a domain. </a:t>
+            </a:r>
+            <a:r>
+              <a:rPr lang="en-IN" sz="1600" dirty="0">
+                <a:solidFill>
+                  <a:srgbClr val="00B0F0"/>
+                </a:solidFill>
+              </a:rPr>
+              <a:t>(We cannot restrict the domain for the users)</a:t>
+            </a:r>
+          </a:p>
+          <a:p>
+            <a:pPr marL="742950" lvl="1" indent="-285750">
+              <a:buFont typeface="Arial" panose="020B0604020202020204" pitchFamily="34" charset="0"/>
+              <a:buChar char="•"/>
+            </a:pPr>
+            <a:r>
+              <a:rPr lang="en-IN" sz="1600" dirty="0"/>
               <a:t>A P.I. or P.O.V or P.O.C can be assigned to an innovation evangelist of the domain of that idea.</a:t>
             </a:r>
           </a:p>
@@ -4217,7 +4319,7 @@
               <a:buChar char="•"/>
             </a:pPr>
             <a:r>
-              <a:rPr lang="en-IN" sz="1600" dirty="0" smtClean="0"/>
+              <a:rPr lang="en-IN" sz="1600" dirty="0"/>
               <a:t>Feedback provisioning facility for an innovation evangelist with a rejection .</a:t>
             </a:r>
           </a:p>
@@ -4227,7 +4329,7 @@
               <a:buChar char="•"/>
             </a:pPr>
             <a:r>
-              <a:rPr lang="en-IN" sz="1600" dirty="0" smtClean="0"/>
+              <a:rPr lang="en-IN" sz="1600" dirty="0"/>
               <a:t>Feedback provisioning facility for an innovation evangelist citing an approval.</a:t>
             </a:r>
           </a:p>
@@ -4237,7 +4339,7 @@
               <a:buChar char="•"/>
             </a:pPr>
             <a:r>
-              <a:rPr lang="en-IN" sz="1600" dirty="0" smtClean="0">
+              <a:rPr lang="en-IN" sz="1600" dirty="0">
                 <a:solidFill>
                   <a:srgbClr val="FF0000"/>
                 </a:solidFill>
@@ -4250,28 +4352,28 @@
               <a:buFont typeface="Arial" panose="020B0604020202020204" pitchFamily="34" charset="0"/>
               <a:buChar char="•"/>
             </a:pPr>
-            <a:endParaRPr lang="en-IN" sz="1600" dirty="0" smtClean="0"/>
-          </a:p>
-          <a:p>
-            <a:pPr marL="742950" lvl="1" indent="-285750">
-              <a:buFont typeface="Arial" panose="020B0604020202020204" pitchFamily="34" charset="0"/>
-              <a:buChar char="•"/>
-            </a:pPr>
-            <a:endParaRPr lang="en-IN" sz="1600" dirty="0" smtClean="0"/>
-          </a:p>
-          <a:p>
-            <a:pPr marL="742950" lvl="1" indent="-285750">
-              <a:buFont typeface="Arial" panose="020B0604020202020204" pitchFamily="34" charset="0"/>
-              <a:buChar char="•"/>
-            </a:pPr>
-            <a:endParaRPr lang="en-IN" sz="1600" dirty="0" smtClean="0"/>
-          </a:p>
-          <a:p>
-            <a:pPr marL="742950" lvl="1" indent="-285750">
-              <a:buFont typeface="Arial" panose="020B0604020202020204" pitchFamily="34" charset="0"/>
-              <a:buChar char="•"/>
-            </a:pPr>
-            <a:endParaRPr lang="en-IN" sz="1600" dirty="0" smtClean="0"/>
+            <a:endParaRPr lang="en-IN" sz="1600" dirty="0"/>
+          </a:p>
+          <a:p>
+            <a:pPr marL="742950" lvl="1" indent="-285750">
+              <a:buFont typeface="Arial" panose="020B0604020202020204" pitchFamily="34" charset="0"/>
+              <a:buChar char="•"/>
+            </a:pPr>
+            <a:endParaRPr lang="en-IN" sz="1600" dirty="0"/>
+          </a:p>
+          <a:p>
+            <a:pPr marL="742950" lvl="1" indent="-285750">
+              <a:buFont typeface="Arial" panose="020B0604020202020204" pitchFamily="34" charset="0"/>
+              <a:buChar char="•"/>
+            </a:pPr>
+            <a:endParaRPr lang="en-IN" sz="1600" dirty="0"/>
+          </a:p>
+          <a:p>
+            <a:pPr marL="742950" lvl="1" indent="-285750">
+              <a:buFont typeface="Arial" panose="020B0604020202020204" pitchFamily="34" charset="0"/>
+              <a:buChar char="•"/>
+            </a:pPr>
+            <a:endParaRPr lang="en-IN" sz="1600" dirty="0"/>
           </a:p>
           <a:p>
             <a:pPr marL="742950" lvl="1" indent="-285750">
@@ -4399,10 +4501,9 @@
           </a:lstStyle>
           <a:p>
             <a:r>
-              <a:rPr lang="en-IN" sz="4000" dirty="0" smtClean="0"/>
+              <a:rPr lang="en-IN" sz="4000" dirty="0"/>
               <a:t>Use-case 3:</a:t>
             </a:r>
-            <a:endParaRPr lang="en-IN" sz="4000" dirty="0"/>
           </a:p>
         </p:txBody>
       </p:sp>
@@ -4415,7 +4516,7 @@
         <p:spPr>
           <a:xfrm>
             <a:off x="412695" y="2751291"/>
-            <a:ext cx="6837770" cy="3600986"/>
+            <a:ext cx="6837770" cy="4585871"/>
           </a:xfrm>
           <a:prstGeom prst="rect">
             <a:avLst/>
@@ -4429,20 +4530,20 @@
           <a:lstStyle/>
           <a:p>
             <a:r>
-              <a:rPr lang="en-IN" u="sng" dirty="0" smtClean="0"/>
+              <a:rPr lang="en-IN" u="sng" dirty="0"/>
               <a:t>Functional scope:</a:t>
             </a:r>
           </a:p>
           <a:p>
-            <a:endParaRPr lang="en-IN" u="sng" dirty="0" smtClean="0"/>
-          </a:p>
-          <a:p>
-            <a:pPr marL="742950" lvl="1" indent="-285750">
-              <a:buFont typeface="Arial" panose="020B0604020202020204" pitchFamily="34" charset="0"/>
-              <a:buChar char="•"/>
-            </a:pPr>
-            <a:r>
-              <a:rPr lang="en-IN" sz="1600" dirty="0" smtClean="0"/>
+            <a:endParaRPr lang="en-IN" u="sng" dirty="0"/>
+          </a:p>
+          <a:p>
+            <a:pPr marL="742950" lvl="1" indent="-285750">
+              <a:buFont typeface="Arial" panose="020B0604020202020204" pitchFamily="34" charset="0"/>
+              <a:buChar char="•"/>
+            </a:pPr>
+            <a:r>
+              <a:rPr lang="en-IN" sz="1600" dirty="0"/>
               <a:t>On-boarding or registration process .</a:t>
             </a:r>
           </a:p>
@@ -4452,7 +4553,7 @@
               <a:buChar char="•"/>
             </a:pPr>
             <a:r>
-              <a:rPr lang="en-IN" sz="1600" dirty="0" smtClean="0">
+              <a:rPr lang="en-IN" sz="1600" dirty="0">
                 <a:solidFill>
                   <a:srgbClr val="FF0000"/>
                 </a:solidFill>
@@ -4466,7 +4567,7 @@
               <a:buChar char="•"/>
             </a:pPr>
             <a:r>
-              <a:rPr lang="en-IN" sz="1600" dirty="0" smtClean="0">
+              <a:rPr lang="en-IN" sz="1600" dirty="0">
                 <a:solidFill>
                   <a:srgbClr val="FF0000"/>
                 </a:solidFill>
@@ -4480,7 +4581,7 @@
               <a:buChar char="•"/>
             </a:pPr>
             <a:r>
-              <a:rPr lang="en-IN" sz="1600" dirty="0" smtClean="0">
+              <a:rPr lang="en-IN" sz="1600" dirty="0">
                 <a:solidFill>
                   <a:srgbClr val="FF0000"/>
                 </a:solidFill>
@@ -4494,7 +4595,7 @@
               <a:buChar char="•"/>
             </a:pPr>
             <a:r>
-              <a:rPr lang="en-IN" sz="1600" dirty="0" smtClean="0">
+              <a:rPr lang="en-IN" sz="1600" dirty="0">
                 <a:solidFill>
                   <a:srgbClr val="FF0000"/>
                 </a:solidFill>
@@ -4508,7 +4609,7 @@
               <a:buChar char="•"/>
             </a:pPr>
             <a:r>
-              <a:rPr lang="en-IN" sz="1600" dirty="0" smtClean="0">
+              <a:rPr lang="en-IN" sz="1600" dirty="0">
                 <a:solidFill>
                   <a:srgbClr val="FF0000"/>
                 </a:solidFill>
@@ -4522,7 +4623,7 @@
               <a:buChar char="•"/>
             </a:pPr>
             <a:r>
-              <a:rPr lang="en-IN" sz="1600" dirty="0" smtClean="0">
+              <a:rPr lang="en-IN" sz="1600" dirty="0">
                 <a:solidFill>
                   <a:srgbClr val="FF0000"/>
                 </a:solidFill>
@@ -4536,21 +4637,63 @@
               <a:buChar char="•"/>
             </a:pPr>
             <a:r>
-              <a:rPr lang="en-IN" sz="1600" dirty="0" smtClean="0"/>
-              <a:t>Submitted ideas will be archived and people registered with role of innovation evangelist/co-ordinator </a:t>
-            </a:r>
-            <a:r>
               <a:rPr lang="en-IN" sz="1600" dirty="0"/>
-              <a:t>,</a:t>
-            </a:r>
-            <a:r>
-              <a:rPr lang="en-IN" sz="1600" dirty="0" smtClean="0"/>
-              <a:t>can view the submitted ideas for that event.</a:t>
-            </a:r>
+              <a:t>Submitted ideas will be archived and people registered with role of innovation evangelist/co-ordinator ,can view the submitted ideas for that event.</a:t>
+            </a:r>
+          </a:p>
+          <a:p>
+            <a:pPr marL="742950" lvl="1" indent="-285750">
+              <a:buFont typeface="Arial" panose="020B0604020202020204" pitchFamily="34" charset="0"/>
+              <a:buChar char="•"/>
+            </a:pPr>
+            <a:r>
+              <a:rPr lang="en-IN" sz="1600" dirty="0">
+                <a:solidFill>
+                  <a:srgbClr val="00B0F0"/>
+                </a:solidFill>
+              </a:rPr>
+              <a:t>Complete system administration rights of the portal</a:t>
+            </a:r>
+          </a:p>
+          <a:p>
+            <a:pPr marL="742950" lvl="1" indent="-285750">
+              <a:buFont typeface="Arial" panose="020B0604020202020204" pitchFamily="34" charset="0"/>
+              <a:buChar char="•"/>
+            </a:pPr>
+            <a:r>
+              <a:rPr lang="en-IN" sz="1600" dirty="0">
+                <a:solidFill>
+                  <a:srgbClr val="00B0F0"/>
+                </a:solidFill>
+              </a:rPr>
+              <a:t>Provide authorization services to the users based on their role</a:t>
+            </a:r>
+          </a:p>
+          <a:p>
+            <a:pPr marL="742950" lvl="1" indent="-285750">
+              <a:buFont typeface="Arial" panose="020B0604020202020204" pitchFamily="34" charset="0"/>
+              <a:buChar char="•"/>
+            </a:pPr>
+            <a:endParaRPr lang="en-IN" sz="1600" dirty="0">
+              <a:solidFill>
+                <a:srgbClr val="00B0F0"/>
+              </a:solidFill>
+            </a:endParaRPr>
+          </a:p>
+          <a:p>
+            <a:pPr marL="742950" lvl="1" indent="-285750">
+              <a:buFont typeface="Arial" panose="020B0604020202020204" pitchFamily="34" charset="0"/>
+              <a:buChar char="•"/>
+            </a:pPr>
+            <a:endParaRPr lang="en-IN" sz="1600" dirty="0">
+              <a:solidFill>
+                <a:srgbClr val="00B0F0"/>
+              </a:solidFill>
+            </a:endParaRPr>
           </a:p>
           <a:p>
             <a:pPr lvl="1"/>
-            <a:endParaRPr lang="en-IN" sz="1600" dirty="0" smtClean="0"/>
+            <a:endParaRPr lang="en-IN" sz="1600" dirty="0"/>
           </a:p>
           <a:p>
             <a:pPr marL="742950" lvl="1" indent="-285750">

</xml_diff>

<commit_message>
Segregated projects for ideation and hackathon portals
</commit_message>
<xml_diff>
--- a/2.use-cases/Use-cases.pptx
+++ b/2.use-cases/Use-cases.pptx
@@ -246,7 +246,7 @@
           <a:p>
             <a:fld id="{AC90C461-D86D-4896-B3E9-555B9D58EEB6}" type="datetimeFigureOut">
               <a:rPr lang="en-IN" smtClean="0"/>
-              <a:t>06-08-2021</a:t>
+              <a:t>08-08-2021</a:t>
             </a:fld>
             <a:endParaRPr lang="en-IN"/>
           </a:p>
@@ -416,7 +416,7 @@
           <a:p>
             <a:fld id="{AC90C461-D86D-4896-B3E9-555B9D58EEB6}" type="datetimeFigureOut">
               <a:rPr lang="en-IN" smtClean="0"/>
-              <a:t>06-08-2021</a:t>
+              <a:t>08-08-2021</a:t>
             </a:fld>
             <a:endParaRPr lang="en-IN"/>
           </a:p>
@@ -596,7 +596,7 @@
           <a:p>
             <a:fld id="{AC90C461-D86D-4896-B3E9-555B9D58EEB6}" type="datetimeFigureOut">
               <a:rPr lang="en-IN" smtClean="0"/>
-              <a:t>06-08-2021</a:t>
+              <a:t>08-08-2021</a:t>
             </a:fld>
             <a:endParaRPr lang="en-IN"/>
           </a:p>
@@ -766,7 +766,7 @@
           <a:p>
             <a:fld id="{AC90C461-D86D-4896-B3E9-555B9D58EEB6}" type="datetimeFigureOut">
               <a:rPr lang="en-IN" smtClean="0"/>
-              <a:t>06-08-2021</a:t>
+              <a:t>08-08-2021</a:t>
             </a:fld>
             <a:endParaRPr lang="en-IN"/>
           </a:p>
@@ -1012,7 +1012,7 @@
           <a:p>
             <a:fld id="{AC90C461-D86D-4896-B3E9-555B9D58EEB6}" type="datetimeFigureOut">
               <a:rPr lang="en-IN" smtClean="0"/>
-              <a:t>06-08-2021</a:t>
+              <a:t>08-08-2021</a:t>
             </a:fld>
             <a:endParaRPr lang="en-IN"/>
           </a:p>
@@ -1244,7 +1244,7 @@
           <a:p>
             <a:fld id="{AC90C461-D86D-4896-B3E9-555B9D58EEB6}" type="datetimeFigureOut">
               <a:rPr lang="en-IN" smtClean="0"/>
-              <a:t>06-08-2021</a:t>
+              <a:t>08-08-2021</a:t>
             </a:fld>
             <a:endParaRPr lang="en-IN"/>
           </a:p>
@@ -1611,7 +1611,7 @@
           <a:p>
             <a:fld id="{AC90C461-D86D-4896-B3E9-555B9D58EEB6}" type="datetimeFigureOut">
               <a:rPr lang="en-IN" smtClean="0"/>
-              <a:t>06-08-2021</a:t>
+              <a:t>08-08-2021</a:t>
             </a:fld>
             <a:endParaRPr lang="en-IN"/>
           </a:p>
@@ -1729,7 +1729,7 @@
           <a:p>
             <a:fld id="{AC90C461-D86D-4896-B3E9-555B9D58EEB6}" type="datetimeFigureOut">
               <a:rPr lang="en-IN" smtClean="0"/>
-              <a:t>06-08-2021</a:t>
+              <a:t>08-08-2021</a:t>
             </a:fld>
             <a:endParaRPr lang="en-IN"/>
           </a:p>
@@ -1824,7 +1824,7 @@
           <a:p>
             <a:fld id="{AC90C461-D86D-4896-B3E9-555B9D58EEB6}" type="datetimeFigureOut">
               <a:rPr lang="en-IN" smtClean="0"/>
-              <a:t>06-08-2021</a:t>
+              <a:t>08-08-2021</a:t>
             </a:fld>
             <a:endParaRPr lang="en-IN"/>
           </a:p>
@@ -2101,7 +2101,7 @@
           <a:p>
             <a:fld id="{AC90C461-D86D-4896-B3E9-555B9D58EEB6}" type="datetimeFigureOut">
               <a:rPr lang="en-IN" smtClean="0"/>
-              <a:t>06-08-2021</a:t>
+              <a:t>08-08-2021</a:t>
             </a:fld>
             <a:endParaRPr lang="en-IN"/>
           </a:p>
@@ -2354,7 +2354,7 @@
           <a:p>
             <a:fld id="{AC90C461-D86D-4896-B3E9-555B9D58EEB6}" type="datetimeFigureOut">
               <a:rPr lang="en-IN" smtClean="0"/>
-              <a:t>06-08-2021</a:t>
+              <a:t>08-08-2021</a:t>
             </a:fld>
             <a:endParaRPr lang="en-IN"/>
           </a:p>
@@ -2567,7 +2567,7 @@
           <a:p>
             <a:fld id="{AC90C461-D86D-4896-B3E9-555B9D58EEB6}" type="datetimeFigureOut">
               <a:rPr lang="en-IN" smtClean="0"/>
-              <a:t>06-08-2021</a:t>
+              <a:t>08-08-2021</a:t>
             </a:fld>
             <a:endParaRPr lang="en-IN"/>
           </a:p>
@@ -3010,7 +3010,7 @@
         <p:spPr>
           <a:xfrm>
             <a:off x="752560" y="816409"/>
-            <a:ext cx="10115043" cy="2393540"/>
+            <a:ext cx="10115043" cy="1738617"/>
           </a:xfrm>
           <a:prstGeom prst="rect">
             <a:avLst/>
@@ -3033,7 +3033,7 @@
               <a:buChar char=""/>
             </a:pPr>
             <a:r>
-              <a:rPr lang="en-IN" sz="1600" b="1" dirty="0">
+              <a:rPr lang="en-IN" sz="1100" b="1" dirty="0">
                 <a:latin typeface="Calibri" panose="020F0502020204030204" pitchFamily="34" charset="0"/>
                 <a:ea typeface="Calibri" panose="020F0502020204030204" pitchFamily="34" charset="0"/>
                 <a:cs typeface="Times New Roman" panose="02020603050405020304" pitchFamily="18" charset="0"/>
@@ -3041,7 +3041,7 @@
               <a:t>“Idea Genie”</a:t>
             </a:r>
             <a:r>
-              <a:rPr lang="en-IN" sz="1600" dirty="0">
+              <a:rPr lang="en-IN" sz="1100" dirty="0">
                 <a:latin typeface="Calibri" panose="020F0502020204030204" pitchFamily="34" charset="0"/>
                 <a:ea typeface="Calibri" panose="020F0502020204030204" pitchFamily="34" charset="0"/>
                 <a:cs typeface="Times New Roman" panose="02020603050405020304" pitchFamily="18" charset="0"/>
@@ -3058,7 +3058,7 @@
                 <a:spcPts val="0"/>
               </a:spcAft>
             </a:pPr>
-            <a:endParaRPr lang="en-IN" sz="1600" dirty="0">
+            <a:endParaRPr lang="en-IN" sz="1100" dirty="0">
               <a:latin typeface="Calibri" panose="020F0502020204030204" pitchFamily="34" charset="0"/>
               <a:ea typeface="Calibri" panose="020F0502020204030204" pitchFamily="34" charset="0"/>
               <a:cs typeface="Times New Roman" panose="02020603050405020304" pitchFamily="18" charset="0"/>
@@ -3074,7 +3074,7 @@
               </a:spcAft>
             </a:pPr>
             <a:r>
-              <a:rPr lang="en-IN" sz="1600" b="1" dirty="0">
+              <a:rPr lang="en-IN" sz="1100" b="1" dirty="0">
                 <a:latin typeface="Calibri" panose="020F0502020204030204" pitchFamily="34" charset="0"/>
                 <a:ea typeface="Calibri" panose="020F0502020204030204" pitchFamily="34" charset="0"/>
                 <a:cs typeface="Times New Roman" panose="02020603050405020304" pitchFamily="18" charset="0"/>
@@ -3082,7 +3082,7 @@
               <a:t>            </a:t>
             </a:r>
             <a:r>
-              <a:rPr lang="en-IN" sz="1600" b="1" u="sng" dirty="0">
+              <a:rPr lang="en-IN" sz="1100" b="1" u="sng" dirty="0">
                 <a:latin typeface="Calibri" panose="020F0502020204030204" pitchFamily="34" charset="0"/>
                 <a:ea typeface="Calibri" panose="020F0502020204030204" pitchFamily="34" charset="0"/>
                 <a:cs typeface="Times New Roman" panose="02020603050405020304" pitchFamily="18" charset="0"/>
@@ -3099,7 +3099,7 @@
               <a:buAutoNum type="arabicPeriod"/>
             </a:pPr>
             <a:r>
-              <a:rPr lang="en-IN" sz="1600" dirty="0">
+              <a:rPr lang="en-IN" sz="1100" dirty="0">
                 <a:latin typeface="Calibri" panose="020F0502020204030204" pitchFamily="34" charset="0"/>
                 <a:ea typeface="Calibri" panose="020F0502020204030204" pitchFamily="34" charset="0"/>
                 <a:cs typeface="Times New Roman" panose="02020603050405020304" pitchFamily="18" charset="0"/>
@@ -3116,7 +3116,7 @@
               <a:buAutoNum type="arabicPeriod"/>
             </a:pPr>
             <a:r>
-              <a:rPr lang="en-IN" sz="1600" dirty="0">
+              <a:rPr lang="en-IN" sz="1100" dirty="0">
                 <a:latin typeface="Calibri" panose="020F0502020204030204" pitchFamily="34" charset="0"/>
                 <a:ea typeface="Calibri" panose="020F0502020204030204" pitchFamily="34" charset="0"/>
                 <a:cs typeface="Times New Roman" panose="02020603050405020304" pitchFamily="18" charset="0"/>
@@ -3124,7 +3124,7 @@
               <a:t>Registering P.I.s/</a:t>
             </a:r>
             <a:r>
-              <a:rPr lang="en-IN" sz="1600" dirty="0" err="1">
+              <a:rPr lang="en-IN" sz="1100" dirty="0" err="1">
                 <a:latin typeface="Calibri" panose="020F0502020204030204" pitchFamily="34" charset="0"/>
                 <a:ea typeface="Calibri" panose="020F0502020204030204" pitchFamily="34" charset="0"/>
                 <a:cs typeface="Times New Roman" panose="02020603050405020304" pitchFamily="18" charset="0"/>
@@ -3132,7 +3132,7 @@
               <a:t>P.o.V</a:t>
             </a:r>
             <a:r>
-              <a:rPr lang="en-IN" sz="1600" dirty="0">
+              <a:rPr lang="en-IN" sz="1100" dirty="0">
                 <a:latin typeface="Calibri" panose="020F0502020204030204" pitchFamily="34" charset="0"/>
                 <a:ea typeface="Calibri" panose="020F0502020204030204" pitchFamily="34" charset="0"/>
                 <a:cs typeface="Times New Roman" panose="02020603050405020304" pitchFamily="18" charset="0"/>
@@ -3140,7 +3140,7 @@
               <a:t>/</a:t>
             </a:r>
             <a:r>
-              <a:rPr lang="en-IN" sz="1600" dirty="0" err="1">
+              <a:rPr lang="en-IN" sz="1100" dirty="0" err="1">
                 <a:latin typeface="Calibri" panose="020F0502020204030204" pitchFamily="34" charset="0"/>
                 <a:ea typeface="Calibri" panose="020F0502020204030204" pitchFamily="34" charset="0"/>
                 <a:cs typeface="Times New Roman" panose="02020603050405020304" pitchFamily="18" charset="0"/>
@@ -3148,7 +3148,7 @@
               <a:t>P.o.C</a:t>
             </a:r>
             <a:r>
-              <a:rPr lang="en-IN" sz="1600" dirty="0">
+              <a:rPr lang="en-IN" sz="1100" dirty="0">
                 <a:latin typeface="Calibri" panose="020F0502020204030204" pitchFamily="34" charset="0"/>
                 <a:ea typeface="Calibri" panose="020F0502020204030204" pitchFamily="34" charset="0"/>
                 <a:cs typeface="Times New Roman" panose="02020603050405020304" pitchFamily="18" charset="0"/>
@@ -3156,7 +3156,7 @@
               <a:t> from Projects/</a:t>
             </a:r>
             <a:r>
-              <a:rPr lang="en-IN" sz="1600" dirty="0" err="1">
+              <a:rPr lang="en-IN" sz="1100" dirty="0" err="1">
                 <a:latin typeface="Calibri" panose="020F0502020204030204" pitchFamily="34" charset="0"/>
                 <a:ea typeface="Calibri" panose="020F0502020204030204" pitchFamily="34" charset="0"/>
                 <a:cs typeface="Times New Roman" panose="02020603050405020304" pitchFamily="18" charset="0"/>
@@ -3164,7 +3164,7 @@
               <a:t>Hackathon</a:t>
             </a:r>
             <a:r>
-              <a:rPr lang="en-IN" sz="1600" dirty="0">
+              <a:rPr lang="en-IN" sz="1100" dirty="0">
                 <a:latin typeface="Calibri" panose="020F0502020204030204" pitchFamily="34" charset="0"/>
                 <a:ea typeface="Calibri" panose="020F0502020204030204" pitchFamily="34" charset="0"/>
                 <a:cs typeface="Times New Roman" panose="02020603050405020304" pitchFamily="18" charset="0"/>
@@ -3184,7 +3184,7 @@
               <a:buAutoNum type="arabicPeriod"/>
             </a:pPr>
             <a:r>
-              <a:rPr lang="en-IN" sz="1600" dirty="0" err="1">
+              <a:rPr lang="en-IN" sz="1100" dirty="0" err="1">
                 <a:latin typeface="Calibri" panose="020F0502020204030204" pitchFamily="34" charset="0"/>
                 <a:ea typeface="Calibri" panose="020F0502020204030204" pitchFamily="34" charset="0"/>
                 <a:cs typeface="Times New Roman" panose="02020603050405020304" pitchFamily="18" charset="0"/>
@@ -3192,7 +3192,7 @@
               <a:t>Ideathon</a:t>
             </a:r>
             <a:r>
-              <a:rPr lang="en-IN" sz="1600" dirty="0">
+              <a:rPr lang="en-IN" sz="1100" dirty="0">
                 <a:latin typeface="Calibri" panose="020F0502020204030204" pitchFamily="34" charset="0"/>
                 <a:ea typeface="Calibri" panose="020F0502020204030204" pitchFamily="34" charset="0"/>
                 <a:cs typeface="Times New Roman" panose="02020603050405020304" pitchFamily="18" charset="0"/>
@@ -3200,7 +3200,7 @@
               <a:t>/</a:t>
             </a:r>
             <a:r>
-              <a:rPr lang="en-IN" sz="1600" dirty="0" err="1">
+              <a:rPr lang="en-IN" sz="1100" dirty="0" err="1">
                 <a:latin typeface="Calibri" panose="020F0502020204030204" pitchFamily="34" charset="0"/>
                 <a:ea typeface="Calibri" panose="020F0502020204030204" pitchFamily="34" charset="0"/>
                 <a:cs typeface="Times New Roman" panose="02020603050405020304" pitchFamily="18" charset="0"/>
@@ -3208,7 +3208,7 @@
               <a:t>Hackathon</a:t>
             </a:r>
             <a:r>
-              <a:rPr lang="en-IN" sz="1600" dirty="0">
+              <a:rPr lang="en-IN" sz="1100" dirty="0">
                 <a:latin typeface="Calibri" panose="020F0502020204030204" pitchFamily="34" charset="0"/>
                 <a:ea typeface="Calibri" panose="020F0502020204030204" pitchFamily="34" charset="0"/>
                 <a:cs typeface="Times New Roman" panose="02020603050405020304" pitchFamily="18" charset="0"/>
@@ -3227,7 +3227,7 @@
               <a:buFont typeface="+mj-lt"/>
               <a:buAutoNum type="arabicPeriod"/>
             </a:pPr>
-            <a:endParaRPr lang="en-IN" sz="1600" dirty="0">
+            <a:endParaRPr lang="en-IN" sz="1100" dirty="0">
               <a:effectLst/>
               <a:latin typeface="Calibri" panose="020F0502020204030204" pitchFamily="34" charset="0"/>
               <a:ea typeface="Calibri" panose="020F0502020204030204" pitchFamily="34" charset="0"/>
@@ -3243,7 +3243,7 @@
                 <a:spcPts val="800"/>
               </a:spcAft>
             </a:pPr>
-            <a:endParaRPr lang="en-IN" sz="1600" dirty="0">
+            <a:endParaRPr lang="en-IN" sz="1100" dirty="0">
               <a:effectLst/>
               <a:latin typeface="Calibri" panose="020F0502020204030204" pitchFamily="34" charset="0"/>
               <a:ea typeface="Calibri" panose="020F0502020204030204" pitchFamily="34" charset="0"/>
@@ -3260,8 +3260,8 @@
         </p:nvSpPr>
         <p:spPr>
           <a:xfrm>
-            <a:off x="305750" y="2631638"/>
-            <a:ext cx="12721944" cy="7540526"/>
+            <a:off x="329296" y="2166126"/>
+            <a:ext cx="7833801" cy="4570482"/>
           </a:xfrm>
           <a:prstGeom prst="rect">
             <a:avLst/>
@@ -3269,40 +3269,40 @@
           <a:noFill/>
         </p:spPr>
         <p:txBody>
-          <a:bodyPr wrap="none" rtlCol="0">
+          <a:bodyPr wrap="square" rtlCol="0">
             <a:spAutoFit/>
           </a:bodyPr>
           <a:lstStyle/>
           <a:p>
             <a:r>
-              <a:rPr lang="en-IN" u="sng" dirty="0"/>
+              <a:rPr lang="en-IN" sz="1050" u="sng" dirty="0"/>
               <a:t>Functional scope for product:</a:t>
             </a:r>
           </a:p>
           <a:p>
-            <a:endParaRPr lang="en-IN" u="sng" dirty="0"/>
-          </a:p>
-          <a:p>
-            <a:pPr marL="742950" lvl="1" indent="-285750">
-              <a:buFont typeface="Arial" panose="020B0604020202020204" pitchFamily="34" charset="0"/>
-              <a:buChar char="•"/>
-            </a:pPr>
-            <a:r>
-              <a:rPr lang="en-IN" sz="1600" dirty="0"/>
+            <a:endParaRPr lang="en-IN" sz="1050" u="sng" dirty="0"/>
+          </a:p>
+          <a:p>
+            <a:pPr marL="742950" lvl="1" indent="-285750">
+              <a:buFont typeface="+mj-lt"/>
+              <a:buAutoNum type="arabicPeriod"/>
+            </a:pPr>
+            <a:r>
+              <a:rPr lang="en-IN" sz="1000" dirty="0"/>
               <a:t>Registration facility for user</a:t>
             </a:r>
           </a:p>
           <a:p>
             <a:pPr marL="742950" lvl="1" indent="-285750">
-              <a:buFont typeface="Arial" panose="020B0604020202020204" pitchFamily="34" charset="0"/>
-              <a:buChar char="•"/>
-            </a:pPr>
-            <a:r>
-              <a:rPr lang="en-IN" sz="1600" dirty="0"/>
+              <a:buFont typeface="+mj-lt"/>
+              <a:buAutoNum type="arabicPeriod"/>
+            </a:pPr>
+            <a:r>
+              <a:rPr lang="en-IN" sz="1000" dirty="0"/>
               <a:t>Authentication &amp; </a:t>
             </a:r>
             <a:r>
-              <a:rPr lang="en-IN" sz="1600" dirty="0">
+              <a:rPr lang="en-IN" sz="1000" dirty="0">
                 <a:solidFill>
                   <a:srgbClr val="FF0000"/>
                 </a:solidFill>
@@ -3310,11 +3310,11 @@
               <a:t>Role based access</a:t>
             </a:r>
             <a:r>
-              <a:rPr lang="en-IN" sz="1600" dirty="0"/>
+              <a:rPr lang="en-IN" sz="1000" dirty="0"/>
               <a:t>.</a:t>
             </a:r>
             <a:r>
-              <a:rPr lang="en-IN" sz="1600" dirty="0">
+              <a:rPr lang="en-IN" sz="1000" dirty="0">
                 <a:solidFill>
                   <a:srgbClr val="92D050"/>
                 </a:solidFill>
@@ -3322,15 +3322,15 @@
               </a:rPr>
               <a:t> (Page created for ideation)</a:t>
             </a:r>
-            <a:endParaRPr lang="en-IN" sz="1600" dirty="0"/>
-          </a:p>
-          <a:p>
-            <a:pPr marL="742950" lvl="1" indent="-285750">
-              <a:buFont typeface="Arial" panose="020B0604020202020204" pitchFamily="34" charset="0"/>
-              <a:buChar char="•"/>
-            </a:pPr>
-            <a:r>
-              <a:rPr lang="en-IN" sz="1600" dirty="0">
+            <a:endParaRPr lang="en-IN" sz="1000" dirty="0"/>
+          </a:p>
+          <a:p>
+            <a:pPr marL="742950" lvl="1" indent="-285750">
+              <a:buFont typeface="+mj-lt"/>
+              <a:buAutoNum type="arabicPeriod"/>
+            </a:pPr>
+            <a:r>
+              <a:rPr lang="en-IN" sz="1000" dirty="0">
                 <a:solidFill>
                   <a:srgbClr val="FF0000"/>
                 </a:solidFill>
@@ -3338,7 +3338,7 @@
               <a:t>Users to be categorised in an organisational context &amp; Hackathon point of view .</a:t>
             </a:r>
             <a:r>
-              <a:rPr lang="en-IN" sz="1600" dirty="0">
+              <a:rPr lang="en-IN" sz="1000" dirty="0">
                 <a:solidFill>
                   <a:srgbClr val="92D050"/>
                 </a:solidFill>
@@ -3346,7 +3346,7 @@
               </a:rPr>
               <a:t> (Page created for ideation)</a:t>
             </a:r>
-            <a:endParaRPr lang="en-IN" sz="1600" dirty="0">
+            <a:endParaRPr lang="en-IN" sz="1000" dirty="0">
               <a:solidFill>
                 <a:srgbClr val="FF0000"/>
               </a:solidFill>
@@ -3354,11 +3354,11 @@
           </a:p>
           <a:p>
             <a:pPr marL="742950" lvl="1" indent="-285750">
-              <a:buFont typeface="Arial" panose="020B0604020202020204" pitchFamily="34" charset="0"/>
-              <a:buChar char="•"/>
-            </a:pPr>
-            <a:r>
-              <a:rPr lang="en-IN" sz="1600" dirty="0">
+              <a:buFont typeface="+mj-lt"/>
+              <a:buAutoNum type="arabicPeriod"/>
+            </a:pPr>
+            <a:r>
+              <a:rPr lang="en-IN" sz="1000" dirty="0">
                 <a:solidFill>
                   <a:srgbClr val="FF0000"/>
                 </a:solidFill>
@@ -3366,7 +3366,7 @@
               <a:t>Tool should intake ideas ,link categorise and classify them appropriately .</a:t>
             </a:r>
             <a:r>
-              <a:rPr lang="en-IN" sz="1600" dirty="0">
+              <a:rPr lang="en-IN" sz="1000" dirty="0">
                 <a:solidFill>
                   <a:srgbClr val="92D050"/>
                 </a:solidFill>
@@ -3374,7 +3374,7 @@
               </a:rPr>
               <a:t>(Page created for ideation)</a:t>
             </a:r>
-            <a:endParaRPr lang="en-IN" sz="1600" dirty="0">
+            <a:endParaRPr lang="en-IN" sz="1000" dirty="0">
               <a:solidFill>
                 <a:srgbClr val="92D050"/>
               </a:solidFill>
@@ -3382,15 +3382,15 @@
           </a:p>
           <a:p>
             <a:pPr marL="742950" lvl="1" indent="-285750">
-              <a:buFont typeface="Arial" panose="020B0604020202020204" pitchFamily="34" charset="0"/>
-              <a:buChar char="•"/>
-            </a:pPr>
-            <a:r>
-              <a:rPr lang="en-IN" sz="1600" dirty="0"/>
+              <a:buFont typeface="+mj-lt"/>
+              <a:buAutoNum type="arabicPeriod"/>
+            </a:pPr>
+            <a:r>
+              <a:rPr lang="en-IN" sz="1000" dirty="0"/>
               <a:t>Tool should assign and idea to an innovation evangelist of that </a:t>
             </a:r>
             <a:r>
-              <a:rPr lang="en-IN" sz="1600" b="1" dirty="0">
+              <a:rPr lang="en-IN" sz="1000" b="1" dirty="0">
                 <a:solidFill>
                   <a:srgbClr val="FF0000"/>
                 </a:solidFill>
@@ -3398,7 +3398,7 @@
               <a:t>domain </a:t>
             </a:r>
             <a:r>
-              <a:rPr lang="en-IN" sz="1600" dirty="0">
+              <a:rPr lang="en-IN" sz="1000" dirty="0">
                 <a:solidFill>
                   <a:srgbClr val="FF0000"/>
                 </a:solidFill>
@@ -3406,7 +3406,7 @@
               <a:t>for evaluation. </a:t>
             </a:r>
             <a:r>
-              <a:rPr lang="en-IN" sz="1600" dirty="0">
+              <a:rPr lang="en-IN" sz="1000" dirty="0">
                 <a:solidFill>
                   <a:srgbClr val="92D050"/>
                 </a:solidFill>
@@ -3414,7 +3414,7 @@
               </a:rPr>
               <a:t>(Page created for ideation)</a:t>
             </a:r>
-            <a:endParaRPr lang="en-IN" sz="1600" dirty="0">
+            <a:endParaRPr lang="en-IN" sz="1000" dirty="0">
               <a:solidFill>
                 <a:srgbClr val="FF0000"/>
               </a:solidFill>
@@ -3422,25 +3422,25 @@
           </a:p>
           <a:p>
             <a:pPr marL="742950" lvl="1" indent="-285750">
-              <a:buFont typeface="Arial" panose="020B0604020202020204" pitchFamily="34" charset="0"/>
-              <a:buChar char="•"/>
-            </a:pPr>
-            <a:r>
-              <a:rPr lang="en-IN" sz="1600" dirty="0"/>
+              <a:buFont typeface="+mj-lt"/>
+              <a:buAutoNum type="arabicPeriod"/>
+            </a:pPr>
+            <a:r>
+              <a:rPr lang="en-IN" sz="1000" dirty="0"/>
               <a:t>Tool should inform the user about status on approval and with whom it’s pending .</a:t>
             </a:r>
           </a:p>
           <a:p>
             <a:pPr marL="742950" lvl="1" indent="-285750">
-              <a:buFont typeface="Arial" panose="020B0604020202020204" pitchFamily="34" charset="0"/>
-              <a:buChar char="•"/>
-            </a:pPr>
-            <a:r>
-              <a:rPr lang="en-IN" sz="1600" dirty="0"/>
+              <a:buFont typeface="+mj-lt"/>
+              <a:buAutoNum type="arabicPeriod"/>
+            </a:pPr>
+            <a:r>
+              <a:rPr lang="en-IN" sz="1000" dirty="0"/>
               <a:t>Send </a:t>
             </a:r>
             <a:r>
-              <a:rPr lang="en-IN" sz="1600" dirty="0">
+              <a:rPr lang="en-IN" sz="1000" dirty="0">
                 <a:solidFill>
                   <a:srgbClr val="FF0000"/>
                 </a:solidFill>
@@ -3448,118 +3448,132 @@
               <a:t>alerts or notifications to users about assignment / feedback </a:t>
             </a:r>
             <a:r>
-              <a:rPr lang="en-IN" sz="1600" dirty="0"/>
+              <a:rPr lang="en-IN" sz="1000" dirty="0" smtClean="0"/>
+              <a:t>. </a:t>
+            </a:r>
+            <a:r>
+              <a:rPr lang="en-IN" sz="1000" dirty="0" smtClean="0">
+                <a:solidFill>
+                  <a:srgbClr val="92D050"/>
+                </a:solidFill>
+                <a:sym typeface="Wingdings" panose="05000000000000000000" pitchFamily="2" charset="2"/>
+              </a:rPr>
+              <a:t> (Page created for ideation)</a:t>
+            </a:r>
+            <a:endParaRPr lang="en-IN" sz="1000" dirty="0">
+              <a:solidFill>
+                <a:srgbClr val="92D050"/>
+              </a:solidFill>
+            </a:endParaRPr>
+          </a:p>
+          <a:p>
+            <a:pPr marL="742950" lvl="1" indent="-285750">
+              <a:buFont typeface="+mj-lt"/>
+              <a:buAutoNum type="arabicPeriod"/>
+            </a:pPr>
+            <a:r>
+              <a:rPr lang="en-IN" sz="1000" dirty="0" smtClean="0">
+                <a:solidFill>
+                  <a:srgbClr val="00B0F0"/>
+                </a:solidFill>
+              </a:rPr>
+              <a:t>Tool </a:t>
+            </a:r>
+            <a:r>
+              <a:rPr lang="en-IN" sz="1000" dirty="0">
+                <a:solidFill>
+                  <a:srgbClr val="00B0F0"/>
+                </a:solidFill>
+              </a:rPr>
+              <a:t>Should list the most common domains/tools/technologies and if not in the </a:t>
+            </a:r>
+            <a:r>
+              <a:rPr lang="en-IN" sz="1000" dirty="0" smtClean="0">
+                <a:solidFill>
+                  <a:srgbClr val="00B0F0"/>
+                </a:solidFill>
+              </a:rPr>
+              <a:t>list, </a:t>
+            </a:r>
+            <a:r>
+              <a:rPr lang="en-IN" sz="1000" dirty="0" smtClean="0">
+                <a:solidFill>
+                  <a:srgbClr val="FF0000"/>
+                </a:solidFill>
+              </a:rPr>
+              <a:t>user </a:t>
+            </a:r>
+            <a:r>
+              <a:rPr lang="en-IN" sz="1000" dirty="0">
+                <a:solidFill>
+                  <a:srgbClr val="FF0000"/>
+                </a:solidFill>
+              </a:rPr>
+              <a:t>will provide and that should be added back to the </a:t>
+            </a:r>
+            <a:r>
+              <a:rPr lang="en-IN" sz="1000" dirty="0" smtClean="0">
+                <a:solidFill>
+                  <a:srgbClr val="FF0000"/>
+                </a:solidFill>
+              </a:rPr>
+              <a:t>list </a:t>
+            </a:r>
+            <a:r>
+              <a:rPr lang="en-IN" sz="1000" dirty="0" smtClean="0">
+                <a:solidFill>
+                  <a:srgbClr val="FF0000"/>
+                </a:solidFill>
+                <a:sym typeface="Wingdings" panose="05000000000000000000" pitchFamily="2" charset="2"/>
+              </a:rPr>
+              <a:t> Linked to point 4 to be ideated in respective sheet.</a:t>
+            </a:r>
+            <a:endParaRPr lang="en-IN" sz="1000" dirty="0">
+              <a:solidFill>
+                <a:srgbClr val="FF0000"/>
+              </a:solidFill>
+            </a:endParaRPr>
+          </a:p>
+          <a:p>
+            <a:pPr marL="742950" lvl="1" indent="-285750">
+              <a:buFont typeface="+mj-lt"/>
+              <a:buAutoNum type="arabicPeriod"/>
+            </a:pPr>
+            <a:r>
+              <a:rPr lang="en-IN" sz="1000" dirty="0">
+                <a:solidFill>
+                  <a:srgbClr val="00B0F0"/>
+                </a:solidFill>
+              </a:rPr>
+              <a:t>Allows the users to choose domain, tools and technologies for the idea by </a:t>
+            </a:r>
+            <a:r>
+              <a:rPr lang="en-IN" sz="1000" dirty="0" smtClean="0">
+                <a:solidFill>
+                  <a:srgbClr val="00B0F0"/>
+                </a:solidFill>
+              </a:rPr>
+              <a:t>themselves </a:t>
+            </a:r>
+            <a:r>
+              <a:rPr lang="en-IN" sz="1000" dirty="0">
+                <a:solidFill>
+                  <a:srgbClr val="FF0000"/>
+                </a:solidFill>
+                <a:sym typeface="Wingdings" panose="05000000000000000000" pitchFamily="2" charset="2"/>
+              </a:rPr>
+              <a:t> Linked to point 4 to be ideated in respective sheet</a:t>
+            </a:r>
+            <a:r>
+              <a:rPr lang="en-IN" sz="1000" dirty="0" smtClean="0">
+                <a:solidFill>
+                  <a:srgbClr val="FF0000"/>
+                </a:solidFill>
+                <a:sym typeface="Wingdings" panose="05000000000000000000" pitchFamily="2" charset="2"/>
+              </a:rPr>
               <a:t>.</a:t>
             </a:r>
-          </a:p>
-          <a:p>
-            <a:pPr marL="742950" lvl="1" indent="-285750">
-              <a:buFont typeface="Arial" panose="020B0604020202020204" pitchFamily="34" charset="0"/>
-              <a:buChar char="•"/>
-            </a:pPr>
-            <a:r>
-              <a:rPr lang="en-IN" sz="1600" strike="sngStrike" dirty="0"/>
-              <a:t>For an approved idea , Team formation facility from the tool using the available registered users. </a:t>
-            </a:r>
-            <a:r>
-              <a:rPr lang="en-IN" sz="1600" strike="sngStrike" dirty="0">
-                <a:sym typeface="Wingdings" panose="05000000000000000000" pitchFamily="2" charset="2"/>
-              </a:rPr>
-              <a:t> Extended MVP</a:t>
-            </a:r>
-          </a:p>
-          <a:p>
-            <a:pPr marL="742950" lvl="1" indent="-285750">
-              <a:buFont typeface="Arial" panose="020B0604020202020204" pitchFamily="34" charset="0"/>
-              <a:buChar char="•"/>
-            </a:pPr>
-            <a:r>
-              <a:rPr lang="en-IN" sz="1600" dirty="0">
-                <a:solidFill>
-                  <a:srgbClr val="00B0F0"/>
-                </a:solidFill>
-              </a:rPr>
-              <a:t>Tool Should list the most common domains/tools/technologies and if not in the list, user will provide and that should be added back to the list</a:t>
-            </a:r>
-          </a:p>
-          <a:p>
-            <a:pPr marL="742950" lvl="1" indent="-285750">
-              <a:buFont typeface="Arial" panose="020B0604020202020204" pitchFamily="34" charset="0"/>
-              <a:buChar char="•"/>
-            </a:pPr>
-            <a:r>
-              <a:rPr lang="en-IN" sz="1600" dirty="0">
-                <a:solidFill>
-                  <a:srgbClr val="00B0F0"/>
-                </a:solidFill>
-              </a:rPr>
-              <a:t>Allows the users to choose domain, tools and technologies for the idea by themselves</a:t>
-            </a:r>
-          </a:p>
-          <a:p>
-            <a:pPr marL="742950" lvl="1" indent="-285750">
-              <a:buFont typeface="Arial" panose="020B0604020202020204" pitchFamily="34" charset="0"/>
-              <a:buChar char="•"/>
-            </a:pPr>
-            <a:r>
-              <a:rPr lang="en-IN" sz="1600" dirty="0">
-                <a:solidFill>
-                  <a:srgbClr val="00B0F0"/>
-                </a:solidFill>
-              </a:rPr>
-              <a:t>User should be allowed to define brief goal/purpose/functionality/outcome of the idea</a:t>
-            </a:r>
-          </a:p>
-          <a:p>
-            <a:pPr marL="742950" lvl="1" indent="-285750">
-              <a:buFont typeface="Arial" panose="020B0604020202020204" pitchFamily="34" charset="0"/>
-              <a:buChar char="•"/>
-            </a:pPr>
-            <a:r>
-              <a:rPr lang="en-IN" sz="1600" dirty="0">
-                <a:solidFill>
-                  <a:srgbClr val="00B0F0"/>
-                </a:solidFill>
-              </a:rPr>
-              <a:t>Allows users to like/promote/vote or shows interests in other ideas</a:t>
-            </a:r>
-          </a:p>
-          <a:p>
-            <a:pPr marL="742950" lvl="1" indent="-285750">
-              <a:buFont typeface="Arial" panose="020B0604020202020204" pitchFamily="34" charset="0"/>
-              <a:buChar char="•"/>
-            </a:pPr>
-            <a:r>
-              <a:rPr lang="en-IN" sz="1600" dirty="0">
-                <a:solidFill>
-                  <a:srgbClr val="00B0F0"/>
-                </a:solidFill>
-              </a:rPr>
-              <a:t>Export an single idea to a pdf if possible share as pdf option</a:t>
-            </a:r>
-          </a:p>
-          <a:p>
-            <a:pPr marL="742950" lvl="1" indent="-285750">
-              <a:buFont typeface="Arial" panose="020B0604020202020204" pitchFamily="34" charset="0"/>
-              <a:buChar char="•"/>
-            </a:pPr>
-            <a:r>
-              <a:rPr lang="en-IN" sz="1600" dirty="0">
-                <a:solidFill>
-                  <a:srgbClr val="00B0F0"/>
-                </a:solidFill>
-              </a:rPr>
-              <a:t>Import/Export all ideas to </a:t>
-            </a:r>
-            <a:r>
-              <a:rPr lang="en-IN" sz="1600" dirty="0" err="1">
-                <a:solidFill>
-                  <a:srgbClr val="00B0F0"/>
-                </a:solidFill>
-              </a:rPr>
-              <a:t>xls</a:t>
-            </a:r>
-            <a:endParaRPr lang="en-IN" sz="1600" dirty="0">
+            <a:endParaRPr lang="en-IN" sz="1000" dirty="0">
               <a:solidFill>
                 <a:srgbClr val="00B0F0"/>
               </a:solidFill>
@@ -3567,40 +3581,138 @@
           </a:p>
           <a:p>
             <a:pPr marL="742950" lvl="1" indent="-285750">
-              <a:buFont typeface="Arial" panose="020B0604020202020204" pitchFamily="34" charset="0"/>
-              <a:buChar char="•"/>
-            </a:pPr>
-            <a:r>
-              <a:rPr lang="en-IN" sz="1600" dirty="0">
+              <a:buFont typeface="+mj-lt"/>
+              <a:buAutoNum type="arabicPeriod"/>
+            </a:pPr>
+            <a:r>
+              <a:rPr lang="en-IN" sz="1000" dirty="0">
                 <a:solidFill>
                   <a:srgbClr val="00B0F0"/>
                 </a:solidFill>
               </a:rPr>
-              <a:t>Should support bulk uploads</a:t>
-            </a:r>
-          </a:p>
-          <a:p>
-            <a:pPr lvl="1"/>
-            <a:endParaRPr lang="en-IN" sz="1600" dirty="0">
+              <a:t>User should be allowed to define brief goal/purpose/functionality/outcome of the </a:t>
+            </a:r>
+            <a:r>
+              <a:rPr lang="en-IN" sz="1000" dirty="0" smtClean="0">
+                <a:solidFill>
+                  <a:srgbClr val="00B0F0"/>
+                </a:solidFill>
+              </a:rPr>
+              <a:t>idea </a:t>
+            </a:r>
+            <a:r>
+              <a:rPr lang="en-IN" sz="1000" dirty="0">
+                <a:solidFill>
+                  <a:srgbClr val="FF0000"/>
+                </a:solidFill>
+                <a:sym typeface="Wingdings" panose="05000000000000000000" pitchFamily="2" charset="2"/>
+              </a:rPr>
+              <a:t> Linked to point 4 to be ideated in respective sheet</a:t>
+            </a:r>
+            <a:r>
+              <a:rPr lang="en-IN" sz="1000" dirty="0" smtClean="0">
+                <a:solidFill>
+                  <a:srgbClr val="FF0000"/>
+                </a:solidFill>
+                <a:sym typeface="Wingdings" panose="05000000000000000000" pitchFamily="2" charset="2"/>
+              </a:rPr>
+              <a:t>.</a:t>
+            </a:r>
+            <a:endParaRPr lang="en-IN" sz="1000" dirty="0">
               <a:solidFill>
                 <a:srgbClr val="00B0F0"/>
               </a:solidFill>
             </a:endParaRPr>
           </a:p>
           <a:p>
+            <a:pPr marL="742950" lvl="1" indent="-285750">
+              <a:buFont typeface="+mj-lt"/>
+              <a:buAutoNum type="arabicPeriod"/>
+            </a:pPr>
+            <a:r>
+              <a:rPr lang="en-IN" sz="1000" dirty="0">
+                <a:solidFill>
+                  <a:srgbClr val="00B0F0"/>
+                </a:solidFill>
+              </a:rPr>
+              <a:t>Allows users to like/promote/vote or shows interests in other </a:t>
+            </a:r>
+            <a:r>
+              <a:rPr lang="en-IN" sz="1000" dirty="0" smtClean="0">
+                <a:solidFill>
+                  <a:srgbClr val="00B0F0"/>
+                </a:solidFill>
+              </a:rPr>
+              <a:t>ideas (</a:t>
+            </a:r>
+            <a:r>
+              <a:rPr lang="en-IN" sz="1000" dirty="0" smtClean="0">
+                <a:solidFill>
+                  <a:srgbClr val="92D050"/>
+                </a:solidFill>
+                <a:sym typeface="Wingdings" panose="05000000000000000000" pitchFamily="2" charset="2"/>
+              </a:rPr>
+              <a:t> page created for ideation)</a:t>
+            </a:r>
+            <a:endParaRPr lang="en-IN" sz="1000" dirty="0">
+              <a:solidFill>
+                <a:srgbClr val="92D050"/>
+              </a:solidFill>
+            </a:endParaRPr>
+          </a:p>
+          <a:p>
             <a:pPr lvl="1"/>
-            <a:r>
-              <a:rPr lang="en-IN" sz="1600" u="sng" dirty="0">
+            <a:endParaRPr lang="en-IN" sz="1000" dirty="0">
+              <a:solidFill>
+                <a:srgbClr val="00B0F0"/>
+              </a:solidFill>
+            </a:endParaRPr>
+          </a:p>
+          <a:p>
+            <a:pPr lvl="1"/>
+            <a:r>
+              <a:rPr lang="en-IN" sz="1000" u="sng" strike="sngStrike" dirty="0">
                 <a:solidFill>
                   <a:srgbClr val="00B0F0"/>
                 </a:solidFill>
               </a:rPr>
-              <a:t>Probable Users and their roles/access</a:t>
-            </a:r>
+              <a:t>Probable Users and their </a:t>
+            </a:r>
+            <a:r>
+              <a:rPr lang="en-IN" sz="1000" u="sng" strike="sngStrike" dirty="0" smtClean="0">
+                <a:solidFill>
+                  <a:srgbClr val="00B0F0"/>
+                </a:solidFill>
+              </a:rPr>
+              <a:t>roles/access </a:t>
+            </a:r>
+            <a:r>
+              <a:rPr lang="en-IN" sz="1000" u="sng" dirty="0" smtClean="0">
+                <a:solidFill>
+                  <a:srgbClr val="FF0000"/>
+                </a:solidFill>
+                <a:sym typeface="Wingdings" panose="05000000000000000000" pitchFamily="2" charset="2"/>
+              </a:rPr>
+              <a:t>Details to be </a:t>
+            </a:r>
+            <a:r>
+              <a:rPr lang="en-IN" sz="1000" u="sng" dirty="0" smtClean="0">
+                <a:solidFill>
+                  <a:srgbClr val="FF0000"/>
+                </a:solidFill>
+                <a:sym typeface="Wingdings" panose="05000000000000000000" pitchFamily="2" charset="2"/>
+              </a:rPr>
+              <a:t>given in respective ideation documents</a:t>
+            </a:r>
+            <a:endParaRPr lang="en-IN" sz="1000" u="sng" dirty="0">
+              <a:solidFill>
+                <a:srgbClr val="FF0000"/>
+              </a:solidFill>
+            </a:endParaRPr>
           </a:p>
           <a:p>
             <a:pPr lvl="1"/>
-            <a:endParaRPr lang="en-IN" sz="1600" dirty="0">
+            <a:endParaRPr lang="en-IN" sz="1000" strike="sngStrike" dirty="0">
               <a:solidFill>
                 <a:srgbClr val="00B0F0"/>
               </a:solidFill>
@@ -3618,7 +3730,7 @@
               <a:buAutoNum type="arabicPeriod"/>
             </a:pPr>
             <a:r>
-              <a:rPr lang="en-IN" sz="1600" dirty="0">
+              <a:rPr lang="en-IN" sz="1000" strike="sngStrike" dirty="0">
                 <a:solidFill>
                   <a:srgbClr val="00B0F0"/>
                 </a:solidFill>
@@ -3638,7 +3750,7 @@
               <a:buAutoNum type="arabicPeriod"/>
             </a:pPr>
             <a:r>
-              <a:rPr lang="en-IN" sz="1600" dirty="0">
+              <a:rPr lang="en-IN" sz="1000" strike="sngStrike" dirty="0">
                 <a:solidFill>
                   <a:srgbClr val="00B0F0"/>
                 </a:solidFill>
@@ -3658,7 +3770,7 @@
               <a:buAutoNum type="arabicPeriod"/>
             </a:pPr>
             <a:r>
-              <a:rPr lang="en-IN" sz="1600" dirty="0">
+              <a:rPr lang="en-IN" sz="1000" strike="sngStrike" dirty="0">
                 <a:solidFill>
                   <a:srgbClr val="00B0F0"/>
                 </a:solidFill>
@@ -3668,7 +3780,7 @@
           </a:p>
           <a:p>
             <a:pPr lvl="1"/>
-            <a:endParaRPr lang="en-IN" sz="1600" dirty="0">
+            <a:endParaRPr lang="en-IN" sz="1000" dirty="0">
               <a:solidFill>
                 <a:srgbClr val="00B0F0"/>
               </a:solidFill>
@@ -3679,7 +3791,7 @@
               <a:buFont typeface="Arial" panose="020B0604020202020204" pitchFamily="34" charset="0"/>
               <a:buChar char="•"/>
             </a:pPr>
-            <a:endParaRPr lang="en-IN" sz="1600" dirty="0">
+            <a:endParaRPr lang="en-IN" sz="1000" dirty="0">
               <a:solidFill>
                 <a:srgbClr val="00B0F0"/>
               </a:solidFill>
@@ -3687,35 +3799,211 @@
           </a:p>
           <a:p>
             <a:pPr lvl="1"/>
-            <a:endParaRPr lang="en-IN" sz="1600" dirty="0"/>
+            <a:endParaRPr lang="en-IN" sz="1000" dirty="0"/>
           </a:p>
           <a:p>
             <a:pPr marL="742950" lvl="1" indent="-285750">
               <a:buFont typeface="Arial" panose="020B0604020202020204" pitchFamily="34" charset="0"/>
               <a:buChar char="•"/>
             </a:pPr>
-            <a:endParaRPr lang="en-IN" sz="1600" dirty="0"/>
+            <a:endParaRPr lang="en-IN" sz="1000" dirty="0"/>
           </a:p>
           <a:p>
             <a:pPr marL="742950" lvl="1" indent="-285750">
               <a:buFont typeface="Arial" panose="020B0604020202020204" pitchFamily="34" charset="0"/>
               <a:buChar char="•"/>
             </a:pPr>
-            <a:endParaRPr lang="en-IN" sz="1600" dirty="0"/>
+            <a:endParaRPr lang="en-IN" sz="1000" dirty="0"/>
           </a:p>
           <a:p>
             <a:pPr marL="742950" lvl="1" indent="-285750">
               <a:buFont typeface="Arial" panose="020B0604020202020204" pitchFamily="34" charset="0"/>
               <a:buChar char="•"/>
             </a:pPr>
-            <a:endParaRPr lang="en-IN" sz="1600" dirty="0"/>
+            <a:endParaRPr lang="en-IN" sz="1000" dirty="0"/>
           </a:p>
           <a:p>
             <a:pPr marL="742950" lvl="1" indent="-285750">
               <a:buFont typeface="Arial" panose="020B0604020202020204" pitchFamily="34" charset="0"/>
               <a:buChar char="•"/>
             </a:pPr>
-            <a:endParaRPr lang="en-IN" sz="1600" dirty="0"/>
+            <a:endParaRPr lang="en-IN" sz="1000" dirty="0"/>
+          </a:p>
+        </p:txBody>
+      </p:sp>
+      <p:sp>
+        <p:nvSpPr>
+          <p:cNvPr id="5" name="TextBox 4"/>
+          <p:cNvSpPr txBox="1"/>
+          <p:nvPr/>
+        </p:nvSpPr>
+        <p:spPr>
+          <a:xfrm>
+            <a:off x="7705457" y="2555026"/>
+            <a:ext cx="4486543" cy="1946687"/>
+          </a:xfrm>
+          <a:prstGeom prst="rect">
+            <a:avLst/>
+          </a:prstGeom>
+          <a:noFill/>
+        </p:spPr>
+        <p:txBody>
+          <a:bodyPr wrap="square" rtlCol="0">
+            <a:spAutoFit/>
+          </a:bodyPr>
+          <a:lstStyle/>
+          <a:p>
+            <a:r>
+              <a:rPr lang="en-IN" sz="1050" u="sng" dirty="0" smtClean="0"/>
+              <a:t>Extended scope of product(archiving capabilities) :</a:t>
+            </a:r>
+            <a:endParaRPr lang="en-IN" sz="1050" u="sng" dirty="0"/>
+          </a:p>
+          <a:p>
+            <a:pPr marL="685800" lvl="1" indent="-228600">
+              <a:buFont typeface="+mj-lt"/>
+              <a:buAutoNum type="arabicPeriod"/>
+            </a:pPr>
+            <a:r>
+              <a:rPr lang="en-IN" sz="1000" dirty="0" smtClean="0">
+                <a:solidFill>
+                  <a:srgbClr val="00B0F0"/>
+                </a:solidFill>
+              </a:rPr>
+              <a:t>Export </a:t>
+            </a:r>
+            <a:r>
+              <a:rPr lang="en-IN" sz="1000" dirty="0">
+                <a:solidFill>
+                  <a:srgbClr val="00B0F0"/>
+                </a:solidFill>
+              </a:rPr>
+              <a:t>an single idea to a pdf if possible share as </a:t>
+            </a:r>
+            <a:r>
+              <a:rPr lang="en-IN" sz="1000" dirty="0" smtClean="0">
+                <a:solidFill>
+                  <a:srgbClr val="00B0F0"/>
+                </a:solidFill>
+              </a:rPr>
+              <a:t>pdf</a:t>
+            </a:r>
+          </a:p>
+          <a:p>
+            <a:pPr marL="685800" lvl="1" indent="-228600">
+              <a:buFont typeface="+mj-lt"/>
+              <a:buAutoNum type="arabicPeriod"/>
+            </a:pPr>
+            <a:r>
+              <a:rPr lang="en-IN" sz="1000" dirty="0" smtClean="0">
+                <a:solidFill>
+                  <a:srgbClr val="00B0F0"/>
+                </a:solidFill>
+              </a:rPr>
+              <a:t>Import/Export </a:t>
+            </a:r>
+            <a:r>
+              <a:rPr lang="en-IN" sz="1000" dirty="0">
+                <a:solidFill>
+                  <a:srgbClr val="00B0F0"/>
+                </a:solidFill>
+              </a:rPr>
+              <a:t>all ideas to </a:t>
+            </a:r>
+            <a:r>
+              <a:rPr lang="en-IN" sz="1000" dirty="0" err="1">
+                <a:solidFill>
+                  <a:srgbClr val="00B0F0"/>
+                </a:solidFill>
+              </a:rPr>
+              <a:t>xls</a:t>
+            </a:r>
+            <a:endParaRPr lang="en-IN" sz="1000" dirty="0">
+              <a:solidFill>
+                <a:srgbClr val="00B0F0"/>
+              </a:solidFill>
+            </a:endParaRPr>
+          </a:p>
+          <a:p>
+            <a:pPr marL="742950" lvl="1" indent="-285750">
+              <a:buFont typeface="+mj-lt"/>
+              <a:buAutoNum type="arabicPeriod"/>
+            </a:pPr>
+            <a:r>
+              <a:rPr lang="en-IN" sz="1000" dirty="0" smtClean="0">
+                <a:solidFill>
+                  <a:srgbClr val="00B0F0"/>
+                </a:solidFill>
+              </a:rPr>
+              <a:t>Should </a:t>
+            </a:r>
+            <a:r>
+              <a:rPr lang="en-IN" sz="1000" dirty="0">
+                <a:solidFill>
+                  <a:srgbClr val="00B0F0"/>
+                </a:solidFill>
+              </a:rPr>
+              <a:t>support bulk uploads</a:t>
+            </a:r>
+          </a:p>
+          <a:p>
+            <a:pPr lvl="1"/>
+            <a:endParaRPr lang="en-IN" sz="1000" dirty="0">
+              <a:solidFill>
+                <a:srgbClr val="00B0F0"/>
+              </a:solidFill>
+            </a:endParaRPr>
+          </a:p>
+          <a:p>
+            <a:pPr lvl="1"/>
+            <a:endParaRPr lang="en-IN" sz="1000" dirty="0">
+              <a:solidFill>
+                <a:srgbClr val="00B0F0"/>
+              </a:solidFill>
+            </a:endParaRPr>
+          </a:p>
+          <a:p>
+            <a:pPr marL="742950" lvl="1" indent="-285750">
+              <a:buFont typeface="Arial" panose="020B0604020202020204" pitchFamily="34" charset="0"/>
+              <a:buChar char="•"/>
+            </a:pPr>
+            <a:endParaRPr lang="en-IN" sz="1000" dirty="0">
+              <a:solidFill>
+                <a:srgbClr val="00B0F0"/>
+              </a:solidFill>
+            </a:endParaRPr>
+          </a:p>
+          <a:p>
+            <a:pPr lvl="1"/>
+            <a:endParaRPr lang="en-IN" sz="1000" dirty="0"/>
+          </a:p>
+          <a:p>
+            <a:pPr marL="742950" lvl="1" indent="-285750">
+              <a:buFont typeface="Arial" panose="020B0604020202020204" pitchFamily="34" charset="0"/>
+              <a:buChar char="•"/>
+            </a:pPr>
+            <a:endParaRPr lang="en-IN" sz="1000" dirty="0"/>
+          </a:p>
+          <a:p>
+            <a:pPr marL="742950" lvl="1" indent="-285750">
+              <a:buFont typeface="Arial" panose="020B0604020202020204" pitchFamily="34" charset="0"/>
+              <a:buChar char="•"/>
+            </a:pPr>
+            <a:endParaRPr lang="en-IN" sz="1000" dirty="0"/>
+          </a:p>
+          <a:p>
+            <a:pPr marL="742950" lvl="1" indent="-285750">
+              <a:buFont typeface="Arial" panose="020B0604020202020204" pitchFamily="34" charset="0"/>
+              <a:buChar char="•"/>
+            </a:pPr>
+            <a:endParaRPr lang="en-IN" sz="1000" dirty="0"/>
+          </a:p>
+          <a:p>
+            <a:pPr marL="742950" lvl="1" indent="-285750">
+              <a:buFont typeface="Arial" panose="020B0604020202020204" pitchFamily="34" charset="0"/>
+              <a:buChar char="•"/>
+            </a:pPr>
+            <a:endParaRPr lang="en-IN" sz="1000" dirty="0"/>
           </a:p>
         </p:txBody>
       </p:sp>
@@ -4352,6 +4640,10 @@
               <a:buFont typeface="Arial" panose="020B0604020202020204" pitchFamily="34" charset="0"/>
               <a:buChar char="•"/>
             </a:pPr>
+            <a:r>
+              <a:rPr lang="en-IN" sz="1600" dirty="0" smtClean="0"/>
+              <a:t>Evaluation process and score intake parameters to be defined.</a:t>
+            </a:r>
             <a:endParaRPr lang="en-IN" sz="1600" dirty="0"/>
           </a:p>
           <a:p>

</xml_diff>

<commit_message>
Creation of ideation sheets for functional scope
</commit_message>
<xml_diff>
--- a/2.use-cases/Use-cases.pptx
+++ b/2.use-cases/Use-cases.pptx
@@ -4134,8 +4134,8 @@
         </p:nvSpPr>
         <p:spPr>
           <a:xfrm>
-            <a:off x="1545580" y="2670371"/>
-            <a:ext cx="8448084" cy="6063198"/>
+            <a:off x="566444" y="2395242"/>
+            <a:ext cx="8448084" cy="4770537"/>
           </a:xfrm>
           <a:prstGeom prst="rect">
             <a:avLst/>
@@ -4149,12 +4149,12 @@
           <a:lstStyle/>
           <a:p>
             <a:r>
-              <a:rPr lang="en-IN" u="sng" dirty="0"/>
+              <a:rPr lang="en-IN" sz="1400" u="sng" dirty="0"/>
               <a:t>Functional scope:</a:t>
             </a:r>
           </a:p>
           <a:p>
-            <a:endParaRPr lang="en-IN" u="sng" dirty="0"/>
+            <a:endParaRPr lang="en-IN" sz="1400" u="sng" dirty="0"/>
           </a:p>
           <a:p>
             <a:pPr marL="742950" lvl="1" indent="-285750">
@@ -4162,13 +4162,35 @@
               <a:buChar char="•"/>
             </a:pPr>
             <a:r>
-              <a:rPr lang="en-IN" sz="1600" dirty="0">
+              <a:rPr lang="en-IN" sz="1200" dirty="0">
                 <a:solidFill>
                   <a:srgbClr val="FF0000"/>
                 </a:solidFill>
               </a:rPr>
-              <a:t>Idea life-cycle to be defined.</a:t>
-            </a:r>
+              <a:t>Idea life-cycle to be defined</a:t>
+            </a:r>
+            <a:r>
+              <a:rPr lang="en-IN" sz="1200" dirty="0" smtClean="0">
+                <a:solidFill>
+                  <a:srgbClr val="FF0000"/>
+                </a:solidFill>
+              </a:rPr>
+              <a:t>. </a:t>
+            </a:r>
+            <a:r>
+              <a:rPr lang="en-IN" sz="1200" dirty="0" smtClean="0">
+                <a:solidFill>
+                  <a:srgbClr val="92D050"/>
+                </a:solidFill>
+                <a:sym typeface="Wingdings" panose="05000000000000000000" pitchFamily="2" charset="2"/>
+              </a:rPr>
+              <a:t> Page created for ideation</a:t>
+            </a:r>
+            <a:endParaRPr lang="en-IN" sz="1200" dirty="0" smtClean="0">
+              <a:solidFill>
+                <a:srgbClr val="92D050"/>
+              </a:solidFill>
+            </a:endParaRPr>
           </a:p>
           <a:p>
             <a:pPr marL="742950" lvl="1" indent="-285750">
@@ -4176,9 +4198,18 @@
               <a:buChar char="•"/>
             </a:pPr>
             <a:r>
-              <a:rPr lang="en-IN" sz="1600" dirty="0"/>
-              <a:t>Classification of ideas during on-boarding either as enhancement or new product.  </a:t>
-            </a:r>
+              <a:rPr lang="en-IN" sz="1200" dirty="0" smtClean="0">
+                <a:solidFill>
+                  <a:srgbClr val="FF0000"/>
+                </a:solidFill>
+              </a:rPr>
+              <a:t>User journey to be defined </a:t>
+            </a:r>
+            <a:endParaRPr lang="en-IN" sz="1200" dirty="0">
+              <a:solidFill>
+                <a:srgbClr val="FF0000"/>
+              </a:solidFill>
+            </a:endParaRPr>
           </a:p>
           <a:p>
             <a:pPr marL="742950" lvl="1" indent="-285750">
@@ -4186,12 +4217,8 @@
               <a:buChar char="•"/>
             </a:pPr>
             <a:r>
-              <a:rPr lang="en-IN" sz="1600" dirty="0">
-                <a:solidFill>
-                  <a:srgbClr val="FF0000"/>
-                </a:solidFill>
-              </a:rPr>
-              <a:t>Contents to be collected as a part of idea to be defined.</a:t>
+              <a:rPr lang="en-IN" sz="1200" dirty="0"/>
+              <a:t>Classification of ideas during on-boarding either as enhancement or new product.  </a:t>
             </a:r>
           </a:p>
           <a:p>
@@ -4200,20 +4227,12 @@
               <a:buChar char="•"/>
             </a:pPr>
             <a:r>
-              <a:rPr lang="en-IN" sz="1600" dirty="0">
+              <a:rPr lang="en-IN" sz="1200" dirty="0">
                 <a:solidFill>
                   <a:srgbClr val="FF0000"/>
                 </a:solidFill>
               </a:rPr>
-              <a:t>Differences in P.O.V or P.O.C’s and P.I’s during data intake</a:t>
-            </a:r>
-            <a:r>
-              <a:rPr lang="en-IN" sz="1600" dirty="0">
-                <a:solidFill>
-                  <a:srgbClr val="00B0F0"/>
-                </a:solidFill>
-              </a:rPr>
-              <a:t>.(Does it really needed)</a:t>
+              <a:t>Contents to be collected as a part of idea to be defined.</a:t>
             </a:r>
           </a:p>
           <a:p>
@@ -4222,8 +4241,20 @@
               <a:buChar char="•"/>
             </a:pPr>
             <a:r>
-              <a:rPr lang="en-IN" sz="1600" dirty="0"/>
-              <a:t>View of the feedback received </a:t>
+              <a:rPr lang="en-IN" sz="1200" dirty="0">
+                <a:solidFill>
+                  <a:srgbClr val="FF0000"/>
+                </a:solidFill>
+              </a:rPr>
+              <a:t>Differences in P.O.V or P.O.C’s and P.I’s during data intake</a:t>
+            </a:r>
+            <a:r>
+              <a:rPr lang="en-IN" sz="1200" dirty="0">
+                <a:solidFill>
+                  <a:srgbClr val="00B0F0"/>
+                </a:solidFill>
+              </a:rPr>
+              <a:t>.(Does it really needed)</a:t>
             </a:r>
           </a:p>
           <a:p>
@@ -4232,8 +4263,8 @@
               <a:buChar char="•"/>
             </a:pPr>
             <a:r>
-              <a:rPr lang="en-IN" sz="1600" dirty="0"/>
-              <a:t>Status on assignment and approval.</a:t>
+              <a:rPr lang="en-IN" sz="1200" dirty="0"/>
+              <a:t>View of the feedback received </a:t>
             </a:r>
           </a:p>
           <a:p>
@@ -4242,8 +4273,8 @@
               <a:buChar char="•"/>
             </a:pPr>
             <a:r>
-              <a:rPr lang="en-IN" sz="1600" dirty="0"/>
-              <a:t>Approval functionality to be defined .</a:t>
+              <a:rPr lang="en-IN" sz="1200" dirty="0"/>
+              <a:t>Status on assignment and approval.</a:t>
             </a:r>
           </a:p>
           <a:p>
@@ -4252,16 +4283,8 @@
               <a:buChar char="•"/>
             </a:pPr>
             <a:r>
-              <a:rPr lang="en-IN" sz="1600" dirty="0"/>
-              <a:t>Approved </a:t>
-            </a:r>
-            <a:r>
-              <a:rPr lang="en-IN" sz="1600" b="1" dirty="0">
-                <a:solidFill>
-                  <a:srgbClr val="FF0000"/>
-                </a:solidFill>
-              </a:rPr>
-              <a:t>ideas storage and view facility to be defined.</a:t>
+              <a:rPr lang="en-IN" sz="1200" dirty="0"/>
+              <a:t>Approval functionality to be defined .</a:t>
             </a:r>
           </a:p>
           <a:p>
@@ -4270,12 +4293,16 @@
               <a:buChar char="•"/>
             </a:pPr>
             <a:r>
-              <a:rPr lang="en-IN" sz="1600" dirty="0">
-                <a:solidFill>
-                  <a:srgbClr val="00B0F0"/>
-                </a:solidFill>
-              </a:rPr>
-              <a:t>View the ideas shared by others and vote/like it</a:t>
+              <a:rPr lang="en-IN" sz="1200" dirty="0"/>
+              <a:t>Approved </a:t>
+            </a:r>
+            <a:r>
+              <a:rPr lang="en-IN" sz="1200" b="1" dirty="0">
+                <a:solidFill>
+                  <a:srgbClr val="FF0000"/>
+                </a:solidFill>
+              </a:rPr>
+              <a:t>ideas storage and view facility to be defined.</a:t>
             </a:r>
           </a:p>
           <a:p>
@@ -4284,12 +4311,12 @@
               <a:buChar char="•"/>
             </a:pPr>
             <a:r>
-              <a:rPr lang="en-IN" sz="1600" dirty="0">
+              <a:rPr lang="en-IN" sz="1200" dirty="0">
                 <a:solidFill>
                   <a:srgbClr val="00B0F0"/>
                 </a:solidFill>
               </a:rPr>
-              <a:t>Edit/Modify/Delete only their submitted ideas</a:t>
+              <a:t>View the ideas shared by others and vote/like it</a:t>
             </a:r>
           </a:p>
           <a:p>
@@ -4298,12 +4325,12 @@
               <a:buChar char="•"/>
             </a:pPr>
             <a:r>
-              <a:rPr lang="en-IN" sz="1600" dirty="0">
+              <a:rPr lang="en-IN" sz="1200" dirty="0">
                 <a:solidFill>
                   <a:srgbClr val="00B0F0"/>
                 </a:solidFill>
               </a:rPr>
-              <a:t>Rules and Handbook can be provided to users</a:t>
+              <a:t>Edit/Modify/Delete only their submitted ideas</a:t>
             </a:r>
           </a:p>
           <a:p>
@@ -4312,12 +4339,12 @@
               <a:buChar char="•"/>
             </a:pPr>
             <a:r>
-              <a:rPr lang="en-IN" sz="1600" dirty="0">
+              <a:rPr lang="en-IN" sz="1200" dirty="0">
                 <a:solidFill>
                   <a:srgbClr val="00B0F0"/>
                 </a:solidFill>
               </a:rPr>
-              <a:t>Should be able to receive feedback from the users</a:t>
+              <a:t>Rules and Handbook can be provided to users</a:t>
             </a:r>
           </a:p>
           <a:p>
@@ -4326,12 +4353,12 @@
               <a:buChar char="•"/>
             </a:pPr>
             <a:r>
-              <a:rPr lang="en-IN" sz="1600" dirty="0">
+              <a:rPr lang="en-IN" sz="1200" dirty="0">
                 <a:solidFill>
                   <a:srgbClr val="00B0F0"/>
                 </a:solidFill>
               </a:rPr>
-              <a:t>Common template for uploading ideas</a:t>
+              <a:t>Should be able to receive feedback from the users</a:t>
             </a:r>
           </a:p>
           <a:p>
@@ -4339,7 +4366,21 @@
               <a:buFont typeface="Arial" panose="020B0604020202020204" pitchFamily="34" charset="0"/>
               <a:buChar char="•"/>
             </a:pPr>
-            <a:endParaRPr lang="en-IN" sz="1600" dirty="0">
+            <a:r>
+              <a:rPr lang="en-IN" sz="1200" dirty="0">
+                <a:solidFill>
+                  <a:srgbClr val="00B0F0"/>
+                </a:solidFill>
+              </a:rPr>
+              <a:t>Common template for uploading ideas</a:t>
+            </a:r>
+          </a:p>
+          <a:p>
+            <a:pPr marL="742950" lvl="1" indent="-285750">
+              <a:buFont typeface="Arial" panose="020B0604020202020204" pitchFamily="34" charset="0"/>
+              <a:buChar char="•"/>
+            </a:pPr>
+            <a:endParaRPr lang="en-IN" sz="1200" dirty="0">
               <a:solidFill>
                 <a:srgbClr val="00B0F0"/>
               </a:solidFill>
@@ -4350,7 +4391,7 @@
               <a:buFont typeface="Arial" panose="020B0604020202020204" pitchFamily="34" charset="0"/>
               <a:buChar char="•"/>
             </a:pPr>
-            <a:endParaRPr lang="en-IN" sz="1600" b="1" dirty="0">
+            <a:endParaRPr lang="en-IN" sz="1200" b="1" dirty="0">
               <a:solidFill>
                 <a:srgbClr val="FF0000"/>
               </a:solidFill>
@@ -4358,43 +4399,43 @@
           </a:p>
           <a:p>
             <a:pPr lvl="1"/>
-            <a:endParaRPr lang="en-IN" sz="1600" dirty="0"/>
+            <a:endParaRPr lang="en-IN" sz="1200" dirty="0"/>
           </a:p>
           <a:p>
             <a:pPr marL="742950" lvl="1" indent="-285750">
               <a:buFont typeface="Arial" panose="020B0604020202020204" pitchFamily="34" charset="0"/>
               <a:buChar char="•"/>
             </a:pPr>
-            <a:endParaRPr lang="en-IN" sz="1600" dirty="0"/>
+            <a:endParaRPr lang="en-IN" sz="1200" dirty="0"/>
           </a:p>
           <a:p>
             <a:pPr lvl="1"/>
-            <a:endParaRPr lang="en-IN" sz="1600" dirty="0"/>
+            <a:endParaRPr lang="en-IN" sz="1200" dirty="0"/>
           </a:p>
           <a:p>
             <a:pPr lvl="1"/>
-            <a:endParaRPr lang="en-IN" sz="1600" dirty="0"/>
+            <a:endParaRPr lang="en-IN" sz="1200" dirty="0"/>
           </a:p>
           <a:p>
             <a:pPr marL="742950" lvl="1" indent="-285750">
               <a:buFont typeface="Arial" panose="020B0604020202020204" pitchFamily="34" charset="0"/>
               <a:buChar char="•"/>
             </a:pPr>
-            <a:endParaRPr lang="en-IN" sz="1600" dirty="0"/>
+            <a:endParaRPr lang="en-IN" sz="1200" dirty="0"/>
           </a:p>
           <a:p>
             <a:pPr marL="742950" lvl="1" indent="-285750">
               <a:buFont typeface="Arial" panose="020B0604020202020204" pitchFamily="34" charset="0"/>
               <a:buChar char="•"/>
             </a:pPr>
-            <a:endParaRPr lang="en-IN" sz="1600" dirty="0"/>
+            <a:endParaRPr lang="en-IN" sz="1200" dirty="0"/>
           </a:p>
           <a:p>
             <a:pPr marL="742950" lvl="1" indent="-285750">
               <a:buFont typeface="Arial" panose="020B0604020202020204" pitchFamily="34" charset="0"/>
               <a:buChar char="•"/>
             </a:pPr>
-            <a:endParaRPr lang="en-IN" sz="1600" dirty="0"/>
+            <a:endParaRPr lang="en-IN" sz="1200" dirty="0"/>
           </a:p>
         </p:txBody>
       </p:sp>

</xml_diff>

<commit_message>
Added ideation documents for open points
</commit_message>
<xml_diff>
--- a/2.use-cases/Use-cases.pptx
+++ b/2.use-cases/Use-cases.pptx
@@ -108,6 +108,22 @@
     </a:lvl9pPr>
   </p:defaultTextStyle>
   <p:extLst>
+    <p:ext uri="{521415D9-36F7-43E2-AB2F-B90AF26B5E84}">
+      <p14:sectionLst xmlns:p14="http://schemas.microsoft.com/office/powerpoint/2010/main">
+        <p14:section name="Default Section" id="{3B9CFCB2-1346-4D73-A5DE-BF9998ED77A0}">
+          <p14:sldIdLst>
+            <p14:sldId id="257"/>
+            <p14:sldId id="256"/>
+            <p14:sldId id="258"/>
+          </p14:sldIdLst>
+        </p14:section>
+        <p14:section name="Untitled Section" id="{8E8D3141-2F18-49F3-9429-5639839DE9C6}">
+          <p14:sldIdLst>
+            <p14:sldId id="259"/>
+          </p14:sldIdLst>
+        </p14:section>
+      </p14:sectionLst>
+    </p:ext>
     <p:ext uri="{EFAFB233-063F-42B5-8137-9DF3F51BA10A}">
       <p15:sldGuideLst xmlns:p15="http://schemas.microsoft.com/office/powerpoint/2012/main"/>
     </p:ext>
@@ -3693,16 +3709,7 @@
                 </a:solidFill>
                 <a:sym typeface="Wingdings" panose="05000000000000000000" pitchFamily="2" charset="2"/>
               </a:rPr>
-              <a:t>Details to be </a:t>
-            </a:r>
-            <a:r>
-              <a:rPr lang="en-IN" sz="1000" u="sng" dirty="0" smtClean="0">
-                <a:solidFill>
-                  <a:srgbClr val="FF0000"/>
-                </a:solidFill>
-                <a:sym typeface="Wingdings" panose="05000000000000000000" pitchFamily="2" charset="2"/>
-              </a:rPr>
-              <a:t>given in respective ideation documents</a:t>
+              <a:t>Details to be given in respective ideation documents</a:t>
             </a:r>
             <a:endParaRPr lang="en-IN" sz="1000" u="sng" dirty="0">
               <a:solidFill>
@@ -3870,7 +3877,7 @@
                   <a:srgbClr val="00B0F0"/>
                 </a:solidFill>
               </a:rPr>
-              <a:t>Export </a:t>
+              <a:t>  Export </a:t>
             </a:r>
             <a:r>
               <a:rPr lang="en-IN" sz="1000" dirty="0">
@@ -3900,7 +3907,7 @@
                   <a:srgbClr val="00B0F0"/>
                 </a:solidFill>
               </a:rPr>
-              <a:t>Import/Export </a:t>
+              <a:t>  Import/Export </a:t>
             </a:r>
             <a:r>
               <a:rPr lang="en-IN" sz="1000" dirty="0">
@@ -4134,8 +4141,8 @@
         </p:nvSpPr>
         <p:spPr>
           <a:xfrm>
-            <a:off x="566444" y="2395242"/>
-            <a:ext cx="8448084" cy="4770537"/>
+            <a:off x="453157" y="2508530"/>
+            <a:ext cx="7687432" cy="5139869"/>
           </a:xfrm>
           <a:prstGeom prst="rect">
             <a:avLst/>
@@ -4184,7 +4191,58 @@
                 </a:solidFill>
                 <a:sym typeface="Wingdings" panose="05000000000000000000" pitchFamily="2" charset="2"/>
               </a:rPr>
-              <a:t> Page created for ideation</a:t>
+              <a:t> Page created for </a:t>
+            </a:r>
+            <a:r>
+              <a:rPr lang="en-IN" sz="1200" dirty="0" smtClean="0">
+                <a:solidFill>
+                  <a:srgbClr val="92D050"/>
+                </a:solidFill>
+                <a:sym typeface="Wingdings" panose="05000000000000000000" pitchFamily="2" charset="2"/>
+              </a:rPr>
+              <a:t>ideation</a:t>
+            </a:r>
+          </a:p>
+          <a:p>
+            <a:pPr marL="742950" lvl="1" indent="-285750">
+              <a:buFont typeface="Arial" panose="020B0604020202020204" pitchFamily="34" charset="0"/>
+              <a:buChar char="•"/>
+            </a:pPr>
+            <a:r>
+              <a:rPr lang="en-IN" sz="1200" dirty="0">
+                <a:solidFill>
+                  <a:srgbClr val="92D050"/>
+                </a:solidFill>
+                <a:sym typeface="Wingdings" panose="05000000000000000000" pitchFamily="2" charset="2"/>
+              </a:rPr>
+              <a:t>Re-opening for </a:t>
+            </a:r>
+            <a:r>
+              <a:rPr lang="en-IN" sz="1200" dirty="0" smtClean="0">
+                <a:solidFill>
+                  <a:srgbClr val="92D050"/>
+                </a:solidFill>
+                <a:sym typeface="Wingdings" panose="05000000000000000000" pitchFamily="2" charset="2"/>
+              </a:rPr>
+              <a:t>clarification </a:t>
+            </a:r>
+            <a:r>
+              <a:rPr lang="en-IN" sz="1200" dirty="0">
+                <a:solidFill>
+                  <a:srgbClr val="92D050"/>
+                </a:solidFill>
+                <a:sym typeface="Wingdings" panose="05000000000000000000" pitchFamily="2" charset="2"/>
+              </a:rPr>
+              <a:t> Page created for </a:t>
+            </a:r>
+            <a:r>
+              <a:rPr lang="en-IN" sz="1200" dirty="0" smtClean="0">
+                <a:solidFill>
+                  <a:srgbClr val="92D050"/>
+                </a:solidFill>
+                <a:sym typeface="Wingdings" panose="05000000000000000000" pitchFamily="2" charset="2"/>
+              </a:rPr>
+              <a:t>ideation</a:t>
             </a:r>
             <a:endParaRPr lang="en-IN" sz="1200" dirty="0" smtClean="0">
               <a:solidFill>
@@ -4205,7 +4263,221 @@
               </a:rPr>
               <a:t>User journey to be defined </a:t>
             </a:r>
+            <a:r>
+              <a:rPr lang="en-IN" sz="1200" dirty="0" smtClean="0">
+                <a:solidFill>
+                  <a:srgbClr val="FF0000"/>
+                </a:solidFill>
+              </a:rPr>
+              <a:t> </a:t>
+            </a:r>
+            <a:r>
+              <a:rPr lang="en-IN" sz="1200" dirty="0" smtClean="0">
+                <a:solidFill>
+                  <a:srgbClr val="92D050"/>
+                </a:solidFill>
+                <a:sym typeface="Wingdings" panose="05000000000000000000" pitchFamily="2" charset="2"/>
+              </a:rPr>
+              <a:t>PPT’S created for customer journey identification</a:t>
+            </a:r>
             <a:endParaRPr lang="en-IN" sz="1200" dirty="0">
+              <a:solidFill>
+                <a:srgbClr val="92D050"/>
+              </a:solidFill>
+            </a:endParaRPr>
+          </a:p>
+          <a:p>
+            <a:pPr marL="742950" lvl="1" indent="-285750">
+              <a:buFont typeface="Arial" panose="020B0604020202020204" pitchFamily="34" charset="0"/>
+              <a:buChar char="•"/>
+            </a:pPr>
+            <a:r>
+              <a:rPr lang="en-IN" sz="1200" dirty="0"/>
+              <a:t>Classification of ideas during on-boarding either as enhancement or new product</a:t>
+            </a:r>
+            <a:r>
+              <a:rPr lang="en-IN" sz="1200" dirty="0" smtClean="0"/>
+              <a:t>. </a:t>
+            </a:r>
+            <a:r>
+              <a:rPr lang="en-IN" sz="1200" dirty="0" smtClean="0">
+                <a:solidFill>
+                  <a:srgbClr val="92D050"/>
+                </a:solidFill>
+                <a:sym typeface="Wingdings" panose="05000000000000000000" pitchFamily="2" charset="2"/>
+              </a:rPr>
+              <a:t> Page created for ideation</a:t>
+            </a:r>
+            <a:r>
+              <a:rPr lang="en-IN" sz="1200" dirty="0" smtClean="0">
+                <a:solidFill>
+                  <a:srgbClr val="92D050"/>
+                </a:solidFill>
+              </a:rPr>
+              <a:t>  </a:t>
+            </a:r>
+            <a:endParaRPr lang="en-IN" sz="1200" dirty="0">
+              <a:solidFill>
+                <a:srgbClr val="92D050"/>
+              </a:solidFill>
+            </a:endParaRPr>
+          </a:p>
+          <a:p>
+            <a:pPr marL="742950" lvl="1" indent="-285750">
+              <a:buFont typeface="Arial" panose="020B0604020202020204" pitchFamily="34" charset="0"/>
+              <a:buChar char="•"/>
+            </a:pPr>
+            <a:r>
+              <a:rPr lang="en-IN" sz="1200" dirty="0">
+                <a:solidFill>
+                  <a:srgbClr val="FF0000"/>
+                </a:solidFill>
+              </a:rPr>
+              <a:t>Contents to be collected as a part of idea to be defined</a:t>
+            </a:r>
+            <a:r>
+              <a:rPr lang="en-IN" sz="1200" dirty="0" smtClean="0">
+                <a:solidFill>
+                  <a:srgbClr val="FF0000"/>
+                </a:solidFill>
+              </a:rPr>
+              <a:t>. </a:t>
+            </a:r>
+            <a:r>
+              <a:rPr lang="en-IN" sz="1200" dirty="0">
+                <a:solidFill>
+                  <a:srgbClr val="92D050"/>
+                </a:solidFill>
+                <a:sym typeface="Wingdings" panose="05000000000000000000" pitchFamily="2" charset="2"/>
+              </a:rPr>
+              <a:t> Page created for ideation</a:t>
+            </a:r>
+            <a:r>
+              <a:rPr lang="en-IN" sz="1200" dirty="0">
+                <a:solidFill>
+                  <a:srgbClr val="92D050"/>
+                </a:solidFill>
+              </a:rPr>
+              <a:t> </a:t>
+            </a:r>
+            <a:r>
+              <a:rPr lang="en-IN" sz="1200" dirty="0" smtClean="0">
+                <a:solidFill>
+                  <a:srgbClr val="92D050"/>
+                </a:solidFill>
+                <a:sym typeface="Wingdings" panose="05000000000000000000" pitchFamily="2" charset="2"/>
+              </a:rPr>
+              <a:t>.</a:t>
+            </a:r>
+            <a:endParaRPr lang="en-IN" sz="1200" dirty="0">
+              <a:solidFill>
+                <a:srgbClr val="92D050"/>
+              </a:solidFill>
+            </a:endParaRPr>
+          </a:p>
+          <a:p>
+            <a:pPr marL="742950" lvl="1" indent="-285750">
+              <a:buFont typeface="Arial" panose="020B0604020202020204" pitchFamily="34" charset="0"/>
+              <a:buChar char="•"/>
+            </a:pPr>
+            <a:r>
+              <a:rPr lang="en-IN" sz="1200" dirty="0"/>
+              <a:t>View of the feedback received </a:t>
+            </a:r>
+            <a:r>
+              <a:rPr lang="en-IN" sz="1200" dirty="0">
+                <a:solidFill>
+                  <a:srgbClr val="92D050"/>
+                </a:solidFill>
+                <a:sym typeface="Wingdings" panose="05000000000000000000" pitchFamily="2" charset="2"/>
+              </a:rPr>
+              <a:t> Page created for ideation.</a:t>
+            </a:r>
+            <a:endParaRPr lang="en-IN" sz="1200" dirty="0"/>
+          </a:p>
+          <a:p>
+            <a:pPr marL="742950" lvl="1" indent="-285750">
+              <a:buFont typeface="Arial" panose="020B0604020202020204" pitchFamily="34" charset="0"/>
+              <a:buChar char="•"/>
+            </a:pPr>
+            <a:r>
+              <a:rPr lang="en-IN" sz="1200" dirty="0"/>
+              <a:t>Status on assignment and approval</a:t>
+            </a:r>
+            <a:r>
+              <a:rPr lang="en-IN" sz="1200" dirty="0" smtClean="0"/>
+              <a:t>.</a:t>
+            </a:r>
+            <a:r>
+              <a:rPr lang="en-IN" sz="1200" dirty="0">
+                <a:solidFill>
+                  <a:srgbClr val="92D050"/>
+                </a:solidFill>
+                <a:sym typeface="Wingdings" panose="05000000000000000000" pitchFamily="2" charset="2"/>
+              </a:rPr>
+              <a:t>  Page created for ideation.</a:t>
+            </a:r>
+            <a:endParaRPr lang="en-IN" sz="1200" dirty="0"/>
+          </a:p>
+          <a:p>
+            <a:pPr marL="742950" lvl="1" indent="-285750">
+              <a:buFont typeface="Arial" panose="020B0604020202020204" pitchFamily="34" charset="0"/>
+              <a:buChar char="•"/>
+            </a:pPr>
+            <a:r>
+              <a:rPr lang="en-IN" sz="1200" dirty="0"/>
+              <a:t>Approval functionality to be defined </a:t>
+            </a:r>
+            <a:r>
+              <a:rPr lang="en-IN" sz="1200" dirty="0" smtClean="0"/>
+              <a:t>.</a:t>
+            </a:r>
+            <a:r>
+              <a:rPr lang="en-IN" sz="1200" dirty="0">
+                <a:solidFill>
+                  <a:srgbClr val="92D050"/>
+                </a:solidFill>
+                <a:sym typeface="Wingdings" panose="05000000000000000000" pitchFamily="2" charset="2"/>
+              </a:rPr>
+              <a:t>  Page created for ideation.</a:t>
+            </a:r>
+            <a:endParaRPr lang="en-IN" sz="1200" dirty="0"/>
+          </a:p>
+          <a:p>
+            <a:pPr marL="742950" lvl="1" indent="-285750">
+              <a:buFont typeface="Arial" panose="020B0604020202020204" pitchFamily="34" charset="0"/>
+              <a:buChar char="•"/>
+            </a:pPr>
+            <a:r>
+              <a:rPr lang="en-IN" sz="1200" dirty="0"/>
+              <a:t>Approved </a:t>
+            </a:r>
+            <a:r>
+              <a:rPr lang="en-IN" sz="1200" b="1" dirty="0">
+                <a:solidFill>
+                  <a:srgbClr val="FF0000"/>
+                </a:solidFill>
+              </a:rPr>
+              <a:t>ideas storage and view facility to be defined</a:t>
+            </a:r>
+            <a:r>
+              <a:rPr lang="en-IN" sz="1200" b="1" dirty="0" smtClean="0">
+                <a:solidFill>
+                  <a:srgbClr val="FF0000"/>
+                </a:solidFill>
+              </a:rPr>
+              <a:t>.</a:t>
+            </a:r>
+            <a:r>
+              <a:rPr lang="en-IN" sz="1200" dirty="0">
+                <a:solidFill>
+                  <a:srgbClr val="92D050"/>
+                </a:solidFill>
+                <a:sym typeface="Wingdings" panose="05000000000000000000" pitchFamily="2" charset="2"/>
+              </a:rPr>
+              <a:t>  Page created for ideation.</a:t>
+            </a:r>
+            <a:endParaRPr lang="en-IN" sz="1200" b="1" dirty="0">
               <a:solidFill>
                 <a:srgbClr val="FF0000"/>
               </a:solidFill>
@@ -4217,169 +4489,38 @@
               <a:buChar char="•"/>
             </a:pPr>
             <a:r>
-              <a:rPr lang="en-IN" sz="1200" dirty="0"/>
-              <a:t>Classification of ideas during on-boarding either as enhancement or new product.  </a:t>
-            </a:r>
-          </a:p>
-          <a:p>
-            <a:pPr marL="742950" lvl="1" indent="-285750">
-              <a:buFont typeface="Arial" panose="020B0604020202020204" pitchFamily="34" charset="0"/>
-              <a:buChar char="•"/>
-            </a:pPr>
+              <a:rPr lang="en-IN" sz="1200" dirty="0" smtClean="0">
+                <a:solidFill>
+                  <a:srgbClr val="00B0F0"/>
+                </a:solidFill>
+              </a:rPr>
+              <a:t>Edit/Modify/Delete </a:t>
+            </a:r>
             <a:r>
               <a:rPr lang="en-IN" sz="1200" dirty="0">
                 <a:solidFill>
-                  <a:srgbClr val="FF0000"/>
-                </a:solidFill>
-              </a:rPr>
-              <a:t>Contents to be collected as a part of idea to be defined.</a:t>
-            </a:r>
-          </a:p>
-          <a:p>
-            <a:pPr marL="742950" lvl="1" indent="-285750">
-              <a:buFont typeface="Arial" panose="020B0604020202020204" pitchFamily="34" charset="0"/>
-              <a:buChar char="•"/>
-            </a:pPr>
+                  <a:srgbClr val="00B0F0"/>
+                </a:solidFill>
+              </a:rPr>
+              <a:t>only their submitted </a:t>
+            </a:r>
+            <a:r>
+              <a:rPr lang="en-IN" sz="1200" dirty="0" smtClean="0">
+                <a:solidFill>
+                  <a:srgbClr val="00B0F0"/>
+                </a:solidFill>
+              </a:rPr>
+              <a:t>ideas </a:t>
+            </a:r>
             <a:r>
               <a:rPr lang="en-IN" sz="1200" dirty="0">
                 <a:solidFill>
-                  <a:srgbClr val="FF0000"/>
-                </a:solidFill>
-              </a:rPr>
-              <a:t>Differences in P.O.V or P.O.C’s and P.I’s during data intake</a:t>
-            </a:r>
-            <a:r>
-              <a:rPr lang="en-IN" sz="1200" dirty="0">
-                <a:solidFill>
-                  <a:srgbClr val="00B0F0"/>
-                </a:solidFill>
-              </a:rPr>
-              <a:t>.(Does it really needed)</a:t>
-            </a:r>
-          </a:p>
-          <a:p>
-            <a:pPr marL="742950" lvl="1" indent="-285750">
-              <a:buFont typeface="Arial" panose="020B0604020202020204" pitchFamily="34" charset="0"/>
-              <a:buChar char="•"/>
-            </a:pPr>
-            <a:r>
-              <a:rPr lang="en-IN" sz="1200" dirty="0"/>
-              <a:t>View of the feedback received </a:t>
-            </a:r>
-          </a:p>
-          <a:p>
-            <a:pPr marL="742950" lvl="1" indent="-285750">
-              <a:buFont typeface="Arial" panose="020B0604020202020204" pitchFamily="34" charset="0"/>
-              <a:buChar char="•"/>
-            </a:pPr>
-            <a:r>
-              <a:rPr lang="en-IN" sz="1200" dirty="0"/>
-              <a:t>Status on assignment and approval.</a:t>
-            </a:r>
-          </a:p>
-          <a:p>
-            <a:pPr marL="742950" lvl="1" indent="-285750">
-              <a:buFont typeface="Arial" panose="020B0604020202020204" pitchFamily="34" charset="0"/>
-              <a:buChar char="•"/>
-            </a:pPr>
-            <a:r>
-              <a:rPr lang="en-IN" sz="1200" dirty="0"/>
-              <a:t>Approval functionality to be defined .</a:t>
-            </a:r>
-          </a:p>
-          <a:p>
-            <a:pPr marL="742950" lvl="1" indent="-285750">
-              <a:buFont typeface="Arial" panose="020B0604020202020204" pitchFamily="34" charset="0"/>
-              <a:buChar char="•"/>
-            </a:pPr>
-            <a:r>
-              <a:rPr lang="en-IN" sz="1200" dirty="0"/>
-              <a:t>Approved </a:t>
-            </a:r>
-            <a:r>
-              <a:rPr lang="en-IN" sz="1200" b="1" dirty="0">
-                <a:solidFill>
-                  <a:srgbClr val="FF0000"/>
-                </a:solidFill>
-              </a:rPr>
-              <a:t>ideas storage and view facility to be defined.</a:t>
-            </a:r>
-          </a:p>
-          <a:p>
-            <a:pPr marL="742950" lvl="1" indent="-285750">
-              <a:buFont typeface="Arial" panose="020B0604020202020204" pitchFamily="34" charset="0"/>
-              <a:buChar char="•"/>
-            </a:pPr>
-            <a:r>
-              <a:rPr lang="en-IN" sz="1200" dirty="0">
-                <a:solidFill>
-                  <a:srgbClr val="00B0F0"/>
-                </a:solidFill>
-              </a:rPr>
-              <a:t>View the ideas shared by others and vote/like it</a:t>
-            </a:r>
-          </a:p>
-          <a:p>
-            <a:pPr marL="742950" lvl="1" indent="-285750">
-              <a:buFont typeface="Arial" panose="020B0604020202020204" pitchFamily="34" charset="0"/>
-              <a:buChar char="•"/>
-            </a:pPr>
-            <a:r>
-              <a:rPr lang="en-IN" sz="1200" dirty="0">
-                <a:solidFill>
-                  <a:srgbClr val="00B0F0"/>
-                </a:solidFill>
-              </a:rPr>
-              <a:t>Edit/Modify/Delete only their submitted ideas</a:t>
-            </a:r>
-          </a:p>
-          <a:p>
-            <a:pPr marL="742950" lvl="1" indent="-285750">
-              <a:buFont typeface="Arial" panose="020B0604020202020204" pitchFamily="34" charset="0"/>
-              <a:buChar char="•"/>
-            </a:pPr>
-            <a:r>
-              <a:rPr lang="en-IN" sz="1200" dirty="0">
-                <a:solidFill>
-                  <a:srgbClr val="00B0F0"/>
-                </a:solidFill>
-              </a:rPr>
-              <a:t>Rules and Handbook can be provided to users</a:t>
-            </a:r>
-          </a:p>
-          <a:p>
-            <a:pPr marL="742950" lvl="1" indent="-285750">
-              <a:buFont typeface="Arial" panose="020B0604020202020204" pitchFamily="34" charset="0"/>
-              <a:buChar char="•"/>
-            </a:pPr>
-            <a:r>
-              <a:rPr lang="en-IN" sz="1200" dirty="0">
-                <a:solidFill>
-                  <a:srgbClr val="00B0F0"/>
-                </a:solidFill>
-              </a:rPr>
-              <a:t>Should be able to receive feedback from the users</a:t>
-            </a:r>
-          </a:p>
-          <a:p>
-            <a:pPr marL="742950" lvl="1" indent="-285750">
-              <a:buFont typeface="Arial" panose="020B0604020202020204" pitchFamily="34" charset="0"/>
-              <a:buChar char="•"/>
-            </a:pPr>
-            <a:r>
-              <a:rPr lang="en-IN" sz="1200" dirty="0">
-                <a:solidFill>
-                  <a:srgbClr val="00B0F0"/>
-                </a:solidFill>
-              </a:rPr>
-              <a:t>Common template for uploading ideas</a:t>
-            </a:r>
-          </a:p>
-          <a:p>
-            <a:pPr marL="742950" lvl="1" indent="-285750">
-              <a:buFont typeface="Arial" panose="020B0604020202020204" pitchFamily="34" charset="0"/>
-              <a:buChar char="•"/>
-            </a:pPr>
+                  <a:srgbClr val="92D050"/>
+                </a:solidFill>
+                <a:sym typeface="Wingdings" panose="05000000000000000000" pitchFamily="2" charset="2"/>
+              </a:rPr>
+              <a:t> Page created for ideation.</a:t>
+            </a:r>
             <a:endParaRPr lang="en-IN" sz="1200" dirty="0">
               <a:solidFill>
                 <a:srgbClr val="00B0F0"/>
@@ -4391,6 +4532,174 @@
               <a:buFont typeface="Arial" panose="020B0604020202020204" pitchFamily="34" charset="0"/>
               <a:buChar char="•"/>
             </a:pPr>
+            <a:r>
+              <a:rPr lang="en-IN" sz="1200" dirty="0">
+                <a:solidFill>
+                  <a:srgbClr val="00B0F0"/>
+                </a:solidFill>
+              </a:rPr>
+              <a:t>Rules and Handbook can be provided to </a:t>
+            </a:r>
+            <a:r>
+              <a:rPr lang="en-IN" sz="1200" dirty="0" smtClean="0">
+                <a:solidFill>
+                  <a:srgbClr val="00B0F0"/>
+                </a:solidFill>
+              </a:rPr>
+              <a:t>users </a:t>
+            </a:r>
+            <a:r>
+              <a:rPr lang="en-IN" sz="1200" dirty="0" smtClean="0">
+                <a:solidFill>
+                  <a:srgbClr val="92D050"/>
+                </a:solidFill>
+                <a:sym typeface="Wingdings" panose="05000000000000000000" pitchFamily="2" charset="2"/>
+              </a:rPr>
+              <a:t> Page created for helper Chat bot</a:t>
+            </a:r>
+            <a:endParaRPr lang="en-IN" sz="1200" dirty="0">
+              <a:solidFill>
+                <a:srgbClr val="92D050"/>
+              </a:solidFill>
+            </a:endParaRPr>
+          </a:p>
+          <a:p>
+            <a:pPr marL="742950" lvl="1" indent="-285750">
+              <a:buFont typeface="Arial" panose="020B0604020202020204" pitchFamily="34" charset="0"/>
+              <a:buChar char="•"/>
+            </a:pPr>
+            <a:r>
+              <a:rPr lang="en-IN" sz="1200" u="sng" dirty="0" smtClean="0">
+                <a:solidFill>
+                  <a:srgbClr val="00B0F0"/>
+                </a:solidFill>
+              </a:rPr>
+              <a:t>Common </a:t>
+            </a:r>
+            <a:r>
+              <a:rPr lang="en-IN" sz="1200" u="sng" dirty="0">
+                <a:solidFill>
+                  <a:srgbClr val="00B0F0"/>
+                </a:solidFill>
+              </a:rPr>
+              <a:t>template for uploading </a:t>
+            </a:r>
+            <a:r>
+              <a:rPr lang="en-IN" sz="1200" u="sng" dirty="0" smtClean="0">
+                <a:solidFill>
+                  <a:srgbClr val="00B0F0"/>
+                </a:solidFill>
+              </a:rPr>
+              <a:t>ideas (</a:t>
+            </a:r>
+            <a:r>
+              <a:rPr lang="en-IN" sz="1200" u="sng" dirty="0" err="1" smtClean="0">
+                <a:solidFill>
+                  <a:srgbClr val="00B0F0"/>
+                </a:solidFill>
+              </a:rPr>
+              <a:t>vs</a:t>
+            </a:r>
+            <a:r>
+              <a:rPr lang="en-IN" sz="1200" u="sng" dirty="0" smtClean="0">
+                <a:solidFill>
+                  <a:srgbClr val="00B0F0"/>
+                </a:solidFill>
+              </a:rPr>
+              <a:t>) </a:t>
+            </a:r>
+            <a:r>
+              <a:rPr lang="en-IN" sz="1200" u="sng" dirty="0" smtClean="0">
+                <a:solidFill>
+                  <a:srgbClr val="FF0000"/>
+                </a:solidFill>
+              </a:rPr>
+              <a:t>Differences </a:t>
+            </a:r>
+            <a:r>
+              <a:rPr lang="en-IN" sz="1200" u="sng" dirty="0">
+                <a:solidFill>
+                  <a:srgbClr val="FF0000"/>
+                </a:solidFill>
+              </a:rPr>
+              <a:t>in P.O.V or P.O.C’s and P.I’s during data intake</a:t>
+            </a:r>
+            <a:r>
+              <a:rPr lang="en-IN" sz="1200" u="sng" dirty="0" smtClean="0">
+                <a:solidFill>
+                  <a:srgbClr val="00B0F0"/>
+                </a:solidFill>
+              </a:rPr>
+              <a:t>.</a:t>
+            </a:r>
+            <a:r>
+              <a:rPr lang="en-IN" sz="1200" u="sng" dirty="0" smtClean="0">
+                <a:solidFill>
+                  <a:srgbClr val="92D050"/>
+                </a:solidFill>
+                <a:sym typeface="Wingdings" panose="05000000000000000000" pitchFamily="2" charset="2"/>
+              </a:rPr>
+              <a:t> </a:t>
+            </a:r>
+            <a:r>
+              <a:rPr lang="en-IN" sz="1200" u="sng" dirty="0">
+                <a:solidFill>
+                  <a:srgbClr val="92D050"/>
+                </a:solidFill>
+                <a:sym typeface="Wingdings" panose="05000000000000000000" pitchFamily="2" charset="2"/>
+              </a:rPr>
+              <a:t>Page created for </a:t>
+            </a:r>
+            <a:r>
+              <a:rPr lang="en-IN" sz="1200" u="sng" dirty="0" smtClean="0">
+                <a:solidFill>
+                  <a:srgbClr val="92D050"/>
+                </a:solidFill>
+                <a:sym typeface="Wingdings" panose="05000000000000000000" pitchFamily="2" charset="2"/>
+              </a:rPr>
+              <a:t>ideation   </a:t>
+            </a:r>
+            <a:r>
+              <a:rPr lang="en-IN" sz="1200" u="sng" dirty="0" smtClean="0">
+                <a:effectLst>
+                  <a:outerShdw blurRad="38100" dist="38100" dir="2700000" algn="tl">
+                    <a:srgbClr val="000000">
+                      <a:alpha val="43137"/>
+                    </a:srgbClr>
+                  </a:outerShdw>
+                </a:effectLst>
+                <a:sym typeface="Wingdings" panose="05000000000000000000" pitchFamily="2" charset="2"/>
+              </a:rPr>
+              <a:t>Requirement to be cross checked</a:t>
+            </a:r>
+          </a:p>
+          <a:p>
+            <a:pPr marL="742950" lvl="1" indent="-285750">
+              <a:buFont typeface="Arial" panose="020B0604020202020204" pitchFamily="34" charset="0"/>
+              <a:buChar char="•"/>
+            </a:pPr>
+            <a:endParaRPr lang="en-IN" sz="1200" u="sng" dirty="0">
+              <a:solidFill>
+                <a:srgbClr val="00B0F0"/>
+              </a:solidFill>
+            </a:endParaRPr>
+          </a:p>
+          <a:p>
+            <a:pPr marL="742950" lvl="1" indent="-285750">
+              <a:buFont typeface="Arial" panose="020B0604020202020204" pitchFamily="34" charset="0"/>
+              <a:buChar char="•"/>
+            </a:pPr>
+            <a:endParaRPr lang="en-IN" sz="1200" dirty="0">
+              <a:solidFill>
+                <a:srgbClr val="00B0F0"/>
+              </a:solidFill>
+            </a:endParaRPr>
+          </a:p>
+          <a:p>
+            <a:pPr marL="742950" lvl="1" indent="-285750">
+              <a:buFont typeface="Arial" panose="020B0604020202020204" pitchFamily="34" charset="0"/>
+              <a:buChar char="•"/>
+            </a:pPr>
             <a:endParaRPr lang="en-IN" sz="1200" b="1" dirty="0">
               <a:solidFill>
                 <a:srgbClr val="FF0000"/>
@@ -4436,6 +4745,104 @@
               <a:buChar char="•"/>
             </a:pPr>
             <a:endParaRPr lang="en-IN" sz="1200" dirty="0"/>
+          </a:p>
+        </p:txBody>
+      </p:sp>
+      <p:sp>
+        <p:nvSpPr>
+          <p:cNvPr id="3" name="TextBox 2"/>
+          <p:cNvSpPr txBox="1"/>
+          <p:nvPr/>
+        </p:nvSpPr>
+        <p:spPr>
+          <a:xfrm>
+            <a:off x="8261968" y="3099250"/>
+            <a:ext cx="3501728" cy="1292662"/>
+          </a:xfrm>
+          <a:prstGeom prst="rect">
+            <a:avLst/>
+          </a:prstGeom>
+          <a:noFill/>
+        </p:spPr>
+        <p:txBody>
+          <a:bodyPr wrap="none" rtlCol="0">
+            <a:spAutoFit/>
+          </a:bodyPr>
+          <a:lstStyle/>
+          <a:p>
+            <a:r>
+              <a:rPr lang="en-IN" sz="1200" dirty="0" smtClean="0"/>
+              <a:t>Extended Scope:</a:t>
+            </a:r>
+          </a:p>
+          <a:p>
+            <a:endParaRPr lang="en-IN" sz="1200" dirty="0" smtClean="0"/>
+          </a:p>
+          <a:p>
+            <a:pPr marL="228600" lvl="1" indent="-228600">
+              <a:buAutoNum type="arabicParenR"/>
+            </a:pPr>
+            <a:r>
+              <a:rPr lang="en-IN" sz="1200" dirty="0" smtClean="0">
+                <a:solidFill>
+                  <a:srgbClr val="00B0F0"/>
+                </a:solidFill>
+              </a:rPr>
+              <a:t>View </a:t>
+            </a:r>
+            <a:r>
+              <a:rPr lang="en-IN" sz="1200" dirty="0">
+                <a:solidFill>
+                  <a:srgbClr val="00B0F0"/>
+                </a:solidFill>
+              </a:rPr>
+              <a:t>the ideas shared by others and vote/like it</a:t>
+            </a:r>
+            <a:r>
+              <a:rPr lang="en-IN" sz="1200" dirty="0">
+                <a:solidFill>
+                  <a:srgbClr val="92D050"/>
+                </a:solidFill>
+                <a:sym typeface="Wingdings" panose="05000000000000000000" pitchFamily="2" charset="2"/>
+              </a:rPr>
+              <a:t> </a:t>
+            </a:r>
+            <a:endParaRPr lang="en-IN" sz="1200" dirty="0" smtClean="0">
+              <a:solidFill>
+                <a:srgbClr val="92D050"/>
+              </a:solidFill>
+              <a:sym typeface="Wingdings" panose="05000000000000000000" pitchFamily="2" charset="2"/>
+            </a:endParaRPr>
+          </a:p>
+          <a:p>
+            <a:pPr marL="0" lvl="1"/>
+            <a:r>
+              <a:rPr lang="en-IN" sz="1200" dirty="0" smtClean="0">
+                <a:solidFill>
+                  <a:srgbClr val="00B0F0"/>
+                </a:solidFill>
+              </a:rPr>
+              <a:t>2)  Should </a:t>
+            </a:r>
+            <a:r>
+              <a:rPr lang="en-IN" sz="1200" dirty="0">
+                <a:solidFill>
+                  <a:srgbClr val="00B0F0"/>
+                </a:solidFill>
+              </a:rPr>
+              <a:t>be able to receive feedback from the users</a:t>
+            </a:r>
+          </a:p>
+          <a:p>
+            <a:pPr marL="0" lvl="1"/>
+            <a:endParaRPr lang="en-IN" sz="1200" dirty="0">
+              <a:solidFill>
+                <a:srgbClr val="00B0F0"/>
+              </a:solidFill>
+            </a:endParaRPr>
+          </a:p>
+          <a:p>
+            <a:endParaRPr lang="en-IN" dirty="0"/>
           </a:p>
         </p:txBody>
       </p:sp>
@@ -4571,7 +4978,7 @@
         <p:spPr>
           <a:xfrm>
             <a:off x="412694" y="2751291"/>
-            <a:ext cx="9030711" cy="3600986"/>
+            <a:ext cx="9030711" cy="3847207"/>
           </a:xfrm>
           <a:prstGeom prst="rect">
             <a:avLst/>
@@ -4607,8 +5014,39 @@
                   <a:srgbClr val="FF0000"/>
                 </a:solidFill>
               </a:rPr>
-              <a:t>innovation evangelist.</a:t>
-            </a:r>
+              <a:t>innovation evangelist</a:t>
+            </a:r>
+            <a:r>
+              <a:rPr lang="en-IN" sz="1600" b="1" dirty="0" smtClean="0">
+                <a:solidFill>
+                  <a:srgbClr val="FF0000"/>
+                </a:solidFill>
+              </a:rPr>
+              <a:t>. </a:t>
+            </a:r>
+            <a:r>
+              <a:rPr lang="en-IN" sz="1600" dirty="0">
+                <a:solidFill>
+                  <a:srgbClr val="92D050"/>
+                </a:solidFill>
+                <a:sym typeface="Wingdings" panose="05000000000000000000" pitchFamily="2" charset="2"/>
+              </a:rPr>
+              <a:t> Page created for </a:t>
+            </a:r>
+            <a:r>
+              <a:rPr lang="en-IN" sz="1600" dirty="0" smtClean="0">
+                <a:solidFill>
+                  <a:srgbClr val="92D050"/>
+                </a:solidFill>
+                <a:sym typeface="Wingdings" panose="05000000000000000000" pitchFamily="2" charset="2"/>
+              </a:rPr>
+              <a:t>ideation</a:t>
+            </a:r>
+            <a:endParaRPr lang="en-IN" sz="1600" b="1" dirty="0">
+              <a:solidFill>
+                <a:srgbClr val="FF0000"/>
+              </a:solidFill>
+            </a:endParaRPr>
           </a:p>
           <a:p>
             <a:pPr marL="742950" lvl="1" indent="-285750">
@@ -4624,13 +5062,37 @@
               <a:t>An innovation evangelist should be tagged to a domain. </a:t>
             </a:r>
             <a:r>
-              <a:rPr lang="en-IN" sz="1600" dirty="0">
+              <a:rPr lang="en-IN" sz="1600" strike="sngStrike" dirty="0">
                 <a:solidFill>
                   <a:srgbClr val="00B0F0"/>
                 </a:solidFill>
               </a:rPr>
-              <a:t>(We cannot restrict the domain for the users)</a:t>
-            </a:r>
+              <a:t>(We cannot restrict the domain for the users</a:t>
+            </a:r>
+            <a:r>
+              <a:rPr lang="en-IN" sz="1600" strike="sngStrike" dirty="0" smtClean="0">
+                <a:solidFill>
+                  <a:srgbClr val="00B0F0"/>
+                </a:solidFill>
+              </a:rPr>
+              <a:t>) </a:t>
+            </a:r>
+            <a:r>
+              <a:rPr lang="en-IN" sz="1600" strike="sngStrike" dirty="0" smtClean="0">
+                <a:solidFill>
+                  <a:srgbClr val="00B0F0"/>
+                </a:solidFill>
+                <a:sym typeface="Wingdings" panose="05000000000000000000" pitchFamily="2" charset="2"/>
+              </a:rPr>
+              <a:t> </a:t>
+            </a:r>
+            <a:r>
+              <a:rPr lang="en-IN" sz="1600" dirty="0" smtClean="0">
+                <a:sym typeface="Wingdings" panose="05000000000000000000" pitchFamily="2" charset="2"/>
+              </a:rPr>
+              <a:t>Evaluator is fixed for a domain to be discussed</a:t>
+            </a:r>
+            <a:endParaRPr lang="en-IN" sz="1600" dirty="0"/>
           </a:p>
           <a:p>
             <a:pPr marL="742950" lvl="1" indent="-285750">
@@ -4639,8 +5101,31 @@
             </a:pPr>
             <a:r>
               <a:rPr lang="en-IN" sz="1600" dirty="0"/>
-              <a:t>A P.I. or P.O.V or P.O.C can be assigned to an innovation evangelist of the domain of that idea.</a:t>
-            </a:r>
+              <a:t>A P.I. or P.O.V or P.O.C can be assigned to an innovation evangelist of the domain of that idea</a:t>
+            </a:r>
+            <a:r>
+              <a:rPr lang="en-IN" sz="1600" dirty="0" smtClean="0"/>
+              <a:t>. </a:t>
+            </a:r>
+            <a:r>
+              <a:rPr lang="en-IN" sz="1600" dirty="0">
+                <a:solidFill>
+                  <a:srgbClr val="92D050"/>
+                </a:solidFill>
+                <a:sym typeface="Wingdings" panose="05000000000000000000" pitchFamily="2" charset="2"/>
+              </a:rPr>
+              <a:t> Page created for </a:t>
+            </a:r>
+            <a:r>
+              <a:rPr lang="en-IN" sz="1600" dirty="0" smtClean="0">
+                <a:solidFill>
+                  <a:srgbClr val="92D050"/>
+                </a:solidFill>
+                <a:sym typeface="Wingdings" panose="05000000000000000000" pitchFamily="2" charset="2"/>
+              </a:rPr>
+              <a:t>ideation</a:t>
+            </a:r>
+            <a:endParaRPr lang="en-IN" sz="1600" dirty="0"/>
           </a:p>
           <a:p>
             <a:pPr marL="742950" lvl="1" indent="-285750">
@@ -4649,8 +5134,31 @@
             </a:pPr>
             <a:r>
               <a:rPr lang="en-IN" sz="1600" dirty="0"/>
-              <a:t>Feedback provisioning facility for an innovation evangelist with a rejection .</a:t>
-            </a:r>
+              <a:t>Feedback provisioning facility for an innovation evangelist with a rejection </a:t>
+            </a:r>
+            <a:r>
+              <a:rPr lang="en-IN" sz="1600" dirty="0" smtClean="0"/>
+              <a:t>. </a:t>
+            </a:r>
+            <a:r>
+              <a:rPr lang="en-IN" sz="1600" dirty="0">
+                <a:solidFill>
+                  <a:srgbClr val="92D050"/>
+                </a:solidFill>
+                <a:sym typeface="Wingdings" panose="05000000000000000000" pitchFamily="2" charset="2"/>
+              </a:rPr>
+              <a:t> Page created for </a:t>
+            </a:r>
+            <a:r>
+              <a:rPr lang="en-IN" sz="1600" dirty="0" smtClean="0">
+                <a:solidFill>
+                  <a:srgbClr val="92D050"/>
+                </a:solidFill>
+                <a:sym typeface="Wingdings" panose="05000000000000000000" pitchFamily="2" charset="2"/>
+              </a:rPr>
+              <a:t>ideation</a:t>
+            </a:r>
+            <a:endParaRPr lang="en-IN" sz="1600" dirty="0"/>
           </a:p>
           <a:p>
             <a:pPr marL="742950" lvl="1" indent="-285750">
@@ -4659,8 +5167,31 @@
             </a:pPr>
             <a:r>
               <a:rPr lang="en-IN" sz="1600" dirty="0"/>
-              <a:t>Feedback provisioning facility for an innovation evangelist citing an approval.</a:t>
-            </a:r>
+              <a:t>Feedback provisioning facility for an innovation evangelist citing an approval</a:t>
+            </a:r>
+            <a:r>
+              <a:rPr lang="en-IN" sz="1600" dirty="0" smtClean="0"/>
+              <a:t>.</a:t>
+            </a:r>
+            <a:r>
+              <a:rPr lang="en-IN" sz="1600" dirty="0">
+                <a:solidFill>
+                  <a:srgbClr val="92D050"/>
+                </a:solidFill>
+                <a:sym typeface="Wingdings" panose="05000000000000000000" pitchFamily="2" charset="2"/>
+              </a:rPr>
+              <a:t>  Page created for </a:t>
+            </a:r>
+            <a:r>
+              <a:rPr lang="en-IN" sz="1600" dirty="0" smtClean="0">
+                <a:solidFill>
+                  <a:srgbClr val="92D050"/>
+                </a:solidFill>
+                <a:sym typeface="Wingdings" panose="05000000000000000000" pitchFamily="2" charset="2"/>
+              </a:rPr>
+              <a:t>ideation</a:t>
+            </a:r>
+            <a:endParaRPr lang="en-IN" sz="1600" dirty="0"/>
           </a:p>
           <a:p>
             <a:pPr marL="742950" lvl="1" indent="-285750">
@@ -4673,8 +5204,39 @@
                   <a:srgbClr val="FF0000"/>
                 </a:solidFill>
               </a:rPr>
-              <a:t>View for all the ideas assigned , facility to filter upon approved and rejected ideas.</a:t>
-            </a:r>
+              <a:t>View for all the ideas assigned , facility to filter upon approved and rejected ideas</a:t>
+            </a:r>
+            <a:r>
+              <a:rPr lang="en-IN" sz="1600" dirty="0" smtClean="0">
+                <a:solidFill>
+                  <a:srgbClr val="FF0000"/>
+                </a:solidFill>
+              </a:rPr>
+              <a:t>.</a:t>
+            </a:r>
+            <a:r>
+              <a:rPr lang="en-IN" sz="1600" dirty="0">
+                <a:solidFill>
+                  <a:srgbClr val="92D050"/>
+                </a:solidFill>
+                <a:sym typeface="Wingdings" panose="05000000000000000000" pitchFamily="2" charset="2"/>
+              </a:rPr>
+              <a:t>  Page created for </a:t>
+            </a:r>
+            <a:r>
+              <a:rPr lang="en-IN" sz="1600" dirty="0" smtClean="0">
+                <a:solidFill>
+                  <a:srgbClr val="92D050"/>
+                </a:solidFill>
+                <a:sym typeface="Wingdings" panose="05000000000000000000" pitchFamily="2" charset="2"/>
+              </a:rPr>
+              <a:t>ideation</a:t>
+            </a:r>
+            <a:endParaRPr lang="en-IN" sz="1600" dirty="0">
+              <a:solidFill>
+                <a:srgbClr val="FF0000"/>
+              </a:solidFill>
+            </a:endParaRPr>
           </a:p>
           <a:p>
             <a:pPr marL="742950" lvl="1" indent="-285750">
@@ -4683,29 +5245,8 @@
             </a:pPr>
             <a:r>
               <a:rPr lang="en-IN" sz="1600" dirty="0" smtClean="0"/>
-              <a:t>Evaluation process and score intake parameters to be defined.</a:t>
-            </a:r>
-            <a:endParaRPr lang="en-IN" sz="1600" dirty="0"/>
-          </a:p>
-          <a:p>
-            <a:pPr marL="742950" lvl="1" indent="-285750">
-              <a:buFont typeface="Arial" panose="020B0604020202020204" pitchFamily="34" charset="0"/>
-              <a:buChar char="•"/>
-            </a:pPr>
-            <a:endParaRPr lang="en-IN" sz="1600" dirty="0"/>
-          </a:p>
-          <a:p>
-            <a:pPr marL="742950" lvl="1" indent="-285750">
-              <a:buFont typeface="Arial" panose="020B0604020202020204" pitchFamily="34" charset="0"/>
-              <a:buChar char="•"/>
-            </a:pPr>
-            <a:endParaRPr lang="en-IN" sz="1600" dirty="0"/>
-          </a:p>
-          <a:p>
-            <a:pPr marL="742950" lvl="1" indent="-285750">
-              <a:buFont typeface="Arial" panose="020B0604020202020204" pitchFamily="34" charset="0"/>
-              <a:buChar char="•"/>
-            </a:pPr>
+              <a:t>No scoring for idea collection portal</a:t>
+            </a:r>
             <a:endParaRPr lang="en-IN" sz="1600" dirty="0"/>
           </a:p>
           <a:p>
@@ -4849,7 +5390,7 @@
         <p:spPr>
           <a:xfrm>
             <a:off x="412695" y="2751291"/>
-            <a:ext cx="6837770" cy="4585871"/>
+            <a:ext cx="6837770" cy="3108543"/>
           </a:xfrm>
           <a:prstGeom prst="rect">
             <a:avLst/>
@@ -4863,12 +5404,12 @@
           <a:lstStyle/>
           <a:p>
             <a:r>
-              <a:rPr lang="en-IN" u="sng" dirty="0"/>
+              <a:rPr lang="en-IN" sz="1400" u="sng" dirty="0"/>
               <a:t>Functional scope:</a:t>
             </a:r>
           </a:p>
           <a:p>
-            <a:endParaRPr lang="en-IN" u="sng" dirty="0"/>
+            <a:endParaRPr lang="en-IN" sz="1400" u="sng" dirty="0"/>
           </a:p>
           <a:p>
             <a:pPr marL="742950" lvl="1" indent="-285750">
@@ -4876,8 +5417,30 @@
               <a:buChar char="•"/>
             </a:pPr>
             <a:r>
-              <a:rPr lang="en-IN" sz="1600" dirty="0"/>
-              <a:t>On-boarding or registration process .</a:t>
+              <a:rPr lang="en-IN" sz="1200" dirty="0"/>
+              <a:t>On-boarding or registration process </a:t>
+            </a:r>
+            <a:r>
+              <a:rPr lang="en-IN" sz="1200" dirty="0" smtClean="0"/>
+              <a:t>. </a:t>
+            </a:r>
+            <a:r>
+              <a:rPr lang="en-IN" sz="1200" dirty="0">
+                <a:solidFill>
+                  <a:srgbClr val="92D050"/>
+                </a:solidFill>
+                <a:sym typeface="Wingdings" panose="05000000000000000000" pitchFamily="2" charset="2"/>
+              </a:rPr>
+              <a:t> Page created for </a:t>
+            </a:r>
+            <a:r>
+              <a:rPr lang="en-IN" sz="1200" dirty="0" smtClean="0">
+                <a:solidFill>
+                  <a:srgbClr val="92D050"/>
+                </a:solidFill>
+                <a:sym typeface="Wingdings" panose="05000000000000000000" pitchFamily="2" charset="2"/>
+              </a:rPr>
+              <a:t>ideation</a:t>
             </a:r>
           </a:p>
           <a:p>
@@ -4886,13 +5449,31 @@
               <a:buChar char="•"/>
             </a:pPr>
             <a:r>
-              <a:rPr lang="en-IN" sz="1600" dirty="0">
-                <a:solidFill>
-                  <a:srgbClr val="FF0000"/>
-                </a:solidFill>
-              </a:rPr>
-              <a:t>Selection of the role to play during the event.</a:t>
-            </a:r>
+              <a:rPr lang="en-IN" sz="1200" dirty="0" err="1" smtClean="0">
+                <a:sym typeface="Wingdings" panose="05000000000000000000" pitchFamily="2" charset="2"/>
+              </a:rPr>
+              <a:t>Hackathon</a:t>
+            </a:r>
+            <a:r>
+              <a:rPr lang="en-IN" sz="1200" dirty="0" smtClean="0">
+                <a:sym typeface="Wingdings" panose="05000000000000000000" pitchFamily="2" charset="2"/>
+              </a:rPr>
+              <a:t> event lifecycle to be define </a:t>
+            </a:r>
+            <a:r>
+              <a:rPr lang="en-IN" sz="1200" dirty="0"/>
+              <a:t> </a:t>
+            </a:r>
+            <a:r>
+              <a:rPr lang="en-IN" sz="1200" dirty="0">
+                <a:solidFill>
+                  <a:srgbClr val="92D050"/>
+                </a:solidFill>
+                <a:sym typeface="Wingdings" panose="05000000000000000000" pitchFamily="2" charset="2"/>
+              </a:rPr>
+              <a:t> Page created for ideation</a:t>
+            </a:r>
+            <a:endParaRPr lang="en-IN" sz="1200" dirty="0"/>
           </a:p>
           <a:p>
             <a:pPr marL="742950" lvl="1" indent="-285750">
@@ -4900,13 +5481,53 @@
               <a:buChar char="•"/>
             </a:pPr>
             <a:r>
-              <a:rPr lang="en-IN" sz="1600" dirty="0">
+              <a:rPr lang="en-IN" sz="1200" dirty="0">
                 <a:solidFill>
                   <a:srgbClr val="FF0000"/>
                 </a:solidFill>
               </a:rPr>
-              <a:t>Roles to be defined for the event</a:t>
-            </a:r>
+              <a:t>Selection of the role to play during the event</a:t>
+            </a:r>
+            <a:r>
+              <a:rPr lang="en-IN" sz="1200" dirty="0" smtClean="0">
+                <a:solidFill>
+                  <a:srgbClr val="FF0000"/>
+                </a:solidFill>
+              </a:rPr>
+              <a:t>. </a:t>
+            </a:r>
+            <a:r>
+              <a:rPr lang="en-IN" sz="1200" dirty="0" smtClean="0">
+                <a:solidFill>
+                  <a:srgbClr val="92D050"/>
+                </a:solidFill>
+                <a:sym typeface="Wingdings" panose="05000000000000000000" pitchFamily="2" charset="2"/>
+              </a:rPr>
+              <a:t> </a:t>
+            </a:r>
+            <a:r>
+              <a:rPr lang="en-IN" sz="1200" dirty="0">
+                <a:solidFill>
+                  <a:srgbClr val="92D050"/>
+                </a:solidFill>
+                <a:sym typeface="Wingdings" panose="05000000000000000000" pitchFamily="2" charset="2"/>
+              </a:rPr>
+              <a:t>Page created for </a:t>
+            </a:r>
+            <a:r>
+              <a:rPr lang="en-IN" sz="1200" dirty="0" smtClean="0">
+                <a:solidFill>
+                  <a:srgbClr val="92D050"/>
+                </a:solidFill>
+                <a:sym typeface="Wingdings" panose="05000000000000000000" pitchFamily="2" charset="2"/>
+              </a:rPr>
+              <a:t>ideation</a:t>
+            </a:r>
+            <a:endParaRPr lang="en-IN" sz="1200" dirty="0">
+              <a:solidFill>
+                <a:srgbClr val="FF0000"/>
+              </a:solidFill>
+            </a:endParaRPr>
           </a:p>
           <a:p>
             <a:pPr marL="742950" lvl="1" indent="-285750">
@@ -4914,13 +5535,44 @@
               <a:buChar char="•"/>
             </a:pPr>
             <a:r>
-              <a:rPr lang="en-IN" sz="1600" dirty="0">
+              <a:rPr lang="en-IN" sz="1200" dirty="0">
                 <a:solidFill>
                   <a:srgbClr val="FF0000"/>
                 </a:solidFill>
               </a:rPr>
-              <a:t>Responsibility of roles to be defined</a:t>
-            </a:r>
+              <a:t>Roles to be defined for the </a:t>
+            </a:r>
+            <a:r>
+              <a:rPr lang="en-IN" sz="1200" dirty="0" smtClean="0">
+                <a:solidFill>
+                  <a:srgbClr val="FF0000"/>
+                </a:solidFill>
+              </a:rPr>
+              <a:t>event</a:t>
+            </a:r>
+            <a:r>
+              <a:rPr lang="en-IN" sz="1200" dirty="0">
+                <a:solidFill>
+                  <a:srgbClr val="92D050"/>
+                </a:solidFill>
+                <a:sym typeface="Wingdings" panose="05000000000000000000" pitchFamily="2" charset="2"/>
+              </a:rPr>
+              <a:t> Page created for </a:t>
+            </a:r>
+            <a:r>
+              <a:rPr lang="en-IN" sz="1200" dirty="0" smtClean="0">
+                <a:solidFill>
+                  <a:srgbClr val="92D050"/>
+                </a:solidFill>
+                <a:sym typeface="Wingdings" panose="05000000000000000000" pitchFamily="2" charset="2"/>
+              </a:rPr>
+              <a:t>ideation</a:t>
+            </a:r>
+            <a:endParaRPr lang="en-IN" sz="1200" dirty="0">
+              <a:solidFill>
+                <a:srgbClr val="FF0000"/>
+              </a:solidFill>
+            </a:endParaRPr>
           </a:p>
           <a:p>
             <a:pPr marL="742950" lvl="1" indent="-285750">
@@ -4928,13 +5580,44 @@
               <a:buChar char="•"/>
             </a:pPr>
             <a:r>
-              <a:rPr lang="en-IN" sz="1600" dirty="0">
+              <a:rPr lang="en-IN" sz="1200" dirty="0">
                 <a:solidFill>
                   <a:srgbClr val="FF0000"/>
                 </a:solidFill>
               </a:rPr>
-              <a:t>Tool can assign a team basing on skill set .</a:t>
-            </a:r>
+              <a:t>Responsibility of roles to be </a:t>
+            </a:r>
+            <a:r>
+              <a:rPr lang="en-IN" sz="1200" dirty="0" smtClean="0">
+                <a:solidFill>
+                  <a:srgbClr val="FF0000"/>
+                </a:solidFill>
+              </a:rPr>
+              <a:t>defined</a:t>
+            </a:r>
+            <a:r>
+              <a:rPr lang="en-IN" sz="1200" dirty="0">
+                <a:solidFill>
+                  <a:srgbClr val="92D050"/>
+                </a:solidFill>
+                <a:sym typeface="Wingdings" panose="05000000000000000000" pitchFamily="2" charset="2"/>
+              </a:rPr>
+              <a:t> Page created for </a:t>
+            </a:r>
+            <a:r>
+              <a:rPr lang="en-IN" sz="1200" dirty="0" smtClean="0">
+                <a:solidFill>
+                  <a:srgbClr val="92D050"/>
+                </a:solidFill>
+                <a:sym typeface="Wingdings" panose="05000000000000000000" pitchFamily="2" charset="2"/>
+              </a:rPr>
+              <a:t>ideation</a:t>
+            </a:r>
+            <a:endParaRPr lang="en-IN" sz="1200" dirty="0">
+              <a:solidFill>
+                <a:srgbClr val="FF0000"/>
+              </a:solidFill>
+            </a:endParaRPr>
           </a:p>
           <a:p>
             <a:pPr marL="742950" lvl="1" indent="-285750">
@@ -4942,13 +5625,44 @@
               <a:buChar char="•"/>
             </a:pPr>
             <a:r>
-              <a:rPr lang="en-IN" sz="1600" dirty="0">
+              <a:rPr lang="en-IN" sz="1200" dirty="0">
                 <a:solidFill>
                   <a:srgbClr val="FF0000"/>
                 </a:solidFill>
               </a:rPr>
-              <a:t>Event management can be defined.</a:t>
-            </a:r>
+              <a:t>Tool can assign a team basing on skill set </a:t>
+            </a:r>
+            <a:r>
+              <a:rPr lang="en-IN" sz="1200" dirty="0" smtClean="0">
+                <a:solidFill>
+                  <a:srgbClr val="FF0000"/>
+                </a:solidFill>
+              </a:rPr>
+              <a:t>.</a:t>
+            </a:r>
+            <a:r>
+              <a:rPr lang="en-IN" sz="1200" dirty="0">
+                <a:solidFill>
+                  <a:srgbClr val="92D050"/>
+                </a:solidFill>
+                <a:sym typeface="Wingdings" panose="05000000000000000000" pitchFamily="2" charset="2"/>
+              </a:rPr>
+              <a:t>  Page created for </a:t>
+            </a:r>
+            <a:r>
+              <a:rPr lang="en-IN" sz="1200" dirty="0" smtClean="0">
+                <a:solidFill>
+                  <a:srgbClr val="92D050"/>
+                </a:solidFill>
+                <a:sym typeface="Wingdings" panose="05000000000000000000" pitchFamily="2" charset="2"/>
+              </a:rPr>
+              <a:t>ideation</a:t>
+            </a:r>
+            <a:endParaRPr lang="en-IN" sz="1200" dirty="0">
+              <a:solidFill>
+                <a:srgbClr val="FF0000"/>
+              </a:solidFill>
+            </a:endParaRPr>
           </a:p>
           <a:p>
             <a:pPr marL="742950" lvl="1" indent="-285750">
@@ -4956,13 +5670,44 @@
               <a:buChar char="•"/>
             </a:pPr>
             <a:r>
-              <a:rPr lang="en-IN" sz="1600" dirty="0">
+              <a:rPr lang="en-IN" sz="1200" dirty="0">
                 <a:solidFill>
                   <a:srgbClr val="FF0000"/>
                 </a:solidFill>
               </a:rPr>
-              <a:t>Team uploads a P.O.V or P.O.C template based at the end of the event.</a:t>
-            </a:r>
+              <a:t>Event management can be defined</a:t>
+            </a:r>
+            <a:r>
+              <a:rPr lang="en-IN" sz="1200" dirty="0" smtClean="0">
+                <a:solidFill>
+                  <a:srgbClr val="FF0000"/>
+                </a:solidFill>
+              </a:rPr>
+              <a:t>.</a:t>
+            </a:r>
+            <a:r>
+              <a:rPr lang="en-IN" sz="1200" dirty="0">
+                <a:solidFill>
+                  <a:srgbClr val="92D050"/>
+                </a:solidFill>
+                <a:sym typeface="Wingdings" panose="05000000000000000000" pitchFamily="2" charset="2"/>
+              </a:rPr>
+              <a:t>  Page created for </a:t>
+            </a:r>
+            <a:r>
+              <a:rPr lang="en-IN" sz="1200" dirty="0" smtClean="0">
+                <a:solidFill>
+                  <a:srgbClr val="92D050"/>
+                </a:solidFill>
+                <a:sym typeface="Wingdings" panose="05000000000000000000" pitchFamily="2" charset="2"/>
+              </a:rPr>
+              <a:t>ideation</a:t>
+            </a:r>
+            <a:endParaRPr lang="en-IN" sz="1200" dirty="0">
+              <a:solidFill>
+                <a:srgbClr val="FF0000"/>
+              </a:solidFill>
+            </a:endParaRPr>
           </a:p>
           <a:p>
             <a:pPr marL="742950" lvl="1" indent="-285750">
@@ -4970,9 +5715,36 @@
               <a:buChar char="•"/>
             </a:pPr>
             <a:r>
-              <a:rPr lang="en-IN" sz="1600" dirty="0"/>
-              <a:t>Submitted ideas will be archived and people registered with role of innovation evangelist/co-ordinator ,can view the submitted ideas for that event.</a:t>
-            </a:r>
+              <a:rPr lang="en-IN" sz="1200" dirty="0" smtClean="0"/>
+              <a:t>Evaluation </a:t>
+            </a:r>
+            <a:r>
+              <a:rPr lang="en-IN" sz="1200" dirty="0"/>
+              <a:t>process and score intake parameters to be defined</a:t>
+            </a:r>
+            <a:r>
+              <a:rPr lang="en-IN" sz="1200" dirty="0" smtClean="0"/>
+              <a:t>.</a:t>
+            </a:r>
+            <a:r>
+              <a:rPr lang="en-IN" sz="1200" dirty="0">
+                <a:solidFill>
+                  <a:srgbClr val="92D050"/>
+                </a:solidFill>
+                <a:sym typeface="Wingdings" panose="05000000000000000000" pitchFamily="2" charset="2"/>
+              </a:rPr>
+              <a:t>  Page created for </a:t>
+            </a:r>
+            <a:r>
+              <a:rPr lang="en-IN" sz="1200" dirty="0" smtClean="0">
+                <a:solidFill>
+                  <a:srgbClr val="92D050"/>
+                </a:solidFill>
+                <a:sym typeface="Wingdings" panose="05000000000000000000" pitchFamily="2" charset="2"/>
+              </a:rPr>
+              <a:t>ideation</a:t>
+            </a:r>
+            <a:endParaRPr lang="en-IN" sz="1200" dirty="0"/>
           </a:p>
           <a:p>
             <a:pPr marL="742950" lvl="1" indent="-285750">
@@ -4980,34 +5752,31 @@
               <a:buChar char="•"/>
             </a:pPr>
             <a:r>
-              <a:rPr lang="en-IN" sz="1600" dirty="0">
+              <a:rPr lang="en-IN" sz="1200" dirty="0">
                 <a:solidFill>
                   <a:srgbClr val="00B0F0"/>
                 </a:solidFill>
               </a:rPr>
-              <a:t>Complete system administration rights of the portal</a:t>
-            </a:r>
-          </a:p>
-          <a:p>
-            <a:pPr marL="742950" lvl="1" indent="-285750">
-              <a:buFont typeface="Arial" panose="020B0604020202020204" pitchFamily="34" charset="0"/>
-              <a:buChar char="•"/>
-            </a:pPr>
-            <a:r>
-              <a:rPr lang="en-IN" sz="1600" dirty="0">
+              <a:t>Complete system administration rights of the </a:t>
+            </a:r>
+            <a:r>
+              <a:rPr lang="en-IN" sz="1200" dirty="0" smtClean="0">
                 <a:solidFill>
                   <a:srgbClr val="00B0F0"/>
                 </a:solidFill>
               </a:rPr>
-              <a:t>Provide authorization services to the users based on their role</a:t>
-            </a:r>
-          </a:p>
-          <a:p>
-            <a:pPr marL="742950" lvl="1" indent="-285750">
-              <a:buFont typeface="Arial" panose="020B0604020202020204" pitchFamily="34" charset="0"/>
-              <a:buChar char="•"/>
-            </a:pPr>
-            <a:endParaRPr lang="en-IN" sz="1600" dirty="0">
+              <a:t>portal </a:t>
+            </a:r>
+            <a:r>
+              <a:rPr lang="en-IN" sz="1200" dirty="0">
+                <a:solidFill>
+                  <a:srgbClr val="92D050"/>
+                </a:solidFill>
+                <a:sym typeface="Wingdings" panose="05000000000000000000" pitchFamily="2" charset="2"/>
+              </a:rPr>
+              <a:t> Page created for ideation</a:t>
+            </a:r>
+            <a:endParaRPr lang="en-IN" sz="1200" dirty="0">
               <a:solidFill>
                 <a:srgbClr val="00B0F0"/>
               </a:solidFill>
@@ -5018,22 +5787,69 @@
               <a:buFont typeface="Arial" panose="020B0604020202020204" pitchFamily="34" charset="0"/>
               <a:buChar char="•"/>
             </a:pPr>
-            <a:endParaRPr lang="en-IN" sz="1600" dirty="0">
+            <a:r>
+              <a:rPr lang="en-IN" sz="1200" dirty="0">
+                <a:solidFill>
+                  <a:srgbClr val="00B0F0"/>
+                </a:solidFill>
+              </a:rPr>
+              <a:t>Provide authorization services to the users based on their </a:t>
+            </a:r>
+            <a:r>
+              <a:rPr lang="en-IN" sz="1200" dirty="0" smtClean="0">
+                <a:solidFill>
+                  <a:srgbClr val="00B0F0"/>
+                </a:solidFill>
+              </a:rPr>
+              <a:t>role </a:t>
+            </a:r>
+            <a:r>
+              <a:rPr lang="en-IN" sz="1200" dirty="0">
+                <a:solidFill>
+                  <a:srgbClr val="92D050"/>
+                </a:solidFill>
+                <a:sym typeface="Wingdings" panose="05000000000000000000" pitchFamily="2" charset="2"/>
+              </a:rPr>
+              <a:t> Page created for ideation</a:t>
+            </a:r>
+            <a:endParaRPr lang="en-IN" sz="1200" dirty="0">
               <a:solidFill>
                 <a:srgbClr val="00B0F0"/>
               </a:solidFill>
             </a:endParaRPr>
           </a:p>
           <a:p>
-            <a:pPr lvl="1"/>
-            <a:endParaRPr lang="en-IN" sz="1600" dirty="0"/>
-          </a:p>
-          <a:p>
             <a:pPr marL="742950" lvl="1" indent="-285750">
               <a:buFont typeface="Arial" panose="020B0604020202020204" pitchFamily="34" charset="0"/>
               <a:buChar char="•"/>
             </a:pPr>
-            <a:endParaRPr lang="en-IN" sz="1600" dirty="0"/>
+            <a:endParaRPr lang="en-IN" sz="1200" dirty="0">
+              <a:solidFill>
+                <a:srgbClr val="00B0F0"/>
+              </a:solidFill>
+            </a:endParaRPr>
+          </a:p>
+          <a:p>
+            <a:pPr marL="742950" lvl="1" indent="-285750">
+              <a:buFont typeface="Arial" panose="020B0604020202020204" pitchFamily="34" charset="0"/>
+              <a:buChar char="•"/>
+            </a:pPr>
+            <a:endParaRPr lang="en-IN" sz="1200" dirty="0">
+              <a:solidFill>
+                <a:srgbClr val="00B0F0"/>
+              </a:solidFill>
+            </a:endParaRPr>
+          </a:p>
+          <a:p>
+            <a:pPr lvl="1"/>
+            <a:endParaRPr lang="en-IN" sz="1200" dirty="0"/>
+          </a:p>
+          <a:p>
+            <a:pPr marL="742950" lvl="1" indent="-285750">
+              <a:buFont typeface="Arial" panose="020B0604020202020204" pitchFamily="34" charset="0"/>
+              <a:buChar char="•"/>
+            </a:pPr>
+            <a:endParaRPr lang="en-IN" sz="1200" dirty="0"/>
           </a:p>
         </p:txBody>
       </p:sp>

</xml_diff>